<commit_message>
added first draft UML
</commit_message>
<xml_diff>
--- a/docs/Images.pptx
+++ b/docs/Images.pptx
@@ -2,19 +2,20 @@
 <file path=ppt/presentation.xml><?xml version="1.0" encoding="utf-8"?>
 <p:presentation xmlns:a="http://schemas.openxmlformats.org/drawingml/2006/main" xmlns:r="http://schemas.openxmlformats.org/officeDocument/2006/relationships" xmlns:p="http://schemas.openxmlformats.org/presentationml/2006/main" saveSubsetFonts="1">
   <p:sldMasterIdLst>
-    <p:sldMasterId id="2147483648" r:id="rId1"/>
+    <p:sldMasterId id="2147483660" r:id="rId1"/>
   </p:sldMasterIdLst>
   <p:sldIdLst>
     <p:sldId id="256" r:id="rId2"/>
+    <p:sldId id="257" r:id="rId3"/>
   </p:sldIdLst>
-  <p:sldSz cx="12192000" cy="6858000"/>
+  <p:sldSz cx="13166725" cy="18288000"/>
   <p:notesSz cx="6858000" cy="9144000"/>
   <p:defaultTextStyle>
     <a:defPPr>
       <a:defRPr lang="en-US"/>
     </a:defPPr>
-    <a:lvl1pPr marL="0" algn="l" defTabSz="914400" rtl="0" eaLnBrk="1" latinLnBrk="0" hangingPunct="1">
-      <a:defRPr sz="1800" kern="1200">
+    <a:lvl1pPr marL="0" algn="l" defTabSz="1509766" rtl="0" eaLnBrk="1" latinLnBrk="0" hangingPunct="1">
+      <a:defRPr sz="2972" kern="1200">
         <a:solidFill>
           <a:schemeClr val="tx1"/>
         </a:solidFill>
@@ -23,8 +24,8 @@
         <a:cs typeface="+mn-cs"/>
       </a:defRPr>
     </a:lvl1pPr>
-    <a:lvl2pPr marL="457200" algn="l" defTabSz="914400" rtl="0" eaLnBrk="1" latinLnBrk="0" hangingPunct="1">
-      <a:defRPr sz="1800" kern="1200">
+    <a:lvl2pPr marL="754883" algn="l" defTabSz="1509766" rtl="0" eaLnBrk="1" latinLnBrk="0" hangingPunct="1">
+      <a:defRPr sz="2972" kern="1200">
         <a:solidFill>
           <a:schemeClr val="tx1"/>
         </a:solidFill>
@@ -33,8 +34,8 @@
         <a:cs typeface="+mn-cs"/>
       </a:defRPr>
     </a:lvl2pPr>
-    <a:lvl3pPr marL="914400" algn="l" defTabSz="914400" rtl="0" eaLnBrk="1" latinLnBrk="0" hangingPunct="1">
-      <a:defRPr sz="1800" kern="1200">
+    <a:lvl3pPr marL="1509766" algn="l" defTabSz="1509766" rtl="0" eaLnBrk="1" latinLnBrk="0" hangingPunct="1">
+      <a:defRPr sz="2972" kern="1200">
         <a:solidFill>
           <a:schemeClr val="tx1"/>
         </a:solidFill>
@@ -43,8 +44,8 @@
         <a:cs typeface="+mn-cs"/>
       </a:defRPr>
     </a:lvl3pPr>
-    <a:lvl4pPr marL="1371600" algn="l" defTabSz="914400" rtl="0" eaLnBrk="1" latinLnBrk="0" hangingPunct="1">
-      <a:defRPr sz="1800" kern="1200">
+    <a:lvl4pPr marL="2264649" algn="l" defTabSz="1509766" rtl="0" eaLnBrk="1" latinLnBrk="0" hangingPunct="1">
+      <a:defRPr sz="2972" kern="1200">
         <a:solidFill>
           <a:schemeClr val="tx1"/>
         </a:solidFill>
@@ -53,8 +54,8 @@
         <a:cs typeface="+mn-cs"/>
       </a:defRPr>
     </a:lvl4pPr>
-    <a:lvl5pPr marL="1828800" algn="l" defTabSz="914400" rtl="0" eaLnBrk="1" latinLnBrk="0" hangingPunct="1">
-      <a:defRPr sz="1800" kern="1200">
+    <a:lvl5pPr marL="3019532" algn="l" defTabSz="1509766" rtl="0" eaLnBrk="1" latinLnBrk="0" hangingPunct="1">
+      <a:defRPr sz="2972" kern="1200">
         <a:solidFill>
           <a:schemeClr val="tx1"/>
         </a:solidFill>
@@ -63,8 +64,8 @@
         <a:cs typeface="+mn-cs"/>
       </a:defRPr>
     </a:lvl5pPr>
-    <a:lvl6pPr marL="2286000" algn="l" defTabSz="914400" rtl="0" eaLnBrk="1" latinLnBrk="0" hangingPunct="1">
-      <a:defRPr sz="1800" kern="1200">
+    <a:lvl6pPr marL="3774415" algn="l" defTabSz="1509766" rtl="0" eaLnBrk="1" latinLnBrk="0" hangingPunct="1">
+      <a:defRPr sz="2972" kern="1200">
         <a:solidFill>
           <a:schemeClr val="tx1"/>
         </a:solidFill>
@@ -73,8 +74,8 @@
         <a:cs typeface="+mn-cs"/>
       </a:defRPr>
     </a:lvl6pPr>
-    <a:lvl7pPr marL="2743200" algn="l" defTabSz="914400" rtl="0" eaLnBrk="1" latinLnBrk="0" hangingPunct="1">
-      <a:defRPr sz="1800" kern="1200">
+    <a:lvl7pPr marL="4529298" algn="l" defTabSz="1509766" rtl="0" eaLnBrk="1" latinLnBrk="0" hangingPunct="1">
+      <a:defRPr sz="2972" kern="1200">
         <a:solidFill>
           <a:schemeClr val="tx1"/>
         </a:solidFill>
@@ -83,8 +84,8 @@
         <a:cs typeface="+mn-cs"/>
       </a:defRPr>
     </a:lvl7pPr>
-    <a:lvl8pPr marL="3200400" algn="l" defTabSz="914400" rtl="0" eaLnBrk="1" latinLnBrk="0" hangingPunct="1">
-      <a:defRPr sz="1800" kern="1200">
+    <a:lvl8pPr marL="5284180" algn="l" defTabSz="1509766" rtl="0" eaLnBrk="1" latinLnBrk="0" hangingPunct="1">
+      <a:defRPr sz="2972" kern="1200">
         <a:solidFill>
           <a:schemeClr val="tx1"/>
         </a:solidFill>
@@ -93,8 +94,8 @@
         <a:cs typeface="+mn-cs"/>
       </a:defRPr>
     </a:lvl8pPr>
-    <a:lvl9pPr marL="3657600" algn="l" defTabSz="914400" rtl="0" eaLnBrk="1" latinLnBrk="0" hangingPunct="1">
-      <a:defRPr sz="1800" kern="1200">
+    <a:lvl9pPr marL="6039063" algn="l" defTabSz="1509766" rtl="0" eaLnBrk="1" latinLnBrk="0" hangingPunct="1">
+      <a:defRPr sz="2972" kern="1200">
         <a:solidFill>
           <a:schemeClr val="tx1"/>
         </a:solidFill>
@@ -104,6 +105,11 @@
       </a:defRPr>
     </a:lvl9pPr>
   </p:defaultTextStyle>
+  <p:extLst>
+    <p:ext uri="{EFAFB233-063F-42B5-8137-9DF3F51BA10A}">
+      <p15:sldGuideLst xmlns:p15="http://schemas.microsoft.com/office/powerpoint/2012/main"/>
+    </p:ext>
+  </p:extLst>
 </p:presentation>
 </file>
 
@@ -136,15 +142,15 @@
         </p:nvSpPr>
         <p:spPr>
           <a:xfrm>
-            <a:off x="1524000" y="1122363"/>
-            <a:ext cx="9144000" cy="2387600"/>
+            <a:off x="987505" y="2992968"/>
+            <a:ext cx="11191716" cy="6366933"/>
           </a:xfrm>
         </p:spPr>
         <p:txBody>
           <a:bodyPr anchor="b"/>
           <a:lstStyle>
             <a:lvl1pPr algn="ctr">
-              <a:defRPr sz="6000"/>
+              <a:defRPr sz="8639"/>
             </a:lvl1pPr>
           </a:lstStyle>
           <a:p>
@@ -152,7 +158,7 @@
               <a:rPr lang="en-US" smtClean="0"/>
               <a:t>Click to edit Master title style</a:t>
             </a:r>
-            <a:endParaRPr lang="en-US"/>
+            <a:endParaRPr lang="en-US" dirty="0"/>
           </a:p>
         </p:txBody>
       </p:sp>
@@ -168,8 +174,8 @@
         </p:nvSpPr>
         <p:spPr>
           <a:xfrm>
-            <a:off x="1524000" y="3602038"/>
-            <a:ext cx="9144000" cy="1655762"/>
+            <a:off x="1645841" y="9605435"/>
+            <a:ext cx="9875044" cy="4415365"/>
           </a:xfrm>
         </p:spPr>
         <p:txBody>
@@ -177,39 +183,39 @@
           <a:lstStyle>
             <a:lvl1pPr marL="0" indent="0" algn="ctr">
               <a:buNone/>
-              <a:defRPr sz="2400"/>
+              <a:defRPr sz="3456"/>
             </a:lvl1pPr>
-            <a:lvl2pPr marL="457200" indent="0" algn="ctr">
+            <a:lvl2pPr marL="658322" indent="0" algn="ctr">
               <a:buNone/>
-              <a:defRPr sz="2000"/>
+              <a:defRPr sz="2880"/>
             </a:lvl2pPr>
-            <a:lvl3pPr marL="914400" indent="0" algn="ctr">
+            <a:lvl3pPr marL="1316645" indent="0" algn="ctr">
               <a:buNone/>
-              <a:defRPr sz="1800"/>
+              <a:defRPr sz="2592"/>
             </a:lvl3pPr>
-            <a:lvl4pPr marL="1371600" indent="0" algn="ctr">
+            <a:lvl4pPr marL="1974967" indent="0" algn="ctr">
               <a:buNone/>
-              <a:defRPr sz="1600"/>
+              <a:defRPr sz="2304"/>
             </a:lvl4pPr>
-            <a:lvl5pPr marL="1828800" indent="0" algn="ctr">
+            <a:lvl5pPr marL="2633289" indent="0" algn="ctr">
               <a:buNone/>
-              <a:defRPr sz="1600"/>
+              <a:defRPr sz="2304"/>
             </a:lvl5pPr>
-            <a:lvl6pPr marL="2286000" indent="0" algn="ctr">
+            <a:lvl6pPr marL="3291611" indent="0" algn="ctr">
               <a:buNone/>
-              <a:defRPr sz="1600"/>
+              <a:defRPr sz="2304"/>
             </a:lvl6pPr>
-            <a:lvl7pPr marL="2743200" indent="0" algn="ctr">
+            <a:lvl7pPr marL="3949934" indent="0" algn="ctr">
               <a:buNone/>
-              <a:defRPr sz="1600"/>
+              <a:defRPr sz="2304"/>
             </a:lvl7pPr>
-            <a:lvl8pPr marL="3200400" indent="0" algn="ctr">
+            <a:lvl8pPr marL="4608256" indent="0" algn="ctr">
               <a:buNone/>
-              <a:defRPr sz="1600"/>
+              <a:defRPr sz="2304"/>
             </a:lvl8pPr>
-            <a:lvl9pPr marL="3657600" indent="0" algn="ctr">
+            <a:lvl9pPr marL="5266578" indent="0" algn="ctr">
               <a:buNone/>
-              <a:defRPr sz="1600"/>
+              <a:defRPr sz="2304"/>
             </a:lvl9pPr>
           </a:lstStyle>
           <a:p>
@@ -217,7 +223,7 @@
               <a:rPr lang="en-US" smtClean="0"/>
               <a:t>Click to edit Master subtitle style</a:t>
             </a:r>
-            <a:endParaRPr lang="en-US"/>
+            <a:endParaRPr lang="en-US" dirty="0"/>
           </a:p>
         </p:txBody>
       </p:sp>
@@ -238,7 +244,7 @@
           <a:p>
             <a:fld id="{8139C481-9EC5-4675-B559-5AD62287EABD}" type="datetimeFigureOut">
               <a:rPr lang="en-US" smtClean="0"/>
-              <a:t>2/9/2014</a:t>
+              <a:t>2/10/2014</a:t>
             </a:fld>
             <a:endParaRPr lang="en-US"/>
           </a:p>
@@ -289,7 +295,7 @@
     </p:spTree>
     <p:extLst>
       <p:ext uri="{BB962C8B-B14F-4D97-AF65-F5344CB8AC3E}">
-        <p14:creationId xmlns:p14="http://schemas.microsoft.com/office/powerpoint/2010/main" val="1055131254"/>
+        <p14:creationId xmlns:p14="http://schemas.microsoft.com/office/powerpoint/2010/main" val="3756573552"/>
       </p:ext>
     </p:extLst>
   </p:cSld>
@@ -335,7 +341,7 @@
               <a:rPr lang="en-US" smtClean="0"/>
               <a:t>Click to edit Master title style</a:t>
             </a:r>
-            <a:endParaRPr lang="en-US"/>
+            <a:endParaRPr lang="en-US" dirty="0"/>
           </a:p>
         </p:txBody>
       </p:sp>
@@ -387,7 +393,7 @@
               <a:rPr lang="en-US" smtClean="0"/>
               <a:t>Fifth level</a:t>
             </a:r>
-            <a:endParaRPr lang="en-US"/>
+            <a:endParaRPr lang="en-US" dirty="0"/>
           </a:p>
         </p:txBody>
       </p:sp>
@@ -408,7 +414,7 @@
           <a:p>
             <a:fld id="{8139C481-9EC5-4675-B559-5AD62287EABD}" type="datetimeFigureOut">
               <a:rPr lang="en-US" smtClean="0"/>
-              <a:t>2/9/2014</a:t>
+              <a:t>2/10/2014</a:t>
             </a:fld>
             <a:endParaRPr lang="en-US"/>
           </a:p>
@@ -459,7 +465,7 @@
     </p:spTree>
     <p:extLst>
       <p:ext uri="{BB962C8B-B14F-4D97-AF65-F5344CB8AC3E}">
-        <p14:creationId xmlns:p14="http://schemas.microsoft.com/office/powerpoint/2010/main" val="3766308963"/>
+        <p14:creationId xmlns:p14="http://schemas.microsoft.com/office/powerpoint/2010/main" val="84684243"/>
       </p:ext>
     </p:extLst>
   </p:cSld>
@@ -498,8 +504,8 @@
         </p:nvSpPr>
         <p:spPr>
           <a:xfrm>
-            <a:off x="8724900" y="365125"/>
-            <a:ext cx="2628900" cy="5811838"/>
+            <a:off x="9422438" y="973667"/>
+            <a:ext cx="2839075" cy="15498235"/>
           </a:xfrm>
         </p:spPr>
         <p:txBody>
@@ -510,7 +516,7 @@
               <a:rPr lang="en-US" smtClean="0"/>
               <a:t>Click to edit Master title style</a:t>
             </a:r>
-            <a:endParaRPr lang="en-US"/>
+            <a:endParaRPr lang="en-US" dirty="0"/>
           </a:p>
         </p:txBody>
       </p:sp>
@@ -526,8 +532,8 @@
         </p:nvSpPr>
         <p:spPr>
           <a:xfrm>
-            <a:off x="838200" y="365125"/>
-            <a:ext cx="7734300" cy="5811838"/>
+            <a:off x="905213" y="973667"/>
+            <a:ext cx="8352641" cy="15498235"/>
           </a:xfrm>
         </p:spPr>
         <p:txBody>
@@ -567,7 +573,7 @@
               <a:rPr lang="en-US" smtClean="0"/>
               <a:t>Fifth level</a:t>
             </a:r>
-            <a:endParaRPr lang="en-US"/>
+            <a:endParaRPr lang="en-US" dirty="0"/>
           </a:p>
         </p:txBody>
       </p:sp>
@@ -588,7 +594,7 @@
           <a:p>
             <a:fld id="{8139C481-9EC5-4675-B559-5AD62287EABD}" type="datetimeFigureOut">
               <a:rPr lang="en-US" smtClean="0"/>
-              <a:t>2/9/2014</a:t>
+              <a:t>2/10/2014</a:t>
             </a:fld>
             <a:endParaRPr lang="en-US"/>
           </a:p>
@@ -639,7 +645,7 @@
     </p:spTree>
     <p:extLst>
       <p:ext uri="{BB962C8B-B14F-4D97-AF65-F5344CB8AC3E}">
-        <p14:creationId xmlns:p14="http://schemas.microsoft.com/office/powerpoint/2010/main" val="852783776"/>
+        <p14:creationId xmlns:p14="http://schemas.microsoft.com/office/powerpoint/2010/main" val="3737409903"/>
       </p:ext>
     </p:extLst>
   </p:cSld>
@@ -685,7 +691,7 @@
               <a:rPr lang="en-US" smtClean="0"/>
               <a:t>Click to edit Master title style</a:t>
             </a:r>
-            <a:endParaRPr lang="en-US"/>
+            <a:endParaRPr lang="en-US" dirty="0"/>
           </a:p>
         </p:txBody>
       </p:sp>
@@ -737,7 +743,7 @@
               <a:rPr lang="en-US" smtClean="0"/>
               <a:t>Fifth level</a:t>
             </a:r>
-            <a:endParaRPr lang="en-US"/>
+            <a:endParaRPr lang="en-US" dirty="0"/>
           </a:p>
         </p:txBody>
       </p:sp>
@@ -758,7 +764,7 @@
           <a:p>
             <a:fld id="{8139C481-9EC5-4675-B559-5AD62287EABD}" type="datetimeFigureOut">
               <a:rPr lang="en-US" smtClean="0"/>
-              <a:t>2/9/2014</a:t>
+              <a:t>2/10/2014</a:t>
             </a:fld>
             <a:endParaRPr lang="en-US"/>
           </a:p>
@@ -809,7 +815,7 @@
     </p:spTree>
     <p:extLst>
       <p:ext uri="{BB962C8B-B14F-4D97-AF65-F5344CB8AC3E}">
-        <p14:creationId xmlns:p14="http://schemas.microsoft.com/office/powerpoint/2010/main" val="1934255094"/>
+        <p14:creationId xmlns:p14="http://schemas.microsoft.com/office/powerpoint/2010/main" val="2911272860"/>
       </p:ext>
     </p:extLst>
   </p:cSld>
@@ -848,15 +854,15 @@
         </p:nvSpPr>
         <p:spPr>
           <a:xfrm>
-            <a:off x="831850" y="1709738"/>
-            <a:ext cx="10515600" cy="2852737"/>
+            <a:off x="898356" y="4559305"/>
+            <a:ext cx="11356300" cy="7607299"/>
           </a:xfrm>
         </p:spPr>
         <p:txBody>
           <a:bodyPr anchor="b"/>
           <a:lstStyle>
             <a:lvl1pPr>
-              <a:defRPr sz="6000"/>
+              <a:defRPr sz="8639"/>
             </a:lvl1pPr>
           </a:lstStyle>
           <a:p>
@@ -864,7 +870,7 @@
               <a:rPr lang="en-US" smtClean="0"/>
               <a:t>Click to edit Master title style</a:t>
             </a:r>
-            <a:endParaRPr lang="en-US"/>
+            <a:endParaRPr lang="en-US" dirty="0"/>
           </a:p>
         </p:txBody>
       </p:sp>
@@ -880,8 +886,8 @@
         </p:nvSpPr>
         <p:spPr>
           <a:xfrm>
-            <a:off x="831850" y="4589463"/>
-            <a:ext cx="10515600" cy="1500187"/>
+            <a:off x="898356" y="12238572"/>
+            <a:ext cx="11356300" cy="4000499"/>
           </a:xfrm>
         </p:spPr>
         <p:txBody>
@@ -889,17 +895,15 @@
           <a:lstStyle>
             <a:lvl1pPr marL="0" indent="0">
               <a:buNone/>
-              <a:defRPr sz="2400">
+              <a:defRPr sz="3456">
                 <a:solidFill>
-                  <a:schemeClr val="tx1">
-                    <a:tint val="75000"/>
-                  </a:schemeClr>
+                  <a:schemeClr val="tx1"/>
                 </a:solidFill>
               </a:defRPr>
             </a:lvl1pPr>
-            <a:lvl2pPr marL="457200" indent="0">
+            <a:lvl2pPr marL="658322" indent="0">
               <a:buNone/>
-              <a:defRPr sz="2000">
+              <a:defRPr sz="2880">
                 <a:solidFill>
                   <a:schemeClr val="tx1">
                     <a:tint val="75000"/>
@@ -907,9 +911,9 @@
                 </a:solidFill>
               </a:defRPr>
             </a:lvl2pPr>
-            <a:lvl3pPr marL="914400" indent="0">
+            <a:lvl3pPr marL="1316645" indent="0">
               <a:buNone/>
-              <a:defRPr sz="1800">
+              <a:defRPr sz="2592">
                 <a:solidFill>
                   <a:schemeClr val="tx1">
                     <a:tint val="75000"/>
@@ -917,9 +921,9 @@
                 </a:solidFill>
               </a:defRPr>
             </a:lvl3pPr>
-            <a:lvl4pPr marL="1371600" indent="0">
+            <a:lvl4pPr marL="1974967" indent="0">
               <a:buNone/>
-              <a:defRPr sz="1600">
+              <a:defRPr sz="2304">
                 <a:solidFill>
                   <a:schemeClr val="tx1">
                     <a:tint val="75000"/>
@@ -927,9 +931,9 @@
                 </a:solidFill>
               </a:defRPr>
             </a:lvl4pPr>
-            <a:lvl5pPr marL="1828800" indent="0">
+            <a:lvl5pPr marL="2633289" indent="0">
               <a:buNone/>
-              <a:defRPr sz="1600">
+              <a:defRPr sz="2304">
                 <a:solidFill>
                   <a:schemeClr val="tx1">
                     <a:tint val="75000"/>
@@ -937,9 +941,9 @@
                 </a:solidFill>
               </a:defRPr>
             </a:lvl5pPr>
-            <a:lvl6pPr marL="2286000" indent="0">
+            <a:lvl6pPr marL="3291611" indent="0">
               <a:buNone/>
-              <a:defRPr sz="1600">
+              <a:defRPr sz="2304">
                 <a:solidFill>
                   <a:schemeClr val="tx1">
                     <a:tint val="75000"/>
@@ -947,9 +951,9 @@
                 </a:solidFill>
               </a:defRPr>
             </a:lvl6pPr>
-            <a:lvl7pPr marL="2743200" indent="0">
+            <a:lvl7pPr marL="3949934" indent="0">
               <a:buNone/>
-              <a:defRPr sz="1600">
+              <a:defRPr sz="2304">
                 <a:solidFill>
                   <a:schemeClr val="tx1">
                     <a:tint val="75000"/>
@@ -957,9 +961,9 @@
                 </a:solidFill>
               </a:defRPr>
             </a:lvl7pPr>
-            <a:lvl8pPr marL="3200400" indent="0">
+            <a:lvl8pPr marL="4608256" indent="0">
               <a:buNone/>
-              <a:defRPr sz="1600">
+              <a:defRPr sz="2304">
                 <a:solidFill>
                   <a:schemeClr val="tx1">
                     <a:tint val="75000"/>
@@ -967,9 +971,9 @@
                 </a:solidFill>
               </a:defRPr>
             </a:lvl8pPr>
-            <a:lvl9pPr marL="3657600" indent="0">
+            <a:lvl9pPr marL="5266578" indent="0">
               <a:buNone/>
-              <a:defRPr sz="1600">
+              <a:defRPr sz="2304">
                 <a:solidFill>
                   <a:schemeClr val="tx1">
                     <a:tint val="75000"/>
@@ -1004,7 +1008,7 @@
           <a:p>
             <a:fld id="{8139C481-9EC5-4675-B559-5AD62287EABD}" type="datetimeFigureOut">
               <a:rPr lang="en-US" smtClean="0"/>
-              <a:t>2/9/2014</a:t>
+              <a:t>2/10/2014</a:t>
             </a:fld>
             <a:endParaRPr lang="en-US"/>
           </a:p>
@@ -1055,7 +1059,7 @@
     </p:spTree>
     <p:extLst>
       <p:ext uri="{BB962C8B-B14F-4D97-AF65-F5344CB8AC3E}">
-        <p14:creationId xmlns:p14="http://schemas.microsoft.com/office/powerpoint/2010/main" val="2799245565"/>
+        <p14:creationId xmlns:p14="http://schemas.microsoft.com/office/powerpoint/2010/main" val="966792969"/>
       </p:ext>
     </p:extLst>
   </p:cSld>
@@ -1101,7 +1105,7 @@
               <a:rPr lang="en-US" smtClean="0"/>
               <a:t>Click to edit Master title style</a:t>
             </a:r>
-            <a:endParaRPr lang="en-US"/>
+            <a:endParaRPr lang="en-US" dirty="0"/>
           </a:p>
         </p:txBody>
       </p:sp>
@@ -1117,8 +1121,8 @@
         </p:nvSpPr>
         <p:spPr>
           <a:xfrm>
-            <a:off x="838200" y="1825625"/>
-            <a:ext cx="5181600" cy="4351338"/>
+            <a:off x="905212" y="4868333"/>
+            <a:ext cx="5595858" cy="11603568"/>
           </a:xfrm>
         </p:spPr>
         <p:txBody>
@@ -1158,7 +1162,7 @@
               <a:rPr lang="en-US" smtClean="0"/>
               <a:t>Fifth level</a:t>
             </a:r>
-            <a:endParaRPr lang="en-US"/>
+            <a:endParaRPr lang="en-US" dirty="0"/>
           </a:p>
         </p:txBody>
       </p:sp>
@@ -1174,8 +1178,8 @@
         </p:nvSpPr>
         <p:spPr>
           <a:xfrm>
-            <a:off x="6172200" y="1825625"/>
-            <a:ext cx="5181600" cy="4351338"/>
+            <a:off x="6665655" y="4868333"/>
+            <a:ext cx="5595858" cy="11603568"/>
           </a:xfrm>
         </p:spPr>
         <p:txBody>
@@ -1215,7 +1219,7 @@
               <a:rPr lang="en-US" smtClean="0"/>
               <a:t>Fifth level</a:t>
             </a:r>
-            <a:endParaRPr lang="en-US"/>
+            <a:endParaRPr lang="en-US" dirty="0"/>
           </a:p>
         </p:txBody>
       </p:sp>
@@ -1236,7 +1240,7 @@
           <a:p>
             <a:fld id="{8139C481-9EC5-4675-B559-5AD62287EABD}" type="datetimeFigureOut">
               <a:rPr lang="en-US" smtClean="0"/>
-              <a:t>2/9/2014</a:t>
+              <a:t>2/10/2014</a:t>
             </a:fld>
             <a:endParaRPr lang="en-US"/>
           </a:p>
@@ -1287,7 +1291,7 @@
     </p:spTree>
     <p:extLst>
       <p:ext uri="{BB962C8B-B14F-4D97-AF65-F5344CB8AC3E}">
-        <p14:creationId xmlns:p14="http://schemas.microsoft.com/office/powerpoint/2010/main" val="806051246"/>
+        <p14:creationId xmlns:p14="http://schemas.microsoft.com/office/powerpoint/2010/main" val="2806284276"/>
       </p:ext>
     </p:extLst>
   </p:cSld>
@@ -1326,8 +1330,8 @@
         </p:nvSpPr>
         <p:spPr>
           <a:xfrm>
-            <a:off x="839788" y="365125"/>
-            <a:ext cx="10515600" cy="1325563"/>
+            <a:off x="906927" y="973671"/>
+            <a:ext cx="11356300" cy="3534835"/>
           </a:xfrm>
         </p:spPr>
         <p:txBody>
@@ -1338,7 +1342,7 @@
               <a:rPr lang="en-US" smtClean="0"/>
               <a:t>Click to edit Master title style</a:t>
             </a:r>
-            <a:endParaRPr lang="en-US"/>
+            <a:endParaRPr lang="en-US" dirty="0"/>
           </a:p>
         </p:txBody>
       </p:sp>
@@ -1354,8 +1358,8 @@
         </p:nvSpPr>
         <p:spPr>
           <a:xfrm>
-            <a:off x="839788" y="1681163"/>
-            <a:ext cx="5157787" cy="823912"/>
+            <a:off x="906929" y="4483101"/>
+            <a:ext cx="5570141" cy="2197099"/>
           </a:xfrm>
         </p:spPr>
         <p:txBody>
@@ -1363,39 +1367,39 @@
           <a:lstStyle>
             <a:lvl1pPr marL="0" indent="0">
               <a:buNone/>
-              <a:defRPr sz="2400" b="1"/>
+              <a:defRPr sz="3456" b="1"/>
             </a:lvl1pPr>
-            <a:lvl2pPr marL="457200" indent="0">
+            <a:lvl2pPr marL="658322" indent="0">
               <a:buNone/>
-              <a:defRPr sz="2000" b="1"/>
+              <a:defRPr sz="2880" b="1"/>
             </a:lvl2pPr>
-            <a:lvl3pPr marL="914400" indent="0">
+            <a:lvl3pPr marL="1316645" indent="0">
               <a:buNone/>
-              <a:defRPr sz="1800" b="1"/>
+              <a:defRPr sz="2592" b="1"/>
             </a:lvl3pPr>
-            <a:lvl4pPr marL="1371600" indent="0">
+            <a:lvl4pPr marL="1974967" indent="0">
               <a:buNone/>
-              <a:defRPr sz="1600" b="1"/>
+              <a:defRPr sz="2304" b="1"/>
             </a:lvl4pPr>
-            <a:lvl5pPr marL="1828800" indent="0">
+            <a:lvl5pPr marL="2633289" indent="0">
               <a:buNone/>
-              <a:defRPr sz="1600" b="1"/>
+              <a:defRPr sz="2304" b="1"/>
             </a:lvl5pPr>
-            <a:lvl6pPr marL="2286000" indent="0">
+            <a:lvl6pPr marL="3291611" indent="0">
               <a:buNone/>
-              <a:defRPr sz="1600" b="1"/>
+              <a:defRPr sz="2304" b="1"/>
             </a:lvl6pPr>
-            <a:lvl7pPr marL="2743200" indent="0">
+            <a:lvl7pPr marL="3949934" indent="0">
               <a:buNone/>
-              <a:defRPr sz="1600" b="1"/>
+              <a:defRPr sz="2304" b="1"/>
             </a:lvl7pPr>
-            <a:lvl8pPr marL="3200400" indent="0">
+            <a:lvl8pPr marL="4608256" indent="0">
               <a:buNone/>
-              <a:defRPr sz="1600" b="1"/>
+              <a:defRPr sz="2304" b="1"/>
             </a:lvl8pPr>
-            <a:lvl9pPr marL="3657600" indent="0">
+            <a:lvl9pPr marL="5266578" indent="0">
               <a:buNone/>
-              <a:defRPr sz="1600" b="1"/>
+              <a:defRPr sz="2304" b="1"/>
             </a:lvl9pPr>
           </a:lstStyle>
           <a:p>
@@ -1419,8 +1423,8 @@
         </p:nvSpPr>
         <p:spPr>
           <a:xfrm>
-            <a:off x="839788" y="2505075"/>
-            <a:ext cx="5157787" cy="3684588"/>
+            <a:off x="906929" y="6680200"/>
+            <a:ext cx="5570141" cy="9825568"/>
           </a:xfrm>
         </p:spPr>
         <p:txBody>
@@ -1460,7 +1464,7 @@
               <a:rPr lang="en-US" smtClean="0"/>
               <a:t>Fifth level</a:t>
             </a:r>
-            <a:endParaRPr lang="en-US"/>
+            <a:endParaRPr lang="en-US" dirty="0"/>
           </a:p>
         </p:txBody>
       </p:sp>
@@ -1476,8 +1480,8 @@
         </p:nvSpPr>
         <p:spPr>
           <a:xfrm>
-            <a:off x="6172200" y="1681163"/>
-            <a:ext cx="5183188" cy="823912"/>
+            <a:off x="6665655" y="4483101"/>
+            <a:ext cx="5597573" cy="2197099"/>
           </a:xfrm>
         </p:spPr>
         <p:txBody>
@@ -1485,39 +1489,39 @@
           <a:lstStyle>
             <a:lvl1pPr marL="0" indent="0">
               <a:buNone/>
-              <a:defRPr sz="2400" b="1"/>
+              <a:defRPr sz="3456" b="1"/>
             </a:lvl1pPr>
-            <a:lvl2pPr marL="457200" indent="0">
+            <a:lvl2pPr marL="658322" indent="0">
               <a:buNone/>
-              <a:defRPr sz="2000" b="1"/>
+              <a:defRPr sz="2880" b="1"/>
             </a:lvl2pPr>
-            <a:lvl3pPr marL="914400" indent="0">
+            <a:lvl3pPr marL="1316645" indent="0">
               <a:buNone/>
-              <a:defRPr sz="1800" b="1"/>
+              <a:defRPr sz="2592" b="1"/>
             </a:lvl3pPr>
-            <a:lvl4pPr marL="1371600" indent="0">
+            <a:lvl4pPr marL="1974967" indent="0">
               <a:buNone/>
-              <a:defRPr sz="1600" b="1"/>
+              <a:defRPr sz="2304" b="1"/>
             </a:lvl4pPr>
-            <a:lvl5pPr marL="1828800" indent="0">
+            <a:lvl5pPr marL="2633289" indent="0">
               <a:buNone/>
-              <a:defRPr sz="1600" b="1"/>
+              <a:defRPr sz="2304" b="1"/>
             </a:lvl5pPr>
-            <a:lvl6pPr marL="2286000" indent="0">
+            <a:lvl6pPr marL="3291611" indent="0">
               <a:buNone/>
-              <a:defRPr sz="1600" b="1"/>
+              <a:defRPr sz="2304" b="1"/>
             </a:lvl6pPr>
-            <a:lvl7pPr marL="2743200" indent="0">
+            <a:lvl7pPr marL="3949934" indent="0">
               <a:buNone/>
-              <a:defRPr sz="1600" b="1"/>
+              <a:defRPr sz="2304" b="1"/>
             </a:lvl7pPr>
-            <a:lvl8pPr marL="3200400" indent="0">
+            <a:lvl8pPr marL="4608256" indent="0">
               <a:buNone/>
-              <a:defRPr sz="1600" b="1"/>
+              <a:defRPr sz="2304" b="1"/>
             </a:lvl8pPr>
-            <a:lvl9pPr marL="3657600" indent="0">
+            <a:lvl9pPr marL="5266578" indent="0">
               <a:buNone/>
-              <a:defRPr sz="1600" b="1"/>
+              <a:defRPr sz="2304" b="1"/>
             </a:lvl9pPr>
           </a:lstStyle>
           <a:p>
@@ -1541,8 +1545,8 @@
         </p:nvSpPr>
         <p:spPr>
           <a:xfrm>
-            <a:off x="6172200" y="2505075"/>
-            <a:ext cx="5183188" cy="3684588"/>
+            <a:off x="6665655" y="6680200"/>
+            <a:ext cx="5597573" cy="9825568"/>
           </a:xfrm>
         </p:spPr>
         <p:txBody>
@@ -1582,7 +1586,7 @@
               <a:rPr lang="en-US" smtClean="0"/>
               <a:t>Fifth level</a:t>
             </a:r>
-            <a:endParaRPr lang="en-US"/>
+            <a:endParaRPr lang="en-US" dirty="0"/>
           </a:p>
         </p:txBody>
       </p:sp>
@@ -1603,7 +1607,7 @@
           <a:p>
             <a:fld id="{8139C481-9EC5-4675-B559-5AD62287EABD}" type="datetimeFigureOut">
               <a:rPr lang="en-US" smtClean="0"/>
-              <a:t>2/9/2014</a:t>
+              <a:t>2/10/2014</a:t>
             </a:fld>
             <a:endParaRPr lang="en-US"/>
           </a:p>
@@ -1654,7 +1658,7 @@
     </p:spTree>
     <p:extLst>
       <p:ext uri="{BB962C8B-B14F-4D97-AF65-F5344CB8AC3E}">
-        <p14:creationId xmlns:p14="http://schemas.microsoft.com/office/powerpoint/2010/main" val="2062903828"/>
+        <p14:creationId xmlns:p14="http://schemas.microsoft.com/office/powerpoint/2010/main" val="4250018379"/>
       </p:ext>
     </p:extLst>
   </p:cSld>
@@ -1700,7 +1704,7 @@
               <a:rPr lang="en-US" smtClean="0"/>
               <a:t>Click to edit Master title style</a:t>
             </a:r>
-            <a:endParaRPr lang="en-US"/>
+            <a:endParaRPr lang="en-US" dirty="0"/>
           </a:p>
         </p:txBody>
       </p:sp>
@@ -1721,7 +1725,7 @@
           <a:p>
             <a:fld id="{8139C481-9EC5-4675-B559-5AD62287EABD}" type="datetimeFigureOut">
               <a:rPr lang="en-US" smtClean="0"/>
-              <a:t>2/9/2014</a:t>
+              <a:t>2/10/2014</a:t>
             </a:fld>
             <a:endParaRPr lang="en-US"/>
           </a:p>
@@ -1772,7 +1776,7 @@
     </p:spTree>
     <p:extLst>
       <p:ext uri="{BB962C8B-B14F-4D97-AF65-F5344CB8AC3E}">
-        <p14:creationId xmlns:p14="http://schemas.microsoft.com/office/powerpoint/2010/main" val="4261116779"/>
+        <p14:creationId xmlns:p14="http://schemas.microsoft.com/office/powerpoint/2010/main" val="937516208"/>
       </p:ext>
     </p:extLst>
   </p:cSld>
@@ -1816,7 +1820,7 @@
           <a:p>
             <a:fld id="{8139C481-9EC5-4675-B559-5AD62287EABD}" type="datetimeFigureOut">
               <a:rPr lang="en-US" smtClean="0"/>
-              <a:t>2/9/2014</a:t>
+              <a:t>2/10/2014</a:t>
             </a:fld>
             <a:endParaRPr lang="en-US"/>
           </a:p>
@@ -1867,7 +1871,7 @@
     </p:spTree>
     <p:extLst>
       <p:ext uri="{BB962C8B-B14F-4D97-AF65-F5344CB8AC3E}">
-        <p14:creationId xmlns:p14="http://schemas.microsoft.com/office/powerpoint/2010/main" val="2278366654"/>
+        <p14:creationId xmlns:p14="http://schemas.microsoft.com/office/powerpoint/2010/main" val="1786612349"/>
       </p:ext>
     </p:extLst>
   </p:cSld>
@@ -1906,15 +1910,15 @@
         </p:nvSpPr>
         <p:spPr>
           <a:xfrm>
-            <a:off x="839788" y="457200"/>
-            <a:ext cx="3932237" cy="1600200"/>
+            <a:off x="906927" y="1219200"/>
+            <a:ext cx="4246612" cy="4267200"/>
           </a:xfrm>
         </p:spPr>
         <p:txBody>
           <a:bodyPr anchor="b"/>
           <a:lstStyle>
             <a:lvl1pPr>
-              <a:defRPr sz="3200"/>
+              <a:defRPr sz="4608"/>
             </a:lvl1pPr>
           </a:lstStyle>
           <a:p>
@@ -1922,7 +1926,7 @@
               <a:rPr lang="en-US" smtClean="0"/>
               <a:t>Click to edit Master title style</a:t>
             </a:r>
-            <a:endParaRPr lang="en-US"/>
+            <a:endParaRPr lang="en-US" dirty="0"/>
           </a:p>
         </p:txBody>
       </p:sp>
@@ -1938,39 +1942,39 @@
         </p:nvSpPr>
         <p:spPr>
           <a:xfrm>
-            <a:off x="5183188" y="987425"/>
-            <a:ext cx="6172200" cy="4873625"/>
+            <a:off x="5597573" y="2633138"/>
+            <a:ext cx="6665655" cy="12996333"/>
           </a:xfrm>
         </p:spPr>
         <p:txBody>
           <a:bodyPr/>
           <a:lstStyle>
             <a:lvl1pPr>
-              <a:defRPr sz="3200"/>
+              <a:defRPr sz="4608"/>
             </a:lvl1pPr>
             <a:lvl2pPr>
-              <a:defRPr sz="2800"/>
+              <a:defRPr sz="4032"/>
             </a:lvl2pPr>
             <a:lvl3pPr>
-              <a:defRPr sz="2400"/>
+              <a:defRPr sz="3456"/>
             </a:lvl3pPr>
             <a:lvl4pPr>
-              <a:defRPr sz="2000"/>
+              <a:defRPr sz="2880"/>
             </a:lvl4pPr>
             <a:lvl5pPr>
-              <a:defRPr sz="2000"/>
+              <a:defRPr sz="2880"/>
             </a:lvl5pPr>
             <a:lvl6pPr>
-              <a:defRPr sz="2000"/>
+              <a:defRPr sz="2880"/>
             </a:lvl6pPr>
             <a:lvl7pPr>
-              <a:defRPr sz="2000"/>
+              <a:defRPr sz="2880"/>
             </a:lvl7pPr>
             <a:lvl8pPr>
-              <a:defRPr sz="2000"/>
+              <a:defRPr sz="2880"/>
             </a:lvl8pPr>
             <a:lvl9pPr>
-              <a:defRPr sz="2000"/>
+              <a:defRPr sz="2880"/>
             </a:lvl9pPr>
           </a:lstStyle>
           <a:p>
@@ -2007,7 +2011,7 @@
               <a:rPr lang="en-US" smtClean="0"/>
               <a:t>Fifth level</a:t>
             </a:r>
-            <a:endParaRPr lang="en-US"/>
+            <a:endParaRPr lang="en-US" dirty="0"/>
           </a:p>
         </p:txBody>
       </p:sp>
@@ -2023,8 +2027,8 @@
         </p:nvSpPr>
         <p:spPr>
           <a:xfrm>
-            <a:off x="839788" y="2057400"/>
-            <a:ext cx="3932237" cy="3811588"/>
+            <a:off x="906927" y="5486400"/>
+            <a:ext cx="4246612" cy="10164235"/>
           </a:xfrm>
         </p:spPr>
         <p:txBody>
@@ -2032,39 +2036,39 @@
           <a:lstStyle>
             <a:lvl1pPr marL="0" indent="0">
               <a:buNone/>
-              <a:defRPr sz="1600"/>
+              <a:defRPr sz="2304"/>
             </a:lvl1pPr>
-            <a:lvl2pPr marL="457200" indent="0">
+            <a:lvl2pPr marL="658322" indent="0">
               <a:buNone/>
-              <a:defRPr sz="1400"/>
+              <a:defRPr sz="2016"/>
             </a:lvl2pPr>
-            <a:lvl3pPr marL="914400" indent="0">
+            <a:lvl3pPr marL="1316645" indent="0">
               <a:buNone/>
-              <a:defRPr sz="1200"/>
+              <a:defRPr sz="1728"/>
             </a:lvl3pPr>
-            <a:lvl4pPr marL="1371600" indent="0">
+            <a:lvl4pPr marL="1974967" indent="0">
               <a:buNone/>
-              <a:defRPr sz="1000"/>
+              <a:defRPr sz="1440"/>
             </a:lvl4pPr>
-            <a:lvl5pPr marL="1828800" indent="0">
+            <a:lvl5pPr marL="2633289" indent="0">
               <a:buNone/>
-              <a:defRPr sz="1000"/>
+              <a:defRPr sz="1440"/>
             </a:lvl5pPr>
-            <a:lvl6pPr marL="2286000" indent="0">
+            <a:lvl6pPr marL="3291611" indent="0">
               <a:buNone/>
-              <a:defRPr sz="1000"/>
+              <a:defRPr sz="1440"/>
             </a:lvl6pPr>
-            <a:lvl7pPr marL="2743200" indent="0">
+            <a:lvl7pPr marL="3949934" indent="0">
               <a:buNone/>
-              <a:defRPr sz="1000"/>
+              <a:defRPr sz="1440"/>
             </a:lvl7pPr>
-            <a:lvl8pPr marL="3200400" indent="0">
+            <a:lvl8pPr marL="4608256" indent="0">
               <a:buNone/>
-              <a:defRPr sz="1000"/>
+              <a:defRPr sz="1440"/>
             </a:lvl8pPr>
-            <a:lvl9pPr marL="3657600" indent="0">
+            <a:lvl9pPr marL="5266578" indent="0">
               <a:buNone/>
-              <a:defRPr sz="1000"/>
+              <a:defRPr sz="1440"/>
             </a:lvl9pPr>
           </a:lstStyle>
           <a:p>
@@ -2093,7 +2097,7 @@
           <a:p>
             <a:fld id="{8139C481-9EC5-4675-B559-5AD62287EABD}" type="datetimeFigureOut">
               <a:rPr lang="en-US" smtClean="0"/>
-              <a:t>2/9/2014</a:t>
+              <a:t>2/10/2014</a:t>
             </a:fld>
             <a:endParaRPr lang="en-US"/>
           </a:p>
@@ -2144,7 +2148,7 @@
     </p:spTree>
     <p:extLst>
       <p:ext uri="{BB962C8B-B14F-4D97-AF65-F5344CB8AC3E}">
-        <p14:creationId xmlns:p14="http://schemas.microsoft.com/office/powerpoint/2010/main" val="979620835"/>
+        <p14:creationId xmlns:p14="http://schemas.microsoft.com/office/powerpoint/2010/main" val="734087709"/>
       </p:ext>
     </p:extLst>
   </p:cSld>
@@ -2183,15 +2187,15 @@
         </p:nvSpPr>
         <p:spPr>
           <a:xfrm>
-            <a:off x="839788" y="457200"/>
-            <a:ext cx="3932237" cy="1600200"/>
+            <a:off x="906927" y="1219200"/>
+            <a:ext cx="4246612" cy="4267200"/>
           </a:xfrm>
         </p:spPr>
         <p:txBody>
           <a:bodyPr anchor="b"/>
           <a:lstStyle>
             <a:lvl1pPr>
-              <a:defRPr sz="3200"/>
+              <a:defRPr sz="4608"/>
             </a:lvl1pPr>
           </a:lstStyle>
           <a:p>
@@ -2199,7 +2203,7 @@
               <a:rPr lang="en-US" smtClean="0"/>
               <a:t>Click to edit Master title style</a:t>
             </a:r>
-            <a:endParaRPr lang="en-US"/>
+            <a:endParaRPr lang="en-US" dirty="0"/>
           </a:p>
         </p:txBody>
       </p:sp>
@@ -2207,7 +2211,7 @@
         <p:nvSpPr>
           <p:cNvPr id="3" name="Picture Placeholder 2"/>
           <p:cNvSpPr>
-            <a:spLocks noGrp="1"/>
+            <a:spLocks noGrp="1" noChangeAspect="1"/>
           </p:cNvSpPr>
           <p:nvPr>
             <p:ph type="pic" idx="1"/>
@@ -2215,52 +2219,56 @@
         </p:nvSpPr>
         <p:spPr>
           <a:xfrm>
-            <a:off x="5183188" y="987425"/>
-            <a:ext cx="6172200" cy="4873625"/>
+            <a:off x="5597573" y="2633138"/>
+            <a:ext cx="6665655" cy="12996333"/>
           </a:xfrm>
         </p:spPr>
         <p:txBody>
-          <a:bodyPr/>
+          <a:bodyPr anchor="t"/>
           <a:lstStyle>
             <a:lvl1pPr marL="0" indent="0">
               <a:buNone/>
-              <a:defRPr sz="3200"/>
+              <a:defRPr sz="4608"/>
             </a:lvl1pPr>
-            <a:lvl2pPr marL="457200" indent="0">
+            <a:lvl2pPr marL="658322" indent="0">
               <a:buNone/>
-              <a:defRPr sz="2800"/>
+              <a:defRPr sz="4032"/>
             </a:lvl2pPr>
-            <a:lvl3pPr marL="914400" indent="0">
+            <a:lvl3pPr marL="1316645" indent="0">
               <a:buNone/>
-              <a:defRPr sz="2400"/>
+              <a:defRPr sz="3456"/>
             </a:lvl3pPr>
-            <a:lvl4pPr marL="1371600" indent="0">
+            <a:lvl4pPr marL="1974967" indent="0">
               <a:buNone/>
-              <a:defRPr sz="2000"/>
+              <a:defRPr sz="2880"/>
             </a:lvl4pPr>
-            <a:lvl5pPr marL="1828800" indent="0">
+            <a:lvl5pPr marL="2633289" indent="0">
               <a:buNone/>
-              <a:defRPr sz="2000"/>
+              <a:defRPr sz="2880"/>
             </a:lvl5pPr>
-            <a:lvl6pPr marL="2286000" indent="0">
+            <a:lvl6pPr marL="3291611" indent="0">
               <a:buNone/>
-              <a:defRPr sz="2000"/>
+              <a:defRPr sz="2880"/>
             </a:lvl6pPr>
-            <a:lvl7pPr marL="2743200" indent="0">
+            <a:lvl7pPr marL="3949934" indent="0">
               <a:buNone/>
-              <a:defRPr sz="2000"/>
+              <a:defRPr sz="2880"/>
             </a:lvl7pPr>
-            <a:lvl8pPr marL="3200400" indent="0">
+            <a:lvl8pPr marL="4608256" indent="0">
               <a:buNone/>
-              <a:defRPr sz="2000"/>
+              <a:defRPr sz="2880"/>
             </a:lvl8pPr>
-            <a:lvl9pPr marL="3657600" indent="0">
+            <a:lvl9pPr marL="5266578" indent="0">
               <a:buNone/>
-              <a:defRPr sz="2000"/>
+              <a:defRPr sz="2880"/>
             </a:lvl9pPr>
           </a:lstStyle>
           <a:p>
-            <a:endParaRPr lang="en-US"/>
+            <a:r>
+              <a:rPr lang="en-US" smtClean="0"/>
+              <a:t>Click icon to add picture</a:t>
+            </a:r>
+            <a:endParaRPr lang="en-US" dirty="0"/>
           </a:p>
         </p:txBody>
       </p:sp>
@@ -2276,8 +2284,8 @@
         </p:nvSpPr>
         <p:spPr>
           <a:xfrm>
-            <a:off x="839788" y="2057400"/>
-            <a:ext cx="3932237" cy="3811588"/>
+            <a:off x="906927" y="5486400"/>
+            <a:ext cx="4246612" cy="10164235"/>
           </a:xfrm>
         </p:spPr>
         <p:txBody>
@@ -2285,39 +2293,39 @@
           <a:lstStyle>
             <a:lvl1pPr marL="0" indent="0">
               <a:buNone/>
-              <a:defRPr sz="1600"/>
+              <a:defRPr sz="2304"/>
             </a:lvl1pPr>
-            <a:lvl2pPr marL="457200" indent="0">
+            <a:lvl2pPr marL="658322" indent="0">
               <a:buNone/>
-              <a:defRPr sz="1400"/>
+              <a:defRPr sz="2016"/>
             </a:lvl2pPr>
-            <a:lvl3pPr marL="914400" indent="0">
+            <a:lvl3pPr marL="1316645" indent="0">
               <a:buNone/>
-              <a:defRPr sz="1200"/>
+              <a:defRPr sz="1728"/>
             </a:lvl3pPr>
-            <a:lvl4pPr marL="1371600" indent="0">
+            <a:lvl4pPr marL="1974967" indent="0">
               <a:buNone/>
-              <a:defRPr sz="1000"/>
+              <a:defRPr sz="1440"/>
             </a:lvl4pPr>
-            <a:lvl5pPr marL="1828800" indent="0">
+            <a:lvl5pPr marL="2633289" indent="0">
               <a:buNone/>
-              <a:defRPr sz="1000"/>
+              <a:defRPr sz="1440"/>
             </a:lvl5pPr>
-            <a:lvl6pPr marL="2286000" indent="0">
+            <a:lvl6pPr marL="3291611" indent="0">
               <a:buNone/>
-              <a:defRPr sz="1000"/>
+              <a:defRPr sz="1440"/>
             </a:lvl6pPr>
-            <a:lvl7pPr marL="2743200" indent="0">
+            <a:lvl7pPr marL="3949934" indent="0">
               <a:buNone/>
-              <a:defRPr sz="1000"/>
+              <a:defRPr sz="1440"/>
             </a:lvl7pPr>
-            <a:lvl8pPr marL="3200400" indent="0">
+            <a:lvl8pPr marL="4608256" indent="0">
               <a:buNone/>
-              <a:defRPr sz="1000"/>
+              <a:defRPr sz="1440"/>
             </a:lvl8pPr>
-            <a:lvl9pPr marL="3657600" indent="0">
+            <a:lvl9pPr marL="5266578" indent="0">
               <a:buNone/>
-              <a:defRPr sz="1000"/>
+              <a:defRPr sz="1440"/>
             </a:lvl9pPr>
           </a:lstStyle>
           <a:p>
@@ -2346,7 +2354,7 @@
           <a:p>
             <a:fld id="{8139C481-9EC5-4675-B559-5AD62287EABD}" type="datetimeFigureOut">
               <a:rPr lang="en-US" smtClean="0"/>
-              <a:t>2/9/2014</a:t>
+              <a:t>2/10/2014</a:t>
             </a:fld>
             <a:endParaRPr lang="en-US"/>
           </a:p>
@@ -2397,7 +2405,7 @@
     </p:spTree>
     <p:extLst>
       <p:ext uri="{BB962C8B-B14F-4D97-AF65-F5344CB8AC3E}">
-        <p14:creationId xmlns:p14="http://schemas.microsoft.com/office/powerpoint/2010/main" val="2364166745"/>
+        <p14:creationId xmlns:p14="http://schemas.microsoft.com/office/powerpoint/2010/main" val="2042542305"/>
       </p:ext>
     </p:extLst>
   </p:cSld>
@@ -2441,8 +2449,8 @@
         </p:nvSpPr>
         <p:spPr>
           <a:xfrm>
-            <a:off x="838200" y="365125"/>
-            <a:ext cx="10515600" cy="1325563"/>
+            <a:off x="905213" y="973671"/>
+            <a:ext cx="11356300" cy="3534835"/>
           </a:xfrm>
           <a:prstGeom prst="rect">
             <a:avLst/>
@@ -2458,7 +2466,7 @@
               <a:rPr lang="en-US" smtClean="0"/>
               <a:t>Click to edit Master title style</a:t>
             </a:r>
-            <a:endParaRPr lang="en-US"/>
+            <a:endParaRPr lang="en-US" dirty="0"/>
           </a:p>
         </p:txBody>
       </p:sp>
@@ -2474,8 +2482,8 @@
         </p:nvSpPr>
         <p:spPr>
           <a:xfrm>
-            <a:off x="838200" y="1825625"/>
-            <a:ext cx="10515600" cy="4351338"/>
+            <a:off x="905213" y="4868333"/>
+            <a:ext cx="11356300" cy="11603568"/>
           </a:xfrm>
           <a:prstGeom prst="rect">
             <a:avLst/>
@@ -2520,7 +2528,7 @@
               <a:rPr lang="en-US" smtClean="0"/>
               <a:t>Fifth level</a:t>
             </a:r>
-            <a:endParaRPr lang="en-US"/>
+            <a:endParaRPr lang="en-US" dirty="0"/>
           </a:p>
         </p:txBody>
       </p:sp>
@@ -2536,8 +2544,8 @@
         </p:nvSpPr>
         <p:spPr>
           <a:xfrm>
-            <a:off x="838200" y="6356350"/>
-            <a:ext cx="2743200" cy="365125"/>
+            <a:off x="905212" y="16950271"/>
+            <a:ext cx="2962513" cy="973667"/>
           </a:xfrm>
           <a:prstGeom prst="rect">
             <a:avLst/>
@@ -2547,7 +2555,7 @@
           <a:bodyPr vert="horz" lIns="91440" tIns="45720" rIns="91440" bIns="45720" rtlCol="0" anchor="ctr"/>
           <a:lstStyle>
             <a:lvl1pPr algn="l">
-              <a:defRPr sz="1200">
+              <a:defRPr sz="1728">
                 <a:solidFill>
                   <a:schemeClr val="tx1">
                     <a:tint val="75000"/>
@@ -2559,7 +2567,7 @@
           <a:p>
             <a:fld id="{8139C481-9EC5-4675-B559-5AD62287EABD}" type="datetimeFigureOut">
               <a:rPr lang="en-US" smtClean="0"/>
-              <a:t>2/9/2014</a:t>
+              <a:t>2/10/2014</a:t>
             </a:fld>
             <a:endParaRPr lang="en-US"/>
           </a:p>
@@ -2577,8 +2585,8 @@
         </p:nvSpPr>
         <p:spPr>
           <a:xfrm>
-            <a:off x="4038600" y="6356350"/>
-            <a:ext cx="4114800" cy="365125"/>
+            <a:off x="4361478" y="16950271"/>
+            <a:ext cx="4443770" cy="973667"/>
           </a:xfrm>
           <a:prstGeom prst="rect">
             <a:avLst/>
@@ -2588,7 +2596,7 @@
           <a:bodyPr vert="horz" lIns="91440" tIns="45720" rIns="91440" bIns="45720" rtlCol="0" anchor="ctr"/>
           <a:lstStyle>
             <a:lvl1pPr algn="ctr">
-              <a:defRPr sz="1200">
+              <a:defRPr sz="1728">
                 <a:solidFill>
                   <a:schemeClr val="tx1">
                     <a:tint val="75000"/>
@@ -2614,8 +2622,8 @@
         </p:nvSpPr>
         <p:spPr>
           <a:xfrm>
-            <a:off x="8610600" y="6356350"/>
-            <a:ext cx="2743200" cy="365125"/>
+            <a:off x="9299000" y="16950271"/>
+            <a:ext cx="2962513" cy="973667"/>
           </a:xfrm>
           <a:prstGeom prst="rect">
             <a:avLst/>
@@ -2625,7 +2633,7 @@
           <a:bodyPr vert="horz" lIns="91440" tIns="45720" rIns="91440" bIns="45720" rtlCol="0" anchor="ctr"/>
           <a:lstStyle>
             <a:lvl1pPr algn="r">
-              <a:defRPr sz="1200">
+              <a:defRPr sz="1728">
                 <a:solidFill>
                   <a:schemeClr val="tx1">
                     <a:tint val="75000"/>
@@ -2646,27 +2654,27 @@
     </p:spTree>
     <p:extLst>
       <p:ext uri="{BB962C8B-B14F-4D97-AF65-F5344CB8AC3E}">
-        <p14:creationId xmlns:p14="http://schemas.microsoft.com/office/powerpoint/2010/main" val="3015788639"/>
+        <p14:creationId xmlns:p14="http://schemas.microsoft.com/office/powerpoint/2010/main" val="630588952"/>
       </p:ext>
     </p:extLst>
   </p:cSld>
   <p:clrMap bg1="lt1" tx1="dk1" bg2="lt2" tx2="dk2" accent1="accent1" accent2="accent2" accent3="accent3" accent4="accent4" accent5="accent5" accent6="accent6" hlink="hlink" folHlink="folHlink"/>
   <p:sldLayoutIdLst>
-    <p:sldLayoutId id="2147483649" r:id="rId1"/>
-    <p:sldLayoutId id="2147483650" r:id="rId2"/>
-    <p:sldLayoutId id="2147483651" r:id="rId3"/>
-    <p:sldLayoutId id="2147483652" r:id="rId4"/>
-    <p:sldLayoutId id="2147483653" r:id="rId5"/>
-    <p:sldLayoutId id="2147483654" r:id="rId6"/>
-    <p:sldLayoutId id="2147483655" r:id="rId7"/>
-    <p:sldLayoutId id="2147483656" r:id="rId8"/>
-    <p:sldLayoutId id="2147483657" r:id="rId9"/>
-    <p:sldLayoutId id="2147483658" r:id="rId10"/>
-    <p:sldLayoutId id="2147483659" r:id="rId11"/>
+    <p:sldLayoutId id="2147483661" r:id="rId1"/>
+    <p:sldLayoutId id="2147483662" r:id="rId2"/>
+    <p:sldLayoutId id="2147483663" r:id="rId3"/>
+    <p:sldLayoutId id="2147483664" r:id="rId4"/>
+    <p:sldLayoutId id="2147483665" r:id="rId5"/>
+    <p:sldLayoutId id="2147483666" r:id="rId6"/>
+    <p:sldLayoutId id="2147483667" r:id="rId7"/>
+    <p:sldLayoutId id="2147483668" r:id="rId8"/>
+    <p:sldLayoutId id="2147483669" r:id="rId9"/>
+    <p:sldLayoutId id="2147483670" r:id="rId10"/>
+    <p:sldLayoutId id="2147483671" r:id="rId11"/>
   </p:sldLayoutIdLst>
   <p:txStyles>
     <p:titleStyle>
-      <a:lvl1pPr algn="l" defTabSz="914400" rtl="0" eaLnBrk="1" latinLnBrk="0" hangingPunct="1">
+      <a:lvl1pPr algn="l" defTabSz="1316645" rtl="0" eaLnBrk="1" latinLnBrk="0" hangingPunct="1">
         <a:lnSpc>
           <a:spcPct val="90000"/>
         </a:lnSpc>
@@ -2674,7 +2682,7 @@
           <a:spcPct val="0"/>
         </a:spcBef>
         <a:buNone/>
-        <a:defRPr sz="4400" kern="1200">
+        <a:defRPr sz="6336" kern="1200">
           <a:solidFill>
             <a:schemeClr val="tx1"/>
           </a:solidFill>
@@ -2685,16 +2693,16 @@
       </a:lvl1pPr>
     </p:titleStyle>
     <p:bodyStyle>
-      <a:lvl1pPr marL="228600" indent="-228600" algn="l" defTabSz="914400" rtl="0" eaLnBrk="1" latinLnBrk="0" hangingPunct="1">
+      <a:lvl1pPr marL="329161" indent="-329161" algn="l" defTabSz="1316645" rtl="0" eaLnBrk="1" latinLnBrk="0" hangingPunct="1">
         <a:lnSpc>
           <a:spcPct val="90000"/>
         </a:lnSpc>
         <a:spcBef>
-          <a:spcPts val="1000"/>
+          <a:spcPts val="1440"/>
         </a:spcBef>
         <a:buFont typeface="Arial" panose="020B0604020202020204" pitchFamily="34" charset="0"/>
         <a:buChar char="•"/>
-        <a:defRPr sz="2800" kern="1200">
+        <a:defRPr sz="4032" kern="1200">
           <a:solidFill>
             <a:schemeClr val="tx1"/>
           </a:solidFill>
@@ -2703,16 +2711,16 @@
           <a:cs typeface="+mn-cs"/>
         </a:defRPr>
       </a:lvl1pPr>
-      <a:lvl2pPr marL="685800" indent="-228600" algn="l" defTabSz="914400" rtl="0" eaLnBrk="1" latinLnBrk="0" hangingPunct="1">
+      <a:lvl2pPr marL="987483" indent="-329161" algn="l" defTabSz="1316645" rtl="0" eaLnBrk="1" latinLnBrk="0" hangingPunct="1">
         <a:lnSpc>
           <a:spcPct val="90000"/>
         </a:lnSpc>
         <a:spcBef>
-          <a:spcPts val="500"/>
+          <a:spcPts val="720"/>
         </a:spcBef>
         <a:buFont typeface="Arial" panose="020B0604020202020204" pitchFamily="34" charset="0"/>
         <a:buChar char="•"/>
-        <a:defRPr sz="2400" kern="1200">
+        <a:defRPr sz="3456" kern="1200">
           <a:solidFill>
             <a:schemeClr val="tx1"/>
           </a:solidFill>
@@ -2721,16 +2729,16 @@
           <a:cs typeface="+mn-cs"/>
         </a:defRPr>
       </a:lvl2pPr>
-      <a:lvl3pPr marL="1143000" indent="-228600" algn="l" defTabSz="914400" rtl="0" eaLnBrk="1" latinLnBrk="0" hangingPunct="1">
+      <a:lvl3pPr marL="1645806" indent="-329161" algn="l" defTabSz="1316645" rtl="0" eaLnBrk="1" latinLnBrk="0" hangingPunct="1">
         <a:lnSpc>
           <a:spcPct val="90000"/>
         </a:lnSpc>
         <a:spcBef>
-          <a:spcPts val="500"/>
+          <a:spcPts val="720"/>
         </a:spcBef>
         <a:buFont typeface="Arial" panose="020B0604020202020204" pitchFamily="34" charset="0"/>
         <a:buChar char="•"/>
-        <a:defRPr sz="2000" kern="1200">
+        <a:defRPr sz="2880" kern="1200">
           <a:solidFill>
             <a:schemeClr val="tx1"/>
           </a:solidFill>
@@ -2739,16 +2747,16 @@
           <a:cs typeface="+mn-cs"/>
         </a:defRPr>
       </a:lvl3pPr>
-      <a:lvl4pPr marL="1600200" indent="-228600" algn="l" defTabSz="914400" rtl="0" eaLnBrk="1" latinLnBrk="0" hangingPunct="1">
+      <a:lvl4pPr marL="2304128" indent="-329161" algn="l" defTabSz="1316645" rtl="0" eaLnBrk="1" latinLnBrk="0" hangingPunct="1">
         <a:lnSpc>
           <a:spcPct val="90000"/>
         </a:lnSpc>
         <a:spcBef>
-          <a:spcPts val="500"/>
+          <a:spcPts val="720"/>
         </a:spcBef>
         <a:buFont typeface="Arial" panose="020B0604020202020204" pitchFamily="34" charset="0"/>
         <a:buChar char="•"/>
-        <a:defRPr sz="1800" kern="1200">
+        <a:defRPr sz="2592" kern="1200">
           <a:solidFill>
             <a:schemeClr val="tx1"/>
           </a:solidFill>
@@ -2757,16 +2765,16 @@
           <a:cs typeface="+mn-cs"/>
         </a:defRPr>
       </a:lvl4pPr>
-      <a:lvl5pPr marL="2057400" indent="-228600" algn="l" defTabSz="914400" rtl="0" eaLnBrk="1" latinLnBrk="0" hangingPunct="1">
+      <a:lvl5pPr marL="2962450" indent="-329161" algn="l" defTabSz="1316645" rtl="0" eaLnBrk="1" latinLnBrk="0" hangingPunct="1">
         <a:lnSpc>
           <a:spcPct val="90000"/>
         </a:lnSpc>
         <a:spcBef>
-          <a:spcPts val="500"/>
+          <a:spcPts val="720"/>
         </a:spcBef>
         <a:buFont typeface="Arial" panose="020B0604020202020204" pitchFamily="34" charset="0"/>
         <a:buChar char="•"/>
-        <a:defRPr sz="1800" kern="1200">
+        <a:defRPr sz="2592" kern="1200">
           <a:solidFill>
             <a:schemeClr val="tx1"/>
           </a:solidFill>
@@ -2775,16 +2783,16 @@
           <a:cs typeface="+mn-cs"/>
         </a:defRPr>
       </a:lvl5pPr>
-      <a:lvl6pPr marL="2514600" indent="-228600" algn="l" defTabSz="914400" rtl="0" eaLnBrk="1" latinLnBrk="0" hangingPunct="1">
+      <a:lvl6pPr marL="3620773" indent="-329161" algn="l" defTabSz="1316645" rtl="0" eaLnBrk="1" latinLnBrk="0" hangingPunct="1">
         <a:lnSpc>
           <a:spcPct val="90000"/>
         </a:lnSpc>
         <a:spcBef>
-          <a:spcPts val="500"/>
+          <a:spcPts val="720"/>
         </a:spcBef>
         <a:buFont typeface="Arial" panose="020B0604020202020204" pitchFamily="34" charset="0"/>
         <a:buChar char="•"/>
-        <a:defRPr sz="1800" kern="1200">
+        <a:defRPr sz="2592" kern="1200">
           <a:solidFill>
             <a:schemeClr val="tx1"/>
           </a:solidFill>
@@ -2793,16 +2801,16 @@
           <a:cs typeface="+mn-cs"/>
         </a:defRPr>
       </a:lvl6pPr>
-      <a:lvl7pPr marL="2971800" indent="-228600" algn="l" defTabSz="914400" rtl="0" eaLnBrk="1" latinLnBrk="0" hangingPunct="1">
+      <a:lvl7pPr marL="4279095" indent="-329161" algn="l" defTabSz="1316645" rtl="0" eaLnBrk="1" latinLnBrk="0" hangingPunct="1">
         <a:lnSpc>
           <a:spcPct val="90000"/>
         </a:lnSpc>
         <a:spcBef>
-          <a:spcPts val="500"/>
+          <a:spcPts val="720"/>
         </a:spcBef>
         <a:buFont typeface="Arial" panose="020B0604020202020204" pitchFamily="34" charset="0"/>
         <a:buChar char="•"/>
-        <a:defRPr sz="1800" kern="1200">
+        <a:defRPr sz="2592" kern="1200">
           <a:solidFill>
             <a:schemeClr val="tx1"/>
           </a:solidFill>
@@ -2811,16 +2819,16 @@
           <a:cs typeface="+mn-cs"/>
         </a:defRPr>
       </a:lvl7pPr>
-      <a:lvl8pPr marL="3429000" indent="-228600" algn="l" defTabSz="914400" rtl="0" eaLnBrk="1" latinLnBrk="0" hangingPunct="1">
+      <a:lvl8pPr marL="4937417" indent="-329161" algn="l" defTabSz="1316645" rtl="0" eaLnBrk="1" latinLnBrk="0" hangingPunct="1">
         <a:lnSpc>
           <a:spcPct val="90000"/>
         </a:lnSpc>
         <a:spcBef>
-          <a:spcPts val="500"/>
+          <a:spcPts val="720"/>
         </a:spcBef>
         <a:buFont typeface="Arial" panose="020B0604020202020204" pitchFamily="34" charset="0"/>
         <a:buChar char="•"/>
-        <a:defRPr sz="1800" kern="1200">
+        <a:defRPr sz="2592" kern="1200">
           <a:solidFill>
             <a:schemeClr val="tx1"/>
           </a:solidFill>
@@ -2829,16 +2837,16 @@
           <a:cs typeface="+mn-cs"/>
         </a:defRPr>
       </a:lvl8pPr>
-      <a:lvl9pPr marL="3886200" indent="-228600" algn="l" defTabSz="914400" rtl="0" eaLnBrk="1" latinLnBrk="0" hangingPunct="1">
+      <a:lvl9pPr marL="5595739" indent="-329161" algn="l" defTabSz="1316645" rtl="0" eaLnBrk="1" latinLnBrk="0" hangingPunct="1">
         <a:lnSpc>
           <a:spcPct val="90000"/>
         </a:lnSpc>
         <a:spcBef>
-          <a:spcPts val="500"/>
+          <a:spcPts val="720"/>
         </a:spcBef>
         <a:buFont typeface="Arial" panose="020B0604020202020204" pitchFamily="34" charset="0"/>
         <a:buChar char="•"/>
-        <a:defRPr sz="1800" kern="1200">
+        <a:defRPr sz="2592" kern="1200">
           <a:solidFill>
             <a:schemeClr val="tx1"/>
           </a:solidFill>
@@ -2852,8 +2860,8 @@
       <a:defPPr>
         <a:defRPr lang="en-US"/>
       </a:defPPr>
-      <a:lvl1pPr marL="0" algn="l" defTabSz="914400" rtl="0" eaLnBrk="1" latinLnBrk="0" hangingPunct="1">
-        <a:defRPr sz="1800" kern="1200">
+      <a:lvl1pPr marL="0" algn="l" defTabSz="1316645" rtl="0" eaLnBrk="1" latinLnBrk="0" hangingPunct="1">
+        <a:defRPr sz="2592" kern="1200">
           <a:solidFill>
             <a:schemeClr val="tx1"/>
           </a:solidFill>
@@ -2862,8 +2870,8 @@
           <a:cs typeface="+mn-cs"/>
         </a:defRPr>
       </a:lvl1pPr>
-      <a:lvl2pPr marL="457200" algn="l" defTabSz="914400" rtl="0" eaLnBrk="1" latinLnBrk="0" hangingPunct="1">
-        <a:defRPr sz="1800" kern="1200">
+      <a:lvl2pPr marL="658322" algn="l" defTabSz="1316645" rtl="0" eaLnBrk="1" latinLnBrk="0" hangingPunct="1">
+        <a:defRPr sz="2592" kern="1200">
           <a:solidFill>
             <a:schemeClr val="tx1"/>
           </a:solidFill>
@@ -2872,8 +2880,8 @@
           <a:cs typeface="+mn-cs"/>
         </a:defRPr>
       </a:lvl2pPr>
-      <a:lvl3pPr marL="914400" algn="l" defTabSz="914400" rtl="0" eaLnBrk="1" latinLnBrk="0" hangingPunct="1">
-        <a:defRPr sz="1800" kern="1200">
+      <a:lvl3pPr marL="1316645" algn="l" defTabSz="1316645" rtl="0" eaLnBrk="1" latinLnBrk="0" hangingPunct="1">
+        <a:defRPr sz="2592" kern="1200">
           <a:solidFill>
             <a:schemeClr val="tx1"/>
           </a:solidFill>
@@ -2882,8 +2890,8 @@
           <a:cs typeface="+mn-cs"/>
         </a:defRPr>
       </a:lvl3pPr>
-      <a:lvl4pPr marL="1371600" algn="l" defTabSz="914400" rtl="0" eaLnBrk="1" latinLnBrk="0" hangingPunct="1">
-        <a:defRPr sz="1800" kern="1200">
+      <a:lvl4pPr marL="1974967" algn="l" defTabSz="1316645" rtl="0" eaLnBrk="1" latinLnBrk="0" hangingPunct="1">
+        <a:defRPr sz="2592" kern="1200">
           <a:solidFill>
             <a:schemeClr val="tx1"/>
           </a:solidFill>
@@ -2892,8 +2900,8 @@
           <a:cs typeface="+mn-cs"/>
         </a:defRPr>
       </a:lvl4pPr>
-      <a:lvl5pPr marL="1828800" algn="l" defTabSz="914400" rtl="0" eaLnBrk="1" latinLnBrk="0" hangingPunct="1">
-        <a:defRPr sz="1800" kern="1200">
+      <a:lvl5pPr marL="2633289" algn="l" defTabSz="1316645" rtl="0" eaLnBrk="1" latinLnBrk="0" hangingPunct="1">
+        <a:defRPr sz="2592" kern="1200">
           <a:solidFill>
             <a:schemeClr val="tx1"/>
           </a:solidFill>
@@ -2902,8 +2910,8 @@
           <a:cs typeface="+mn-cs"/>
         </a:defRPr>
       </a:lvl5pPr>
-      <a:lvl6pPr marL="2286000" algn="l" defTabSz="914400" rtl="0" eaLnBrk="1" latinLnBrk="0" hangingPunct="1">
-        <a:defRPr sz="1800" kern="1200">
+      <a:lvl6pPr marL="3291611" algn="l" defTabSz="1316645" rtl="0" eaLnBrk="1" latinLnBrk="0" hangingPunct="1">
+        <a:defRPr sz="2592" kern="1200">
           <a:solidFill>
             <a:schemeClr val="tx1"/>
           </a:solidFill>
@@ -2912,8 +2920,8 @@
           <a:cs typeface="+mn-cs"/>
         </a:defRPr>
       </a:lvl6pPr>
-      <a:lvl7pPr marL="2743200" algn="l" defTabSz="914400" rtl="0" eaLnBrk="1" latinLnBrk="0" hangingPunct="1">
-        <a:defRPr sz="1800" kern="1200">
+      <a:lvl7pPr marL="3949934" algn="l" defTabSz="1316645" rtl="0" eaLnBrk="1" latinLnBrk="0" hangingPunct="1">
+        <a:defRPr sz="2592" kern="1200">
           <a:solidFill>
             <a:schemeClr val="tx1"/>
           </a:solidFill>
@@ -2922,8 +2930,8 @@
           <a:cs typeface="+mn-cs"/>
         </a:defRPr>
       </a:lvl7pPr>
-      <a:lvl8pPr marL="3200400" algn="l" defTabSz="914400" rtl="0" eaLnBrk="1" latinLnBrk="0" hangingPunct="1">
-        <a:defRPr sz="1800" kern="1200">
+      <a:lvl8pPr marL="4608256" algn="l" defTabSz="1316645" rtl="0" eaLnBrk="1" latinLnBrk="0" hangingPunct="1">
+        <a:defRPr sz="2592" kern="1200">
           <a:solidFill>
             <a:schemeClr val="tx1"/>
           </a:solidFill>
@@ -2932,8 +2940,8 @@
           <a:cs typeface="+mn-cs"/>
         </a:defRPr>
       </a:lvl8pPr>
-      <a:lvl9pPr marL="3657600" algn="l" defTabSz="914400" rtl="0" eaLnBrk="1" latinLnBrk="0" hangingPunct="1">
-        <a:defRPr sz="1800" kern="1200">
+      <a:lvl9pPr marL="5266578" algn="l" defTabSz="1316645" rtl="0" eaLnBrk="1" latinLnBrk="0" hangingPunct="1">
+        <a:defRPr sz="2592" kern="1200">
           <a:solidFill>
             <a:schemeClr val="tx1"/>
           </a:solidFill>
@@ -2972,7 +2980,7 @@
         </p:nvSpPr>
         <p:spPr>
           <a:xfrm>
-            <a:off x="3420533" y="5334000"/>
+            <a:off x="3907895" y="11049000"/>
             <a:ext cx="4927600" cy="1117600"/>
           </a:xfrm>
           <a:prstGeom prst="roundRect">
@@ -3001,7 +3009,7 @@
           <a:p>
             <a:pPr algn="ctr"/>
             <a:r>
-              <a:rPr lang="en-US" sz="3200" dirty="0" smtClean="0"/>
+              <a:rPr lang="en-US" sz="3200" dirty="0"/>
               <a:t>Database (MySQL)</a:t>
             </a:r>
             <a:endParaRPr lang="en-US" sz="3200" dirty="0"/>
@@ -3016,7 +3024,7 @@
         </p:nvCxnSpPr>
         <p:spPr>
           <a:xfrm>
-            <a:off x="711200" y="5063064"/>
+            <a:off x="1198563" y="10778065"/>
             <a:ext cx="10481733" cy="3"/>
           </a:xfrm>
           <a:prstGeom prst="line">
@@ -3049,7 +3057,7 @@
         </p:nvCxnSpPr>
         <p:spPr>
           <a:xfrm>
-            <a:off x="643467" y="1744135"/>
+            <a:off x="1130830" y="7459136"/>
             <a:ext cx="10481733" cy="3"/>
           </a:xfrm>
           <a:prstGeom prst="line">
@@ -3082,7 +3090,7 @@
         </p:nvSpPr>
         <p:spPr>
           <a:xfrm>
-            <a:off x="2827866" y="186268"/>
+            <a:off x="3315228" y="5901268"/>
             <a:ext cx="6248400" cy="1286934"/>
           </a:xfrm>
           <a:prstGeom prst="roundRect">
@@ -3111,7 +3119,7 @@
           <a:p>
             <a:pPr algn="ctr"/>
             <a:r>
-              <a:rPr lang="en-US" sz="3600" dirty="0" smtClean="0"/>
+              <a:rPr lang="en-US" sz="3600" dirty="0"/>
               <a:t>Web Browser</a:t>
             </a:r>
             <a:endParaRPr lang="en-US" sz="3200" dirty="0"/>
@@ -3126,7 +3134,7 @@
         </p:nvSpPr>
         <p:spPr>
           <a:xfrm>
-            <a:off x="1557866" y="2175934"/>
+            <a:off x="2045228" y="7890935"/>
             <a:ext cx="1320800" cy="2455333"/>
           </a:xfrm>
           <a:prstGeom prst="leftBrace">
@@ -3164,7 +3172,7 @@
         </p:nvSpPr>
         <p:spPr>
           <a:xfrm>
-            <a:off x="3268132" y="2175934"/>
+            <a:off x="3755495" y="7890934"/>
             <a:ext cx="2370667" cy="1058338"/>
           </a:xfrm>
           <a:prstGeom prst="rect">
@@ -3193,14 +3201,14 @@
           <a:p>
             <a:pPr algn="ctr"/>
             <a:r>
-              <a:rPr lang="en-US" sz="3600" dirty="0" smtClean="0"/>
+              <a:rPr lang="en-US" sz="3600" dirty="0"/>
               <a:t>Controllers</a:t>
             </a:r>
           </a:p>
           <a:p>
             <a:pPr algn="ctr"/>
             <a:r>
-              <a:rPr lang="en-US" sz="2000" dirty="0" smtClean="0"/>
+              <a:rPr lang="en-US" sz="2000" dirty="0"/>
               <a:t>React to user interaction</a:t>
             </a:r>
           </a:p>
@@ -3214,7 +3222,7 @@
         </p:nvSpPr>
         <p:spPr>
           <a:xfrm>
-            <a:off x="6434665" y="2175934"/>
+            <a:off x="6922028" y="7890934"/>
             <a:ext cx="2370667" cy="1058338"/>
           </a:xfrm>
           <a:prstGeom prst="rect">
@@ -3243,14 +3251,14 @@
           <a:p>
             <a:pPr algn="ctr"/>
             <a:r>
-              <a:rPr lang="en-US" sz="3200" dirty="0" smtClean="0"/>
+              <a:rPr lang="en-US" sz="3200" dirty="0"/>
               <a:t>Views</a:t>
             </a:r>
           </a:p>
           <a:p>
             <a:pPr algn="ctr"/>
             <a:r>
-              <a:rPr lang="en-US" sz="2000" dirty="0" smtClean="0"/>
+              <a:rPr lang="en-US" sz="2000" dirty="0"/>
               <a:t>(webpages)</a:t>
             </a:r>
             <a:endParaRPr lang="en-US" sz="2000" dirty="0"/>
@@ -3265,7 +3273,7 @@
         </p:nvSpPr>
         <p:spPr>
           <a:xfrm>
-            <a:off x="4699000" y="3666068"/>
+            <a:off x="5186363" y="9381068"/>
             <a:ext cx="2370667" cy="965200"/>
           </a:xfrm>
           <a:prstGeom prst="rect">
@@ -3294,14 +3302,14 @@
           <a:p>
             <a:pPr algn="ctr"/>
             <a:r>
-              <a:rPr lang="en-US" sz="3600" dirty="0" smtClean="0"/>
+              <a:rPr lang="en-US" sz="3600" dirty="0"/>
               <a:t>Model</a:t>
             </a:r>
           </a:p>
           <a:p>
             <a:pPr algn="ctr"/>
             <a:r>
-              <a:rPr lang="en-US" sz="2000" dirty="0" smtClean="0"/>
+              <a:rPr lang="en-US" sz="2000" dirty="0"/>
               <a:t>Ruby-Rails classes</a:t>
             </a:r>
             <a:endParaRPr lang="en-US" sz="2000" dirty="0"/>
@@ -3318,7 +3326,7 @@
         </p:nvCxnSpPr>
         <p:spPr>
           <a:xfrm flipV="1">
-            <a:off x="7619999" y="1473202"/>
+            <a:off x="8107361" y="7188202"/>
             <a:ext cx="0" cy="702732"/>
           </a:xfrm>
           <a:prstGeom prst="straightConnector1">
@@ -3353,7 +3361,7 @@
         </p:nvCxnSpPr>
         <p:spPr>
           <a:xfrm>
-            <a:off x="4453465" y="1473202"/>
+            <a:off x="4940828" y="7188202"/>
             <a:ext cx="1" cy="702732"/>
           </a:xfrm>
           <a:prstGeom prst="straightConnector1">
@@ -3389,7 +3397,7 @@
         </p:nvCxnSpPr>
         <p:spPr>
           <a:xfrm>
-            <a:off x="5638799" y="2705103"/>
+            <a:off x="6126161" y="8420103"/>
             <a:ext cx="795866" cy="0"/>
           </a:xfrm>
           <a:prstGeom prst="straightConnector1">
@@ -3425,7 +3433,7 @@
         </p:nvCxnSpPr>
         <p:spPr>
           <a:xfrm flipH="1">
-            <a:off x="7069667" y="3234272"/>
+            <a:off x="7557029" y="8949272"/>
             <a:ext cx="550332" cy="914396"/>
           </a:xfrm>
           <a:prstGeom prst="straightConnector1">
@@ -3468,7 +3476,7 @@
         </p:nvCxnSpPr>
         <p:spPr>
           <a:xfrm flipH="1">
-            <a:off x="5884333" y="4631268"/>
+            <a:off x="6371696" y="10346268"/>
             <a:ext cx="1" cy="702732"/>
           </a:xfrm>
           <a:prstGeom prst="straightConnector1">
@@ -3508,7 +3516,7 @@
         </p:nvSpPr>
         <p:spPr>
           <a:xfrm rot="16200000">
-            <a:off x="-381002" y="3075057"/>
+            <a:off x="106361" y="8790057"/>
             <a:ext cx="3107269" cy="707886"/>
           </a:xfrm>
           <a:prstGeom prst="rect">
@@ -3524,7 +3532,7 @@
           <a:p>
             <a:pPr algn="ctr"/>
             <a:r>
-              <a:rPr lang="en-US" sz="4000" dirty="0" smtClean="0">
+              <a:rPr lang="en-US" sz="4000" dirty="0">
                 <a:ln w="0"/>
                 <a:effectLst>
                   <a:outerShdw blurRad="38100" dist="19050" dir="2700000" algn="tl" rotWithShape="0">
@@ -3536,11 +3544,8 @@
               </a:rPr>
               <a:t>Leaguer Code</a:t>
             </a:r>
-            <a:endParaRPr lang="en-US" sz="4000" b="0" cap="none" spc="0" dirty="0">
+            <a:endParaRPr lang="en-US" sz="4000" dirty="0">
               <a:ln w="0"/>
-              <a:solidFill>
-                <a:schemeClr val="tx1"/>
-              </a:solidFill>
               <a:effectLst>
                 <a:outerShdw blurRad="38100" dist="19050" dir="2700000" algn="tl" rotWithShape="0">
                   <a:schemeClr val="dk1">
@@ -3562,13 +3567,2932 @@
   <p:clrMapOvr>
     <a:masterClrMapping/>
   </p:clrMapOvr>
+  <p:timing>
+    <p:tnLst>
+      <p:par>
+        <p:cTn id="1" dur="indefinite" restart="never" nodeType="tmRoot"/>
+      </p:par>
+    </p:tnLst>
+  </p:timing>
+</p:sld>
+</file>
+
+<file path=ppt/slides/slide2.xml><?xml version="1.0" encoding="utf-8"?>
+<p:sld xmlns:a="http://schemas.openxmlformats.org/drawingml/2006/main" xmlns:r="http://schemas.openxmlformats.org/officeDocument/2006/relationships" xmlns:p="http://schemas.openxmlformats.org/presentationml/2006/main">
+  <p:cSld>
+    <p:spTree>
+      <p:nvGrpSpPr>
+        <p:cNvPr id="1" name=""/>
+        <p:cNvGrpSpPr/>
+        <p:nvPr/>
+      </p:nvGrpSpPr>
+      <p:grpSpPr>
+        <a:xfrm>
+          <a:off x="0" y="0"/>
+          <a:ext cx="0" cy="0"/>
+          <a:chOff x="0" y="0"/>
+          <a:chExt cx="0" cy="0"/>
+        </a:xfrm>
+      </p:grpSpPr>
+      <p:sp>
+        <p:nvSpPr>
+          <p:cNvPr id="97" name="Rectangle 96"/>
+          <p:cNvSpPr/>
+          <p:nvPr/>
+        </p:nvSpPr>
+        <p:spPr>
+          <a:xfrm>
+            <a:off x="344602" y="10083010"/>
+            <a:ext cx="12153371" cy="7503075"/>
+          </a:xfrm>
+          <a:prstGeom prst="rect">
+            <a:avLst/>
+          </a:prstGeom>
+          <a:solidFill>
+            <a:srgbClr val="5B9BD5">
+              <a:alpha val="72157"/>
+            </a:srgbClr>
+          </a:solidFill>
+          <a:ln>
+            <a:noFill/>
+          </a:ln>
+        </p:spPr>
+        <p:style>
+          <a:lnRef idx="2">
+            <a:schemeClr val="accent1">
+              <a:shade val="50000"/>
+            </a:schemeClr>
+          </a:lnRef>
+          <a:fillRef idx="1">
+            <a:schemeClr val="accent1"/>
+          </a:fillRef>
+          <a:effectRef idx="0">
+            <a:schemeClr val="accent1"/>
+          </a:effectRef>
+          <a:fontRef idx="minor">
+            <a:schemeClr val="lt1"/>
+          </a:fontRef>
+        </p:style>
+        <p:txBody>
+          <a:bodyPr rtlCol="0" anchor="ctr"/>
+          <a:lstStyle/>
+          <a:p>
+            <a:pPr algn="ctr"/>
+            <a:endParaRPr lang="en-US"/>
+          </a:p>
+        </p:txBody>
+      </p:sp>
+      <p:sp>
+        <p:nvSpPr>
+          <p:cNvPr id="93" name="Rectangle 92"/>
+          <p:cNvSpPr/>
+          <p:nvPr/>
+        </p:nvSpPr>
+        <p:spPr>
+          <a:xfrm>
+            <a:off x="494014" y="117077"/>
+            <a:ext cx="12153371" cy="7503075"/>
+          </a:xfrm>
+          <a:prstGeom prst="rect">
+            <a:avLst/>
+          </a:prstGeom>
+          <a:solidFill>
+            <a:srgbClr val="5B9BD5">
+              <a:alpha val="72157"/>
+            </a:srgbClr>
+          </a:solidFill>
+          <a:ln>
+            <a:noFill/>
+          </a:ln>
+        </p:spPr>
+        <p:style>
+          <a:lnRef idx="2">
+            <a:schemeClr val="accent1">
+              <a:shade val="50000"/>
+            </a:schemeClr>
+          </a:lnRef>
+          <a:fillRef idx="1">
+            <a:schemeClr val="accent1"/>
+          </a:fillRef>
+          <a:effectRef idx="0">
+            <a:schemeClr val="accent1"/>
+          </a:effectRef>
+          <a:fontRef idx="minor">
+            <a:schemeClr val="lt1"/>
+          </a:fontRef>
+        </p:style>
+        <p:txBody>
+          <a:bodyPr rtlCol="0" anchor="ctr"/>
+          <a:lstStyle/>
+          <a:p>
+            <a:pPr algn="ctr"/>
+            <a:endParaRPr lang="en-US"/>
+          </a:p>
+        </p:txBody>
+      </p:sp>
+      <p:grpSp>
+        <p:nvGrpSpPr>
+          <p:cNvPr id="6" name="Group 5"/>
+          <p:cNvGrpSpPr/>
+          <p:nvPr/>
+        </p:nvGrpSpPr>
+        <p:grpSpPr>
+          <a:xfrm>
+            <a:off x="974799" y="10712839"/>
+            <a:ext cx="1540934" cy="1524000"/>
+            <a:chOff x="2658533" y="220133"/>
+            <a:chExt cx="1540934" cy="1524000"/>
+          </a:xfrm>
+        </p:grpSpPr>
+        <p:sp>
+          <p:nvSpPr>
+            <p:cNvPr id="4" name="Rectangle 3"/>
+            <p:cNvSpPr/>
+            <p:nvPr/>
+          </p:nvSpPr>
+          <p:spPr>
+            <a:xfrm>
+              <a:off x="2658533" y="220133"/>
+              <a:ext cx="1540934" cy="423334"/>
+            </a:xfrm>
+            <a:prstGeom prst="rect">
+              <a:avLst/>
+            </a:prstGeom>
+          </p:spPr>
+          <p:style>
+            <a:lnRef idx="2">
+              <a:schemeClr val="dk1"/>
+            </a:lnRef>
+            <a:fillRef idx="1">
+              <a:schemeClr val="lt1"/>
+            </a:fillRef>
+            <a:effectRef idx="0">
+              <a:schemeClr val="dk1"/>
+            </a:effectRef>
+            <a:fontRef idx="minor">
+              <a:schemeClr val="dk1"/>
+            </a:fontRef>
+          </p:style>
+          <p:txBody>
+            <a:bodyPr rot="0" spcFirstLastPara="0" vertOverflow="overflow" horzOverflow="overflow" vert="horz" wrap="square" lIns="91440" tIns="45720" rIns="91440" bIns="45720" numCol="1" spcCol="0" rtlCol="0" fromWordArt="0" anchor="ctr" anchorCtr="0" forceAA="0" compatLnSpc="1">
+              <a:prstTxWarp prst="textNoShape">
+                <a:avLst/>
+              </a:prstTxWarp>
+              <a:noAutofit/>
+            </a:bodyPr>
+            <a:lstStyle/>
+            <a:p>
+              <a:pPr algn="ctr"/>
+              <a:r>
+                <a:rPr lang="en-US" sz="1800" dirty="0"/>
+                <a:t>Server</a:t>
+              </a:r>
+            </a:p>
+          </p:txBody>
+        </p:sp>
+        <p:sp>
+          <p:nvSpPr>
+            <p:cNvPr id="5" name="Rectangle 4"/>
+            <p:cNvSpPr/>
+            <p:nvPr/>
+          </p:nvSpPr>
+          <p:spPr>
+            <a:xfrm>
+              <a:off x="2658533" y="643467"/>
+              <a:ext cx="1540934" cy="1100666"/>
+            </a:xfrm>
+            <a:prstGeom prst="rect">
+              <a:avLst/>
+            </a:prstGeom>
+          </p:spPr>
+          <p:style>
+            <a:lnRef idx="2">
+              <a:schemeClr val="dk1"/>
+            </a:lnRef>
+            <a:fillRef idx="1">
+              <a:schemeClr val="lt1"/>
+            </a:fillRef>
+            <a:effectRef idx="0">
+              <a:schemeClr val="dk1"/>
+            </a:effectRef>
+            <a:fontRef idx="minor">
+              <a:schemeClr val="dk1"/>
+            </a:fontRef>
+          </p:style>
+          <p:txBody>
+            <a:bodyPr rot="0" spcFirstLastPara="0" vertOverflow="overflow" horzOverflow="overflow" vert="horz" wrap="square" lIns="91440" tIns="45720" rIns="91440" bIns="45720" numCol="1" spcCol="0" rtlCol="0" fromWordArt="0" anchor="ctr" anchorCtr="0" forceAA="0" compatLnSpc="1">
+              <a:prstTxWarp prst="textNoShape">
+                <a:avLst/>
+              </a:prstTxWarp>
+              <a:noAutofit/>
+            </a:bodyPr>
+            <a:lstStyle/>
+            <a:p>
+              <a:pPr algn="ctr"/>
+              <a:r>
+                <a:rPr lang="en-US" sz="1800" dirty="0"/>
+                <a:t>built into rails</a:t>
+              </a:r>
+            </a:p>
+          </p:txBody>
+        </p:sp>
+      </p:grpSp>
+      <p:grpSp>
+        <p:nvGrpSpPr>
+          <p:cNvPr id="7" name="Group 6"/>
+          <p:cNvGrpSpPr/>
+          <p:nvPr/>
+        </p:nvGrpSpPr>
+        <p:grpSpPr>
+          <a:xfrm>
+            <a:off x="6715714" y="14013544"/>
+            <a:ext cx="2150534" cy="2116666"/>
+            <a:chOff x="2658533" y="220133"/>
+            <a:chExt cx="1811868" cy="2116666"/>
+          </a:xfrm>
+        </p:grpSpPr>
+        <p:sp>
+          <p:nvSpPr>
+            <p:cNvPr id="8" name="Rectangle 7"/>
+            <p:cNvSpPr/>
+            <p:nvPr/>
+          </p:nvSpPr>
+          <p:spPr>
+            <a:xfrm>
+              <a:off x="2658533" y="220133"/>
+              <a:ext cx="1811868" cy="423334"/>
+            </a:xfrm>
+            <a:prstGeom prst="rect">
+              <a:avLst/>
+            </a:prstGeom>
+          </p:spPr>
+          <p:style>
+            <a:lnRef idx="2">
+              <a:schemeClr val="dk1"/>
+            </a:lnRef>
+            <a:fillRef idx="1">
+              <a:schemeClr val="lt1"/>
+            </a:fillRef>
+            <a:effectRef idx="0">
+              <a:schemeClr val="dk1"/>
+            </a:effectRef>
+            <a:fontRef idx="minor">
+              <a:schemeClr val="dk1"/>
+            </a:fontRef>
+          </p:style>
+          <p:txBody>
+            <a:bodyPr rot="0" spcFirstLastPara="0" vertOverflow="overflow" horzOverflow="overflow" vert="horz" wrap="square" lIns="91440" tIns="45720" rIns="91440" bIns="45720" numCol="1" spcCol="0" rtlCol="0" fromWordArt="0" anchor="ctr" anchorCtr="0" forceAA="0" compatLnSpc="1">
+              <a:prstTxWarp prst="textNoShape">
+                <a:avLst/>
+              </a:prstTxWarp>
+              <a:noAutofit/>
+            </a:bodyPr>
+            <a:lstStyle/>
+            <a:p>
+              <a:pPr algn="ctr"/>
+              <a:r>
+                <a:rPr lang="en-US" sz="1800" dirty="0"/>
+                <a:t>User</a:t>
+              </a:r>
+            </a:p>
+          </p:txBody>
+        </p:sp>
+        <p:sp>
+          <p:nvSpPr>
+            <p:cNvPr id="9" name="Rectangle 8"/>
+            <p:cNvSpPr/>
+            <p:nvPr/>
+          </p:nvSpPr>
+          <p:spPr>
+            <a:xfrm>
+              <a:off x="2658533" y="643467"/>
+              <a:ext cx="1811868" cy="1693332"/>
+            </a:xfrm>
+            <a:prstGeom prst="rect">
+              <a:avLst/>
+            </a:prstGeom>
+          </p:spPr>
+          <p:style>
+            <a:lnRef idx="2">
+              <a:schemeClr val="dk1"/>
+            </a:lnRef>
+            <a:fillRef idx="1">
+              <a:schemeClr val="lt1"/>
+            </a:fillRef>
+            <a:effectRef idx="0">
+              <a:schemeClr val="dk1"/>
+            </a:effectRef>
+            <a:fontRef idx="minor">
+              <a:schemeClr val="dk1"/>
+            </a:fontRef>
+          </p:style>
+          <p:txBody>
+            <a:bodyPr rot="0" spcFirstLastPara="0" vertOverflow="overflow" horzOverflow="overflow" vert="horz" wrap="square" lIns="91440" tIns="45720" rIns="91440" bIns="45720" numCol="1" spcCol="0" rtlCol="0" fromWordArt="0" anchor="ctr" anchorCtr="0" forceAA="0" compatLnSpc="1">
+              <a:prstTxWarp prst="textNoShape">
+                <a:avLst/>
+              </a:prstTxWarp>
+              <a:noAutofit/>
+            </a:bodyPr>
+            <a:lstStyle/>
+            <a:p>
+              <a:pPr marL="285750" indent="-285750">
+                <a:buFont typeface="Arial" panose="020B0604020202020204" pitchFamily="34" charset="0"/>
+                <a:buChar char="•"/>
+              </a:pPr>
+              <a:r>
+                <a:rPr lang="en-US" sz="1800" dirty="0"/>
+                <a:t>role</a:t>
+              </a:r>
+            </a:p>
+            <a:p>
+              <a:pPr marL="285750" indent="-285750">
+                <a:buFont typeface="Arial" panose="020B0604020202020204" pitchFamily="34" charset="0"/>
+                <a:buChar char="•"/>
+              </a:pPr>
+              <a:r>
+                <a:rPr lang="en-US" sz="1800" dirty="0"/>
+                <a:t>username</a:t>
+              </a:r>
+            </a:p>
+            <a:p>
+              <a:pPr marL="285750" indent="-285750">
+                <a:buFont typeface="Arial" panose="020B0604020202020204" pitchFamily="34" charset="0"/>
+                <a:buChar char="•"/>
+              </a:pPr>
+              <a:r>
+                <a:rPr lang="en-US" sz="1800" dirty="0"/>
+                <a:t>password</a:t>
+              </a:r>
+            </a:p>
+            <a:p>
+              <a:pPr marL="285750" indent="-285750">
+                <a:buFont typeface="Arial" panose="020B0604020202020204" pitchFamily="34" charset="0"/>
+                <a:buChar char="•"/>
+              </a:pPr>
+              <a:r>
+                <a:rPr lang="en-US" sz="1800" dirty="0"/>
+                <a:t>email</a:t>
+              </a:r>
+            </a:p>
+            <a:p>
+              <a:pPr marL="285750" indent="-285750">
+                <a:buFont typeface="Arial" panose="020B0604020202020204" pitchFamily="34" charset="0"/>
+                <a:buChar char="•"/>
+              </a:pPr>
+              <a:r>
+                <a:rPr lang="en-US" sz="1800" dirty="0"/>
+                <a:t>[non-essentials]</a:t>
+              </a:r>
+            </a:p>
+          </p:txBody>
+        </p:sp>
+      </p:grpSp>
+      <p:cxnSp>
+        <p:nvCxnSpPr>
+          <p:cNvPr id="15" name="Straight Connector 14"/>
+          <p:cNvCxnSpPr>
+            <a:endCxn id="17" idx="3"/>
+          </p:cNvCxnSpPr>
+          <p:nvPr/>
+        </p:nvCxnSpPr>
+        <p:spPr>
+          <a:xfrm flipH="1" flipV="1">
+            <a:off x="4377796" y="14678178"/>
+            <a:ext cx="2337917" cy="41538"/>
+          </a:xfrm>
+          <a:prstGeom prst="line">
+            <a:avLst/>
+          </a:prstGeom>
+        </p:spPr>
+        <p:style>
+          <a:lnRef idx="3">
+            <a:schemeClr val="dk1"/>
+          </a:lnRef>
+          <a:fillRef idx="0">
+            <a:schemeClr val="dk1"/>
+          </a:fillRef>
+          <a:effectRef idx="2">
+            <a:schemeClr val="dk1"/>
+          </a:effectRef>
+          <a:fontRef idx="minor">
+            <a:schemeClr val="tx1"/>
+          </a:fontRef>
+        </p:style>
+      </p:cxnSp>
+      <p:grpSp>
+        <p:nvGrpSpPr>
+          <p:cNvPr id="16" name="Group 15"/>
+          <p:cNvGrpSpPr/>
+          <p:nvPr/>
+        </p:nvGrpSpPr>
+        <p:grpSpPr>
+          <a:xfrm>
+            <a:off x="2057929" y="14479212"/>
+            <a:ext cx="2319867" cy="787399"/>
+            <a:chOff x="2658533" y="220130"/>
+            <a:chExt cx="1811868" cy="2116669"/>
+          </a:xfrm>
+        </p:grpSpPr>
+        <p:sp>
+          <p:nvSpPr>
+            <p:cNvPr id="17" name="Rectangle 16"/>
+            <p:cNvSpPr/>
+            <p:nvPr/>
+          </p:nvSpPr>
+          <p:spPr>
+            <a:xfrm>
+              <a:off x="2658533" y="220130"/>
+              <a:ext cx="1811868" cy="1069709"/>
+            </a:xfrm>
+            <a:prstGeom prst="rect">
+              <a:avLst/>
+            </a:prstGeom>
+          </p:spPr>
+          <p:style>
+            <a:lnRef idx="2">
+              <a:schemeClr val="dk1"/>
+            </a:lnRef>
+            <a:fillRef idx="1">
+              <a:schemeClr val="lt1"/>
+            </a:fillRef>
+            <a:effectRef idx="0">
+              <a:schemeClr val="dk1"/>
+            </a:effectRef>
+            <a:fontRef idx="minor">
+              <a:schemeClr val="dk1"/>
+            </a:fontRef>
+          </p:style>
+          <p:txBody>
+            <a:bodyPr rot="0" spcFirstLastPara="0" vertOverflow="overflow" horzOverflow="overflow" vert="horz" wrap="square" lIns="91440" tIns="45720" rIns="91440" bIns="45720" numCol="1" spcCol="0" rtlCol="0" fromWordArt="0" anchor="ctr" anchorCtr="0" forceAA="0" compatLnSpc="1">
+              <a:prstTxWarp prst="textNoShape">
+                <a:avLst/>
+              </a:prstTxWarp>
+              <a:noAutofit/>
+            </a:bodyPr>
+            <a:lstStyle/>
+            <a:p>
+              <a:pPr algn="ctr"/>
+              <a:r>
+                <a:rPr lang="en-US" sz="1800" dirty="0" err="1"/>
+                <a:t>AbstractRole</a:t>
+              </a:r>
+              <a:endParaRPr lang="en-US" sz="1800" dirty="0"/>
+            </a:p>
+          </p:txBody>
+        </p:sp>
+        <p:sp>
+          <p:nvSpPr>
+            <p:cNvPr id="18" name="Rectangle 17"/>
+            <p:cNvSpPr/>
+            <p:nvPr/>
+          </p:nvSpPr>
+          <p:spPr>
+            <a:xfrm>
+              <a:off x="2658533" y="1289840"/>
+              <a:ext cx="1811868" cy="1046959"/>
+            </a:xfrm>
+            <a:prstGeom prst="rect">
+              <a:avLst/>
+            </a:prstGeom>
+          </p:spPr>
+          <p:style>
+            <a:lnRef idx="2">
+              <a:schemeClr val="dk1"/>
+            </a:lnRef>
+            <a:fillRef idx="1">
+              <a:schemeClr val="lt1"/>
+            </a:fillRef>
+            <a:effectRef idx="0">
+              <a:schemeClr val="dk1"/>
+            </a:effectRef>
+            <a:fontRef idx="minor">
+              <a:schemeClr val="dk1"/>
+            </a:fontRef>
+          </p:style>
+          <p:txBody>
+            <a:bodyPr rot="0" spcFirstLastPara="0" vertOverflow="overflow" horzOverflow="overflow" vert="horz" wrap="square" lIns="91440" tIns="45720" rIns="91440" bIns="45720" numCol="1" spcCol="0" rtlCol="0" fromWordArt="0" anchor="ctr" anchorCtr="0" forceAA="0" compatLnSpc="1">
+              <a:prstTxWarp prst="textNoShape">
+                <a:avLst/>
+              </a:prstTxWarp>
+              <a:noAutofit/>
+            </a:bodyPr>
+            <a:lstStyle/>
+            <a:p>
+              <a:pPr marL="285750" indent="-285750">
+                <a:buFont typeface="Arial" panose="020B0604020202020204" pitchFamily="34" charset="0"/>
+                <a:buChar char="•"/>
+              </a:pPr>
+              <a:r>
+                <a:rPr lang="en-US" sz="1800" dirty="0"/>
+                <a:t>role</a:t>
+              </a:r>
+            </a:p>
+          </p:txBody>
+        </p:sp>
+      </p:grpSp>
+      <p:grpSp>
+        <p:nvGrpSpPr>
+          <p:cNvPr id="19" name="Group 18"/>
+          <p:cNvGrpSpPr/>
+          <p:nvPr/>
+        </p:nvGrpSpPr>
+        <p:grpSpPr>
+          <a:xfrm>
+            <a:off x="2341562" y="15770377"/>
+            <a:ext cx="1752600" cy="787399"/>
+            <a:chOff x="2658533" y="220130"/>
+            <a:chExt cx="1811868" cy="2116669"/>
+          </a:xfrm>
+        </p:grpSpPr>
+        <p:sp>
+          <p:nvSpPr>
+            <p:cNvPr id="20" name="Rectangle 19"/>
+            <p:cNvSpPr/>
+            <p:nvPr/>
+          </p:nvSpPr>
+          <p:spPr>
+            <a:xfrm>
+              <a:off x="2658533" y="220130"/>
+              <a:ext cx="1811868" cy="1069710"/>
+            </a:xfrm>
+            <a:prstGeom prst="rect">
+              <a:avLst/>
+            </a:prstGeom>
+          </p:spPr>
+          <p:style>
+            <a:lnRef idx="2">
+              <a:schemeClr val="dk1"/>
+            </a:lnRef>
+            <a:fillRef idx="1">
+              <a:schemeClr val="lt1"/>
+            </a:fillRef>
+            <a:effectRef idx="0">
+              <a:schemeClr val="dk1"/>
+            </a:effectRef>
+            <a:fontRef idx="minor">
+              <a:schemeClr val="dk1"/>
+            </a:fontRef>
+          </p:style>
+          <p:txBody>
+            <a:bodyPr rot="0" spcFirstLastPara="0" vertOverflow="overflow" horzOverflow="overflow" vert="horz" wrap="square" lIns="91440" tIns="45720" rIns="91440" bIns="45720" numCol="1" spcCol="0" rtlCol="0" fromWordArt="0" anchor="ctr" anchorCtr="0" forceAA="0" compatLnSpc="1">
+              <a:prstTxWarp prst="textNoShape">
+                <a:avLst/>
+              </a:prstTxWarp>
+              <a:noAutofit/>
+            </a:bodyPr>
+            <a:lstStyle/>
+            <a:p>
+              <a:pPr algn="ctr"/>
+              <a:r>
+                <a:rPr lang="en-US" sz="1800" dirty="0"/>
+                <a:t>Player</a:t>
+              </a:r>
+            </a:p>
+          </p:txBody>
+        </p:sp>
+        <p:sp>
+          <p:nvSpPr>
+            <p:cNvPr id="21" name="Rectangle 20"/>
+            <p:cNvSpPr/>
+            <p:nvPr/>
+          </p:nvSpPr>
+          <p:spPr>
+            <a:xfrm>
+              <a:off x="2658533" y="1289840"/>
+              <a:ext cx="1811868" cy="1046959"/>
+            </a:xfrm>
+            <a:prstGeom prst="rect">
+              <a:avLst/>
+            </a:prstGeom>
+          </p:spPr>
+          <p:style>
+            <a:lnRef idx="2">
+              <a:schemeClr val="dk1"/>
+            </a:lnRef>
+            <a:fillRef idx="1">
+              <a:schemeClr val="lt1"/>
+            </a:fillRef>
+            <a:effectRef idx="0">
+              <a:schemeClr val="dk1"/>
+            </a:effectRef>
+            <a:fontRef idx="minor">
+              <a:schemeClr val="dk1"/>
+            </a:fontRef>
+          </p:style>
+          <p:txBody>
+            <a:bodyPr rot="0" spcFirstLastPara="0" vertOverflow="overflow" horzOverflow="overflow" vert="horz" wrap="square" lIns="91440" tIns="45720" rIns="91440" bIns="45720" numCol="1" spcCol="0" rtlCol="0" fromWordArt="0" anchor="ctr" anchorCtr="0" forceAA="0" compatLnSpc="1">
+              <a:prstTxWarp prst="textNoShape">
+                <a:avLst/>
+              </a:prstTxWarp>
+              <a:noAutofit/>
+            </a:bodyPr>
+            <a:lstStyle/>
+            <a:p>
+              <a:pPr marL="285750" indent="-285750">
+                <a:buFont typeface="Arial" panose="020B0604020202020204" pitchFamily="34" charset="0"/>
+                <a:buChar char="•"/>
+              </a:pPr>
+              <a:r>
+                <a:rPr lang="en-US" sz="1800" dirty="0"/>
+                <a:t>role</a:t>
+              </a:r>
+            </a:p>
+          </p:txBody>
+        </p:sp>
+      </p:grpSp>
+      <p:grpSp>
+        <p:nvGrpSpPr>
+          <p:cNvPr id="22" name="Group 21"/>
+          <p:cNvGrpSpPr/>
+          <p:nvPr/>
+        </p:nvGrpSpPr>
+        <p:grpSpPr>
+          <a:xfrm>
+            <a:off x="4187296" y="15770377"/>
+            <a:ext cx="1752600" cy="787399"/>
+            <a:chOff x="2658533" y="220130"/>
+            <a:chExt cx="1811868" cy="2116669"/>
+          </a:xfrm>
+        </p:grpSpPr>
+        <p:sp>
+          <p:nvSpPr>
+            <p:cNvPr id="23" name="Rectangle 22"/>
+            <p:cNvSpPr/>
+            <p:nvPr/>
+          </p:nvSpPr>
+          <p:spPr>
+            <a:xfrm>
+              <a:off x="2658533" y="220130"/>
+              <a:ext cx="1811868" cy="1069709"/>
+            </a:xfrm>
+            <a:prstGeom prst="rect">
+              <a:avLst/>
+            </a:prstGeom>
+          </p:spPr>
+          <p:style>
+            <a:lnRef idx="2">
+              <a:schemeClr val="dk1"/>
+            </a:lnRef>
+            <a:fillRef idx="1">
+              <a:schemeClr val="lt1"/>
+            </a:fillRef>
+            <a:effectRef idx="0">
+              <a:schemeClr val="dk1"/>
+            </a:effectRef>
+            <a:fontRef idx="minor">
+              <a:schemeClr val="dk1"/>
+            </a:fontRef>
+          </p:style>
+          <p:txBody>
+            <a:bodyPr rot="0" spcFirstLastPara="0" vertOverflow="overflow" horzOverflow="overflow" vert="horz" wrap="square" lIns="91440" tIns="45720" rIns="91440" bIns="45720" numCol="1" spcCol="0" rtlCol="0" fromWordArt="0" anchor="ctr" anchorCtr="0" forceAA="0" compatLnSpc="1">
+              <a:prstTxWarp prst="textNoShape">
+                <a:avLst/>
+              </a:prstTxWarp>
+              <a:noAutofit/>
+            </a:bodyPr>
+            <a:lstStyle/>
+            <a:p>
+              <a:pPr algn="ctr"/>
+              <a:r>
+                <a:rPr lang="en-US" sz="1800" dirty="0"/>
+                <a:t>Spectator</a:t>
+              </a:r>
+            </a:p>
+          </p:txBody>
+        </p:sp>
+        <p:sp>
+          <p:nvSpPr>
+            <p:cNvPr id="24" name="Rectangle 23"/>
+            <p:cNvSpPr/>
+            <p:nvPr/>
+          </p:nvSpPr>
+          <p:spPr>
+            <a:xfrm>
+              <a:off x="2658533" y="1289840"/>
+              <a:ext cx="1811868" cy="1046959"/>
+            </a:xfrm>
+            <a:prstGeom prst="rect">
+              <a:avLst/>
+            </a:prstGeom>
+          </p:spPr>
+          <p:style>
+            <a:lnRef idx="2">
+              <a:schemeClr val="dk1"/>
+            </a:lnRef>
+            <a:fillRef idx="1">
+              <a:schemeClr val="lt1"/>
+            </a:fillRef>
+            <a:effectRef idx="0">
+              <a:schemeClr val="dk1"/>
+            </a:effectRef>
+            <a:fontRef idx="minor">
+              <a:schemeClr val="dk1"/>
+            </a:fontRef>
+          </p:style>
+          <p:txBody>
+            <a:bodyPr rot="0" spcFirstLastPara="0" vertOverflow="overflow" horzOverflow="overflow" vert="horz" wrap="square" lIns="91440" tIns="45720" rIns="91440" bIns="45720" numCol="1" spcCol="0" rtlCol="0" fromWordArt="0" anchor="ctr" anchorCtr="0" forceAA="0" compatLnSpc="1">
+              <a:prstTxWarp prst="textNoShape">
+                <a:avLst/>
+              </a:prstTxWarp>
+              <a:noAutofit/>
+            </a:bodyPr>
+            <a:lstStyle/>
+            <a:p>
+              <a:pPr marL="285750" indent="-285750">
+                <a:buFont typeface="Arial" panose="020B0604020202020204" pitchFamily="34" charset="0"/>
+                <a:buChar char="•"/>
+              </a:pPr>
+              <a:r>
+                <a:rPr lang="en-US" sz="1800" dirty="0"/>
+                <a:t>role</a:t>
+              </a:r>
+            </a:p>
+          </p:txBody>
+        </p:sp>
+      </p:grpSp>
+      <p:grpSp>
+        <p:nvGrpSpPr>
+          <p:cNvPr id="25" name="Group 24"/>
+          <p:cNvGrpSpPr/>
+          <p:nvPr/>
+        </p:nvGrpSpPr>
+        <p:grpSpPr>
+          <a:xfrm>
+            <a:off x="495829" y="15770377"/>
+            <a:ext cx="1752600" cy="787399"/>
+            <a:chOff x="2658533" y="220130"/>
+            <a:chExt cx="1811868" cy="2116669"/>
+          </a:xfrm>
+        </p:grpSpPr>
+        <p:sp>
+          <p:nvSpPr>
+            <p:cNvPr id="26" name="Rectangle 25"/>
+            <p:cNvSpPr/>
+            <p:nvPr/>
+          </p:nvSpPr>
+          <p:spPr>
+            <a:xfrm>
+              <a:off x="2658533" y="220130"/>
+              <a:ext cx="1811868" cy="1069709"/>
+            </a:xfrm>
+            <a:prstGeom prst="rect">
+              <a:avLst/>
+            </a:prstGeom>
+          </p:spPr>
+          <p:style>
+            <a:lnRef idx="2">
+              <a:schemeClr val="dk1"/>
+            </a:lnRef>
+            <a:fillRef idx="1">
+              <a:schemeClr val="lt1"/>
+            </a:fillRef>
+            <a:effectRef idx="0">
+              <a:schemeClr val="dk1"/>
+            </a:effectRef>
+            <a:fontRef idx="minor">
+              <a:schemeClr val="dk1"/>
+            </a:fontRef>
+          </p:style>
+          <p:txBody>
+            <a:bodyPr rot="0" spcFirstLastPara="0" vertOverflow="overflow" horzOverflow="overflow" vert="horz" wrap="square" lIns="91440" tIns="45720" rIns="91440" bIns="45720" numCol="1" spcCol="0" rtlCol="0" fromWordArt="0" anchor="ctr" anchorCtr="0" forceAA="0" compatLnSpc="1">
+              <a:prstTxWarp prst="textNoShape">
+                <a:avLst/>
+              </a:prstTxWarp>
+              <a:noAutofit/>
+            </a:bodyPr>
+            <a:lstStyle/>
+            <a:p>
+              <a:pPr algn="ctr"/>
+              <a:r>
+                <a:rPr lang="en-US" sz="1800" dirty="0"/>
+                <a:t>Host</a:t>
+              </a:r>
+            </a:p>
+          </p:txBody>
+        </p:sp>
+        <p:sp>
+          <p:nvSpPr>
+            <p:cNvPr id="27" name="Rectangle 26"/>
+            <p:cNvSpPr/>
+            <p:nvPr/>
+          </p:nvSpPr>
+          <p:spPr>
+            <a:xfrm>
+              <a:off x="2658533" y="1289840"/>
+              <a:ext cx="1811868" cy="1046959"/>
+            </a:xfrm>
+            <a:prstGeom prst="rect">
+              <a:avLst/>
+            </a:prstGeom>
+          </p:spPr>
+          <p:style>
+            <a:lnRef idx="2">
+              <a:schemeClr val="dk1"/>
+            </a:lnRef>
+            <a:fillRef idx="1">
+              <a:schemeClr val="lt1"/>
+            </a:fillRef>
+            <a:effectRef idx="0">
+              <a:schemeClr val="dk1"/>
+            </a:effectRef>
+            <a:fontRef idx="minor">
+              <a:schemeClr val="dk1"/>
+            </a:fontRef>
+          </p:style>
+          <p:txBody>
+            <a:bodyPr rot="0" spcFirstLastPara="0" vertOverflow="overflow" horzOverflow="overflow" vert="horz" wrap="square" lIns="91440" tIns="45720" rIns="91440" bIns="45720" numCol="1" spcCol="0" rtlCol="0" fromWordArt="0" anchor="ctr" anchorCtr="0" forceAA="0" compatLnSpc="1">
+              <a:prstTxWarp prst="textNoShape">
+                <a:avLst/>
+              </a:prstTxWarp>
+              <a:noAutofit/>
+            </a:bodyPr>
+            <a:lstStyle/>
+            <a:p>
+              <a:pPr marL="285750" indent="-285750">
+                <a:buFont typeface="Arial" panose="020B0604020202020204" pitchFamily="34" charset="0"/>
+                <a:buChar char="•"/>
+              </a:pPr>
+              <a:r>
+                <a:rPr lang="en-US" sz="1800" dirty="0"/>
+                <a:t>role</a:t>
+              </a:r>
+            </a:p>
+          </p:txBody>
+        </p:sp>
+      </p:grpSp>
+      <p:cxnSp>
+        <p:nvCxnSpPr>
+          <p:cNvPr id="29" name="Straight Connector 28"/>
+          <p:cNvCxnSpPr>
+            <a:stCxn id="18" idx="2"/>
+            <a:endCxn id="20" idx="0"/>
+          </p:cNvCxnSpPr>
+          <p:nvPr/>
+        </p:nvCxnSpPr>
+        <p:spPr>
+          <a:xfrm>
+            <a:off x="3217862" y="15266610"/>
+            <a:ext cx="0" cy="503766"/>
+          </a:xfrm>
+          <a:prstGeom prst="line">
+            <a:avLst/>
+          </a:prstGeom>
+        </p:spPr>
+        <p:style>
+          <a:lnRef idx="3">
+            <a:schemeClr val="dk1"/>
+          </a:lnRef>
+          <a:fillRef idx="0">
+            <a:schemeClr val="dk1"/>
+          </a:fillRef>
+          <a:effectRef idx="2">
+            <a:schemeClr val="dk1"/>
+          </a:effectRef>
+          <a:fontRef idx="minor">
+            <a:schemeClr val="tx1"/>
+          </a:fontRef>
+        </p:style>
+      </p:cxnSp>
+      <p:cxnSp>
+        <p:nvCxnSpPr>
+          <p:cNvPr id="30" name="Straight Connector 29"/>
+          <p:cNvCxnSpPr/>
+          <p:nvPr/>
+        </p:nvCxnSpPr>
+        <p:spPr>
+          <a:xfrm>
+            <a:off x="1372130" y="15499444"/>
+            <a:ext cx="3691467" cy="0"/>
+          </a:xfrm>
+          <a:prstGeom prst="line">
+            <a:avLst/>
+          </a:prstGeom>
+        </p:spPr>
+        <p:style>
+          <a:lnRef idx="3">
+            <a:schemeClr val="dk1"/>
+          </a:lnRef>
+          <a:fillRef idx="0">
+            <a:schemeClr val="dk1"/>
+          </a:fillRef>
+          <a:effectRef idx="2">
+            <a:schemeClr val="dk1"/>
+          </a:effectRef>
+          <a:fontRef idx="minor">
+            <a:schemeClr val="tx1"/>
+          </a:fontRef>
+        </p:style>
+      </p:cxnSp>
+      <p:sp>
+        <p:nvSpPr>
+          <p:cNvPr id="33" name="Diamond 32"/>
+          <p:cNvSpPr/>
+          <p:nvPr/>
+        </p:nvSpPr>
+        <p:spPr>
+          <a:xfrm>
+            <a:off x="3067579" y="15499445"/>
+            <a:ext cx="300567" cy="251883"/>
+          </a:xfrm>
+          <a:prstGeom prst="diamond">
+            <a:avLst/>
+          </a:prstGeom>
+        </p:spPr>
+        <p:style>
+          <a:lnRef idx="2">
+            <a:schemeClr val="dk1"/>
+          </a:lnRef>
+          <a:fillRef idx="1">
+            <a:schemeClr val="lt1"/>
+          </a:fillRef>
+          <a:effectRef idx="0">
+            <a:schemeClr val="dk1"/>
+          </a:effectRef>
+          <a:fontRef idx="minor">
+            <a:schemeClr val="dk1"/>
+          </a:fontRef>
+        </p:style>
+        <p:txBody>
+          <a:bodyPr rot="0" spcFirstLastPara="0" vertOverflow="overflow" horzOverflow="overflow" vert="horz" wrap="square" lIns="91440" tIns="45720" rIns="91440" bIns="45720" numCol="1" spcCol="0" rtlCol="0" fromWordArt="0" anchor="ctr" anchorCtr="0" forceAA="0" compatLnSpc="1">
+            <a:prstTxWarp prst="textNoShape">
+              <a:avLst/>
+            </a:prstTxWarp>
+            <a:noAutofit/>
+          </a:bodyPr>
+          <a:lstStyle/>
+          <a:p>
+            <a:pPr algn="ctr"/>
+            <a:endParaRPr lang="en-US" sz="1800"/>
+          </a:p>
+        </p:txBody>
+      </p:sp>
+      <p:sp>
+        <p:nvSpPr>
+          <p:cNvPr id="34" name="Diamond 33"/>
+          <p:cNvSpPr/>
+          <p:nvPr/>
+        </p:nvSpPr>
+        <p:spPr>
+          <a:xfrm>
+            <a:off x="4913313" y="15499445"/>
+            <a:ext cx="300567" cy="251883"/>
+          </a:xfrm>
+          <a:prstGeom prst="diamond">
+            <a:avLst/>
+          </a:prstGeom>
+        </p:spPr>
+        <p:style>
+          <a:lnRef idx="2">
+            <a:schemeClr val="dk1"/>
+          </a:lnRef>
+          <a:fillRef idx="1">
+            <a:schemeClr val="lt1"/>
+          </a:fillRef>
+          <a:effectRef idx="0">
+            <a:schemeClr val="dk1"/>
+          </a:effectRef>
+          <a:fontRef idx="minor">
+            <a:schemeClr val="dk1"/>
+          </a:fontRef>
+        </p:style>
+        <p:txBody>
+          <a:bodyPr rot="0" spcFirstLastPara="0" vertOverflow="overflow" horzOverflow="overflow" vert="horz" wrap="square" lIns="91440" tIns="45720" rIns="91440" bIns="45720" numCol="1" spcCol="0" rtlCol="0" fromWordArt="0" anchor="ctr" anchorCtr="0" forceAA="0" compatLnSpc="1">
+            <a:prstTxWarp prst="textNoShape">
+              <a:avLst/>
+            </a:prstTxWarp>
+            <a:noAutofit/>
+          </a:bodyPr>
+          <a:lstStyle/>
+          <a:p>
+            <a:pPr algn="ctr"/>
+            <a:endParaRPr lang="en-US" sz="1800"/>
+          </a:p>
+        </p:txBody>
+      </p:sp>
+      <p:sp>
+        <p:nvSpPr>
+          <p:cNvPr id="35" name="Diamond 34"/>
+          <p:cNvSpPr/>
+          <p:nvPr/>
+        </p:nvSpPr>
+        <p:spPr>
+          <a:xfrm>
+            <a:off x="1189037" y="15518494"/>
+            <a:ext cx="300567" cy="251883"/>
+          </a:xfrm>
+          <a:prstGeom prst="diamond">
+            <a:avLst/>
+          </a:prstGeom>
+        </p:spPr>
+        <p:style>
+          <a:lnRef idx="2">
+            <a:schemeClr val="dk1"/>
+          </a:lnRef>
+          <a:fillRef idx="1">
+            <a:schemeClr val="lt1"/>
+          </a:fillRef>
+          <a:effectRef idx="0">
+            <a:schemeClr val="dk1"/>
+          </a:effectRef>
+          <a:fontRef idx="minor">
+            <a:schemeClr val="dk1"/>
+          </a:fontRef>
+        </p:style>
+        <p:txBody>
+          <a:bodyPr rot="0" spcFirstLastPara="0" vertOverflow="overflow" horzOverflow="overflow" vert="horz" wrap="square" lIns="91440" tIns="45720" rIns="91440" bIns="45720" numCol="1" spcCol="0" rtlCol="0" fromWordArt="0" anchor="ctr" anchorCtr="0" forceAA="0" compatLnSpc="1">
+            <a:prstTxWarp prst="textNoShape">
+              <a:avLst/>
+            </a:prstTxWarp>
+            <a:noAutofit/>
+          </a:bodyPr>
+          <a:lstStyle/>
+          <a:p>
+            <a:pPr algn="ctr"/>
+            <a:endParaRPr lang="en-US" sz="1800" dirty="0"/>
+          </a:p>
+        </p:txBody>
+      </p:sp>
+      <p:sp>
+        <p:nvSpPr>
+          <p:cNvPr id="39" name="TextBox 38"/>
+          <p:cNvSpPr txBox="1"/>
+          <p:nvPr/>
+        </p:nvSpPr>
+        <p:spPr>
+          <a:xfrm>
+            <a:off x="6414029" y="14372862"/>
+            <a:ext cx="313342" cy="369332"/>
+          </a:xfrm>
+          <a:prstGeom prst="rect">
+            <a:avLst/>
+          </a:prstGeom>
+          <a:noFill/>
+        </p:spPr>
+        <p:txBody>
+          <a:bodyPr wrap="square" rtlCol="0">
+            <a:spAutoFit/>
+          </a:bodyPr>
+          <a:lstStyle/>
+          <a:p>
+            <a:r>
+              <a:rPr lang="en-US" sz="1800" dirty="0"/>
+              <a:t>1</a:t>
+            </a:r>
+          </a:p>
+        </p:txBody>
+      </p:sp>
+      <p:sp>
+        <p:nvSpPr>
+          <p:cNvPr id="40" name="TextBox 39"/>
+          <p:cNvSpPr txBox="1"/>
+          <p:nvPr/>
+        </p:nvSpPr>
+        <p:spPr>
+          <a:xfrm>
+            <a:off x="4377795" y="14332142"/>
+            <a:ext cx="301686" cy="369332"/>
+          </a:xfrm>
+          <a:prstGeom prst="rect">
+            <a:avLst/>
+          </a:prstGeom>
+          <a:noFill/>
+        </p:spPr>
+        <p:txBody>
+          <a:bodyPr wrap="none" rtlCol="0">
+            <a:spAutoFit/>
+          </a:bodyPr>
+          <a:lstStyle/>
+          <a:p>
+            <a:r>
+              <a:rPr lang="en-US" sz="1800" dirty="0"/>
+              <a:t>1</a:t>
+            </a:r>
+          </a:p>
+        </p:txBody>
+      </p:sp>
+      <p:grpSp>
+        <p:nvGrpSpPr>
+          <p:cNvPr id="42" name="Group 41"/>
+          <p:cNvGrpSpPr/>
+          <p:nvPr/>
+        </p:nvGrpSpPr>
+        <p:grpSpPr>
+          <a:xfrm>
+            <a:off x="3600979" y="10859658"/>
+            <a:ext cx="2624667" cy="2606190"/>
+            <a:chOff x="2658533" y="220133"/>
+            <a:chExt cx="1811868" cy="2606190"/>
+          </a:xfrm>
+        </p:grpSpPr>
+        <p:sp>
+          <p:nvSpPr>
+            <p:cNvPr id="43" name="Rectangle 42"/>
+            <p:cNvSpPr/>
+            <p:nvPr/>
+          </p:nvSpPr>
+          <p:spPr>
+            <a:xfrm>
+              <a:off x="2658533" y="220133"/>
+              <a:ext cx="1811868" cy="423334"/>
+            </a:xfrm>
+            <a:prstGeom prst="rect">
+              <a:avLst/>
+            </a:prstGeom>
+          </p:spPr>
+          <p:style>
+            <a:lnRef idx="2">
+              <a:schemeClr val="dk1"/>
+            </a:lnRef>
+            <a:fillRef idx="1">
+              <a:schemeClr val="lt1"/>
+            </a:fillRef>
+            <a:effectRef idx="0">
+              <a:schemeClr val="dk1"/>
+            </a:effectRef>
+            <a:fontRef idx="minor">
+              <a:schemeClr val="dk1"/>
+            </a:fontRef>
+          </p:style>
+          <p:txBody>
+            <a:bodyPr rot="0" spcFirstLastPara="0" vertOverflow="overflow" horzOverflow="overflow" vert="horz" wrap="square" lIns="91440" tIns="45720" rIns="91440" bIns="45720" numCol="1" spcCol="0" rtlCol="0" fromWordArt="0" anchor="ctr" anchorCtr="0" forceAA="0" compatLnSpc="1">
+              <a:prstTxWarp prst="textNoShape">
+                <a:avLst/>
+              </a:prstTxWarp>
+              <a:noAutofit/>
+            </a:bodyPr>
+            <a:lstStyle/>
+            <a:p>
+              <a:pPr algn="ctr"/>
+              <a:r>
+                <a:rPr lang="en-US" sz="1800" dirty="0" err="1"/>
+                <a:t>TournamentSettings</a:t>
+              </a:r>
+              <a:endParaRPr lang="en-US" sz="1800" dirty="0"/>
+            </a:p>
+          </p:txBody>
+        </p:sp>
+        <p:sp>
+          <p:nvSpPr>
+            <p:cNvPr id="44" name="Rectangle 43"/>
+            <p:cNvSpPr/>
+            <p:nvPr/>
+          </p:nvSpPr>
+          <p:spPr>
+            <a:xfrm>
+              <a:off x="2658533" y="643466"/>
+              <a:ext cx="1811868" cy="2182857"/>
+            </a:xfrm>
+            <a:prstGeom prst="rect">
+              <a:avLst/>
+            </a:prstGeom>
+          </p:spPr>
+          <p:style>
+            <a:lnRef idx="2">
+              <a:schemeClr val="dk1"/>
+            </a:lnRef>
+            <a:fillRef idx="1">
+              <a:schemeClr val="lt1"/>
+            </a:fillRef>
+            <a:effectRef idx="0">
+              <a:schemeClr val="dk1"/>
+            </a:effectRef>
+            <a:fontRef idx="minor">
+              <a:schemeClr val="dk1"/>
+            </a:fontRef>
+          </p:style>
+          <p:txBody>
+            <a:bodyPr rot="0" spcFirstLastPara="0" vertOverflow="overflow" horzOverflow="overflow" vert="horz" wrap="square" lIns="91440" tIns="45720" rIns="91440" bIns="45720" numCol="1" spcCol="0" rtlCol="0" fromWordArt="0" anchor="ctr" anchorCtr="0" forceAA="0" compatLnSpc="1">
+              <a:prstTxWarp prst="textNoShape">
+                <a:avLst/>
+              </a:prstTxWarp>
+              <a:noAutofit/>
+            </a:bodyPr>
+            <a:lstStyle/>
+            <a:p>
+              <a:pPr marL="285750" indent="-285750">
+                <a:buFont typeface="Arial" panose="020B0604020202020204" pitchFamily="34" charset="0"/>
+                <a:buChar char="•"/>
+              </a:pPr>
+              <a:r>
+                <a:rPr lang="en-US" sz="1800" dirty="0" err="1"/>
+                <a:t>MaxSpectators</a:t>
+              </a:r>
+              <a:endParaRPr lang="en-US" sz="1800" dirty="0"/>
+            </a:p>
+            <a:p>
+              <a:pPr marL="285750" indent="-285750">
+                <a:buFont typeface="Arial" panose="020B0604020202020204" pitchFamily="34" charset="0"/>
+                <a:buChar char="•"/>
+              </a:pPr>
+              <a:r>
+                <a:rPr lang="en-US" sz="1800" dirty="0"/>
+                <a:t>Scoring Alg.</a:t>
+              </a:r>
+            </a:p>
+            <a:p>
+              <a:pPr marL="285750" indent="-285750">
+                <a:buFont typeface="Arial" panose="020B0604020202020204" pitchFamily="34" charset="0"/>
+                <a:buChar char="•"/>
+              </a:pPr>
+              <a:r>
+                <a:rPr lang="en-US" sz="1800" dirty="0"/>
+                <a:t>Team-Size</a:t>
+              </a:r>
+            </a:p>
+            <a:p>
+              <a:pPr marL="285750" indent="-285750">
+                <a:buFont typeface="Arial" panose="020B0604020202020204" pitchFamily="34" charset="0"/>
+                <a:buChar char="•"/>
+              </a:pPr>
+              <a:r>
+                <a:rPr lang="en-US" sz="1800" dirty="0"/>
+                <a:t>Peer-Review Preference</a:t>
+              </a:r>
+            </a:p>
+            <a:p>
+              <a:pPr marL="285750" indent="-285750">
+                <a:buFont typeface="Arial" panose="020B0604020202020204" pitchFamily="34" charset="0"/>
+                <a:buChar char="•"/>
+              </a:pPr>
+              <a:r>
+                <a:rPr lang="en-US" sz="1800" dirty="0"/>
+                <a:t>Manual/Auto Team Assignment</a:t>
+              </a:r>
+            </a:p>
+            <a:p>
+              <a:pPr marL="285750" indent="-285750">
+                <a:buFont typeface="Arial" panose="020B0604020202020204" pitchFamily="34" charset="0"/>
+                <a:buChar char="•"/>
+              </a:pPr>
+              <a:endParaRPr lang="en-US" sz="1800" dirty="0"/>
+            </a:p>
+          </p:txBody>
+        </p:sp>
+      </p:grpSp>
+      <p:grpSp>
+        <p:nvGrpSpPr>
+          <p:cNvPr id="46" name="Group 45"/>
+          <p:cNvGrpSpPr/>
+          <p:nvPr/>
+        </p:nvGrpSpPr>
+        <p:grpSpPr>
+          <a:xfrm>
+            <a:off x="6588766" y="10751270"/>
+            <a:ext cx="2624667" cy="2116666"/>
+            <a:chOff x="2658533" y="220133"/>
+            <a:chExt cx="1811868" cy="2116666"/>
+          </a:xfrm>
+        </p:grpSpPr>
+        <p:sp>
+          <p:nvSpPr>
+            <p:cNvPr id="47" name="Rectangle 46"/>
+            <p:cNvSpPr/>
+            <p:nvPr/>
+          </p:nvSpPr>
+          <p:spPr>
+            <a:xfrm>
+              <a:off x="2658533" y="220133"/>
+              <a:ext cx="1811868" cy="423334"/>
+            </a:xfrm>
+            <a:prstGeom prst="rect">
+              <a:avLst/>
+            </a:prstGeom>
+          </p:spPr>
+          <p:style>
+            <a:lnRef idx="2">
+              <a:schemeClr val="dk1"/>
+            </a:lnRef>
+            <a:fillRef idx="1">
+              <a:schemeClr val="lt1"/>
+            </a:fillRef>
+            <a:effectRef idx="0">
+              <a:schemeClr val="dk1"/>
+            </a:effectRef>
+            <a:fontRef idx="minor">
+              <a:schemeClr val="dk1"/>
+            </a:fontRef>
+          </p:style>
+          <p:txBody>
+            <a:bodyPr rot="0" spcFirstLastPara="0" vertOverflow="overflow" horzOverflow="overflow" vert="horz" wrap="square" lIns="91440" tIns="45720" rIns="91440" bIns="45720" numCol="1" spcCol="0" rtlCol="0" fromWordArt="0" anchor="ctr" anchorCtr="0" forceAA="0" compatLnSpc="1">
+              <a:prstTxWarp prst="textNoShape">
+                <a:avLst/>
+              </a:prstTxWarp>
+              <a:noAutofit/>
+            </a:bodyPr>
+            <a:lstStyle/>
+            <a:p>
+              <a:pPr algn="ctr"/>
+              <a:r>
+                <a:rPr lang="en-US" sz="1800" dirty="0"/>
+                <a:t>Tournament</a:t>
+              </a:r>
+            </a:p>
+          </p:txBody>
+        </p:sp>
+        <p:sp>
+          <p:nvSpPr>
+            <p:cNvPr id="48" name="Rectangle 47"/>
+            <p:cNvSpPr/>
+            <p:nvPr/>
+          </p:nvSpPr>
+          <p:spPr>
+            <a:xfrm>
+              <a:off x="2658533" y="643467"/>
+              <a:ext cx="1811868" cy="1693332"/>
+            </a:xfrm>
+            <a:prstGeom prst="rect">
+              <a:avLst/>
+            </a:prstGeom>
+          </p:spPr>
+          <p:style>
+            <a:lnRef idx="2">
+              <a:schemeClr val="dk1"/>
+            </a:lnRef>
+            <a:fillRef idx="1">
+              <a:schemeClr val="lt1"/>
+            </a:fillRef>
+            <a:effectRef idx="0">
+              <a:schemeClr val="dk1"/>
+            </a:effectRef>
+            <a:fontRef idx="minor">
+              <a:schemeClr val="dk1"/>
+            </a:fontRef>
+          </p:style>
+          <p:txBody>
+            <a:bodyPr rot="0" spcFirstLastPara="0" vertOverflow="overflow" horzOverflow="overflow" vert="horz" wrap="square" lIns="91440" tIns="45720" rIns="91440" bIns="45720" numCol="1" spcCol="0" rtlCol="0" fromWordArt="0" anchor="ctr" anchorCtr="0" forceAA="0" compatLnSpc="1">
+              <a:prstTxWarp prst="textNoShape">
+                <a:avLst/>
+              </a:prstTxWarp>
+              <a:noAutofit/>
+            </a:bodyPr>
+            <a:lstStyle/>
+            <a:p>
+              <a:pPr marL="285750" indent="-285750">
+                <a:buFont typeface="Arial" panose="020B0604020202020204" pitchFamily="34" charset="0"/>
+                <a:buChar char="•"/>
+              </a:pPr>
+              <a:r>
+                <a:rPr lang="en-US" sz="1800" dirty="0"/>
+                <a:t>Matches</a:t>
+              </a:r>
+            </a:p>
+            <a:p>
+              <a:pPr marL="285750" indent="-285750">
+                <a:buFont typeface="Arial" panose="020B0604020202020204" pitchFamily="34" charset="0"/>
+                <a:buChar char="•"/>
+              </a:pPr>
+              <a:r>
+                <a:rPr lang="en-US" sz="1800" dirty="0"/>
+                <a:t>Teams</a:t>
+              </a:r>
+            </a:p>
+            <a:p>
+              <a:pPr marL="285750" indent="-285750">
+                <a:buFont typeface="Arial" panose="020B0604020202020204" pitchFamily="34" charset="0"/>
+                <a:buChar char="•"/>
+              </a:pPr>
+              <a:r>
+                <a:rPr lang="en-US" sz="1800" dirty="0" err="1"/>
+                <a:t>TournamentSettings</a:t>
+              </a:r>
+              <a:endParaRPr lang="en-US" sz="1800" dirty="0"/>
+            </a:p>
+            <a:p>
+              <a:pPr marL="285750" indent="-285750">
+                <a:buFont typeface="Arial" panose="020B0604020202020204" pitchFamily="34" charset="0"/>
+                <a:buChar char="•"/>
+              </a:pPr>
+              <a:endParaRPr lang="en-US" sz="1800" dirty="0"/>
+            </a:p>
+          </p:txBody>
+        </p:sp>
+      </p:grpSp>
+      <p:grpSp>
+        <p:nvGrpSpPr>
+          <p:cNvPr id="49" name="Group 48"/>
+          <p:cNvGrpSpPr/>
+          <p:nvPr/>
+        </p:nvGrpSpPr>
+        <p:grpSpPr>
+          <a:xfrm>
+            <a:off x="9617272" y="15182161"/>
+            <a:ext cx="2150534" cy="986147"/>
+            <a:chOff x="2658533" y="885475"/>
+            <a:chExt cx="1811868" cy="1451324"/>
+          </a:xfrm>
+        </p:grpSpPr>
+        <p:sp>
+          <p:nvSpPr>
+            <p:cNvPr id="50" name="Rectangle 49"/>
+            <p:cNvSpPr/>
+            <p:nvPr/>
+          </p:nvSpPr>
+          <p:spPr>
+            <a:xfrm>
+              <a:off x="2658533" y="885475"/>
+              <a:ext cx="1811868" cy="423333"/>
+            </a:xfrm>
+            <a:prstGeom prst="rect">
+              <a:avLst/>
+            </a:prstGeom>
+          </p:spPr>
+          <p:style>
+            <a:lnRef idx="2">
+              <a:schemeClr val="dk1"/>
+            </a:lnRef>
+            <a:fillRef idx="1">
+              <a:schemeClr val="lt1"/>
+            </a:fillRef>
+            <a:effectRef idx="0">
+              <a:schemeClr val="dk1"/>
+            </a:effectRef>
+            <a:fontRef idx="minor">
+              <a:schemeClr val="dk1"/>
+            </a:fontRef>
+          </p:style>
+          <p:txBody>
+            <a:bodyPr rot="0" spcFirstLastPara="0" vertOverflow="overflow" horzOverflow="overflow" vert="horz" wrap="square" lIns="91440" tIns="45720" rIns="91440" bIns="45720" numCol="1" spcCol="0" rtlCol="0" fromWordArt="0" anchor="ctr" anchorCtr="0" forceAA="0" compatLnSpc="1">
+              <a:prstTxWarp prst="textNoShape">
+                <a:avLst/>
+              </a:prstTxWarp>
+              <a:noAutofit/>
+            </a:bodyPr>
+            <a:lstStyle/>
+            <a:p>
+              <a:pPr algn="ctr"/>
+              <a:r>
+                <a:rPr lang="en-US" sz="1800" dirty="0"/>
+                <a:t>Review</a:t>
+              </a:r>
+            </a:p>
+          </p:txBody>
+        </p:sp>
+        <p:sp>
+          <p:nvSpPr>
+            <p:cNvPr id="51" name="Rectangle 50"/>
+            <p:cNvSpPr/>
+            <p:nvPr/>
+          </p:nvSpPr>
+          <p:spPr>
+            <a:xfrm>
+              <a:off x="2658533" y="1272946"/>
+              <a:ext cx="1811868" cy="1063853"/>
+            </a:xfrm>
+            <a:prstGeom prst="rect">
+              <a:avLst/>
+            </a:prstGeom>
+          </p:spPr>
+          <p:style>
+            <a:lnRef idx="2">
+              <a:schemeClr val="dk1"/>
+            </a:lnRef>
+            <a:fillRef idx="1">
+              <a:schemeClr val="lt1"/>
+            </a:fillRef>
+            <a:effectRef idx="0">
+              <a:schemeClr val="dk1"/>
+            </a:effectRef>
+            <a:fontRef idx="minor">
+              <a:schemeClr val="dk1"/>
+            </a:fontRef>
+          </p:style>
+          <p:txBody>
+            <a:bodyPr rot="0" spcFirstLastPara="0" vertOverflow="overflow" horzOverflow="overflow" vert="horz" wrap="square" lIns="91440" tIns="45720" rIns="91440" bIns="45720" numCol="1" spcCol="0" rtlCol="0" fromWordArt="0" anchor="ctr" anchorCtr="0" forceAA="0" compatLnSpc="1">
+              <a:prstTxWarp prst="textNoShape">
+                <a:avLst/>
+              </a:prstTxWarp>
+              <a:noAutofit/>
+            </a:bodyPr>
+            <a:lstStyle/>
+            <a:p>
+              <a:pPr marL="285750" indent="-285750">
+                <a:buFont typeface="Arial" panose="020B0604020202020204" pitchFamily="34" charset="0"/>
+                <a:buChar char="•"/>
+              </a:pPr>
+              <a:r>
+                <a:rPr lang="en-US" sz="1800" dirty="0"/>
+                <a:t>Score</a:t>
+              </a:r>
+            </a:p>
+            <a:p>
+              <a:pPr marL="285750" indent="-285750">
+                <a:buFont typeface="Arial" panose="020B0604020202020204" pitchFamily="34" charset="0"/>
+                <a:buChar char="•"/>
+              </a:pPr>
+              <a:r>
+                <a:rPr lang="en-US" sz="1800" dirty="0"/>
+                <a:t>Comment</a:t>
+              </a:r>
+            </a:p>
+            <a:p>
+              <a:endParaRPr lang="en-US" sz="1800" dirty="0"/>
+            </a:p>
+          </p:txBody>
+        </p:sp>
+      </p:grpSp>
+      <p:grpSp>
+        <p:nvGrpSpPr>
+          <p:cNvPr id="52" name="Group 51"/>
+          <p:cNvGrpSpPr/>
+          <p:nvPr/>
+        </p:nvGrpSpPr>
+        <p:grpSpPr>
+          <a:xfrm>
+            <a:off x="9418305" y="10346564"/>
+            <a:ext cx="2624667" cy="2116666"/>
+            <a:chOff x="2658533" y="220133"/>
+            <a:chExt cx="1811868" cy="2116666"/>
+          </a:xfrm>
+        </p:grpSpPr>
+        <p:sp>
+          <p:nvSpPr>
+            <p:cNvPr id="53" name="Rectangle 52"/>
+            <p:cNvSpPr/>
+            <p:nvPr/>
+          </p:nvSpPr>
+          <p:spPr>
+            <a:xfrm>
+              <a:off x="2658533" y="220133"/>
+              <a:ext cx="1811868" cy="423334"/>
+            </a:xfrm>
+            <a:prstGeom prst="rect">
+              <a:avLst/>
+            </a:prstGeom>
+          </p:spPr>
+          <p:style>
+            <a:lnRef idx="2">
+              <a:schemeClr val="dk1"/>
+            </a:lnRef>
+            <a:fillRef idx="1">
+              <a:schemeClr val="lt1"/>
+            </a:fillRef>
+            <a:effectRef idx="0">
+              <a:schemeClr val="dk1"/>
+            </a:effectRef>
+            <a:fontRef idx="minor">
+              <a:schemeClr val="dk1"/>
+            </a:fontRef>
+          </p:style>
+          <p:txBody>
+            <a:bodyPr rot="0" spcFirstLastPara="0" vertOverflow="overflow" horzOverflow="overflow" vert="horz" wrap="square" lIns="91440" tIns="45720" rIns="91440" bIns="45720" numCol="1" spcCol="0" rtlCol="0" fromWordArt="0" anchor="ctr" anchorCtr="0" forceAA="0" compatLnSpc="1">
+              <a:prstTxWarp prst="textNoShape">
+                <a:avLst/>
+              </a:prstTxWarp>
+              <a:noAutofit/>
+            </a:bodyPr>
+            <a:lstStyle/>
+            <a:p>
+              <a:pPr algn="ctr"/>
+              <a:r>
+                <a:rPr lang="en-US" sz="1800" dirty="0"/>
+                <a:t>Match</a:t>
+              </a:r>
+            </a:p>
+          </p:txBody>
+        </p:sp>
+        <p:sp>
+          <p:nvSpPr>
+            <p:cNvPr id="54" name="Rectangle 53"/>
+            <p:cNvSpPr/>
+            <p:nvPr/>
+          </p:nvSpPr>
+          <p:spPr>
+            <a:xfrm>
+              <a:off x="2658533" y="643467"/>
+              <a:ext cx="1811868" cy="1693332"/>
+            </a:xfrm>
+            <a:prstGeom prst="rect">
+              <a:avLst/>
+            </a:prstGeom>
+          </p:spPr>
+          <p:style>
+            <a:lnRef idx="2">
+              <a:schemeClr val="dk1"/>
+            </a:lnRef>
+            <a:fillRef idx="1">
+              <a:schemeClr val="lt1"/>
+            </a:fillRef>
+            <a:effectRef idx="0">
+              <a:schemeClr val="dk1"/>
+            </a:effectRef>
+            <a:fontRef idx="minor">
+              <a:schemeClr val="dk1"/>
+            </a:fontRef>
+          </p:style>
+          <p:txBody>
+            <a:bodyPr rot="0" spcFirstLastPara="0" vertOverflow="overflow" horzOverflow="overflow" vert="horz" wrap="square" lIns="91440" tIns="45720" rIns="91440" bIns="45720" numCol="1" spcCol="0" rtlCol="0" fromWordArt="0" anchor="ctr" anchorCtr="0" forceAA="0" compatLnSpc="1">
+              <a:prstTxWarp prst="textNoShape">
+                <a:avLst/>
+              </a:prstTxWarp>
+              <a:noAutofit/>
+            </a:bodyPr>
+            <a:lstStyle/>
+            <a:p>
+              <a:pPr marL="285750" indent="-285750">
+                <a:buFont typeface="Arial" panose="020B0604020202020204" pitchFamily="34" charset="0"/>
+                <a:buChar char="•"/>
+              </a:pPr>
+              <a:r>
+                <a:rPr lang="en-US" sz="1800" dirty="0"/>
+                <a:t>Team1</a:t>
+              </a:r>
+            </a:p>
+            <a:p>
+              <a:pPr marL="285750" indent="-285750">
+                <a:buFont typeface="Arial" panose="020B0604020202020204" pitchFamily="34" charset="0"/>
+                <a:buChar char="•"/>
+              </a:pPr>
+              <a:r>
+                <a:rPr lang="en-US" sz="1800" dirty="0"/>
+                <a:t>Team2</a:t>
+              </a:r>
+            </a:p>
+            <a:p>
+              <a:pPr marL="285750" indent="-285750">
+                <a:buFont typeface="Arial" panose="020B0604020202020204" pitchFamily="34" charset="0"/>
+                <a:buChar char="•"/>
+              </a:pPr>
+              <a:r>
+                <a:rPr lang="en-US" sz="1800" dirty="0"/>
+                <a:t>Users</a:t>
+              </a:r>
+            </a:p>
+            <a:p>
+              <a:pPr marL="285750" indent="-285750">
+                <a:buFont typeface="Arial" panose="020B0604020202020204" pitchFamily="34" charset="0"/>
+                <a:buChar char="•"/>
+              </a:pPr>
+              <a:r>
+                <a:rPr lang="en-US" sz="1800" dirty="0" err="1"/>
+                <a:t>TournamentSettings</a:t>
+              </a:r>
+              <a:endParaRPr lang="en-US" sz="1800" dirty="0"/>
+            </a:p>
+            <a:p>
+              <a:pPr marL="285750" indent="-285750">
+                <a:buFont typeface="Arial" panose="020B0604020202020204" pitchFamily="34" charset="0"/>
+                <a:buChar char="•"/>
+              </a:pPr>
+              <a:endParaRPr lang="en-US" sz="1800" dirty="0"/>
+            </a:p>
+          </p:txBody>
+        </p:sp>
+      </p:grpSp>
+      <p:grpSp>
+        <p:nvGrpSpPr>
+          <p:cNvPr id="55" name="Group 54"/>
+          <p:cNvGrpSpPr/>
+          <p:nvPr/>
+        </p:nvGrpSpPr>
+        <p:grpSpPr>
+          <a:xfrm>
+            <a:off x="9617272" y="13358658"/>
+            <a:ext cx="2425700" cy="1629047"/>
+            <a:chOff x="2658533" y="220133"/>
+            <a:chExt cx="1811868" cy="2116666"/>
+          </a:xfrm>
+        </p:grpSpPr>
+        <p:sp>
+          <p:nvSpPr>
+            <p:cNvPr id="56" name="Rectangle 55"/>
+            <p:cNvSpPr/>
+            <p:nvPr/>
+          </p:nvSpPr>
+          <p:spPr>
+            <a:xfrm>
+              <a:off x="2658533" y="220133"/>
+              <a:ext cx="1811868" cy="423334"/>
+            </a:xfrm>
+            <a:prstGeom prst="rect">
+              <a:avLst/>
+            </a:prstGeom>
+          </p:spPr>
+          <p:style>
+            <a:lnRef idx="2">
+              <a:schemeClr val="dk1"/>
+            </a:lnRef>
+            <a:fillRef idx="1">
+              <a:schemeClr val="lt1"/>
+            </a:fillRef>
+            <a:effectRef idx="0">
+              <a:schemeClr val="dk1"/>
+            </a:effectRef>
+            <a:fontRef idx="minor">
+              <a:schemeClr val="dk1"/>
+            </a:fontRef>
+          </p:style>
+          <p:txBody>
+            <a:bodyPr rot="0" spcFirstLastPara="0" vertOverflow="overflow" horzOverflow="overflow" vert="horz" wrap="square" lIns="91440" tIns="45720" rIns="91440" bIns="45720" numCol="1" spcCol="0" rtlCol="0" fromWordArt="0" anchor="ctr" anchorCtr="0" forceAA="0" compatLnSpc="1">
+              <a:prstTxWarp prst="textNoShape">
+                <a:avLst/>
+              </a:prstTxWarp>
+              <a:noAutofit/>
+            </a:bodyPr>
+            <a:lstStyle/>
+            <a:p>
+              <a:pPr algn="ctr"/>
+              <a:r>
+                <a:rPr lang="en-US" sz="1800" dirty="0"/>
+                <a:t>Team</a:t>
+              </a:r>
+            </a:p>
+          </p:txBody>
+        </p:sp>
+        <p:sp>
+          <p:nvSpPr>
+            <p:cNvPr id="57" name="Rectangle 56"/>
+            <p:cNvSpPr/>
+            <p:nvPr/>
+          </p:nvSpPr>
+          <p:spPr>
+            <a:xfrm>
+              <a:off x="2658533" y="643467"/>
+              <a:ext cx="1811868" cy="1693332"/>
+            </a:xfrm>
+            <a:prstGeom prst="rect">
+              <a:avLst/>
+            </a:prstGeom>
+          </p:spPr>
+          <p:style>
+            <a:lnRef idx="2">
+              <a:schemeClr val="dk1"/>
+            </a:lnRef>
+            <a:fillRef idx="1">
+              <a:schemeClr val="lt1"/>
+            </a:fillRef>
+            <a:effectRef idx="0">
+              <a:schemeClr val="dk1"/>
+            </a:effectRef>
+            <a:fontRef idx="minor">
+              <a:schemeClr val="dk1"/>
+            </a:fontRef>
+          </p:style>
+          <p:txBody>
+            <a:bodyPr rot="0" spcFirstLastPara="0" vertOverflow="overflow" horzOverflow="overflow" vert="horz" wrap="square" lIns="91440" tIns="45720" rIns="91440" bIns="45720" numCol="1" spcCol="0" rtlCol="0" fromWordArt="0" anchor="ctr" anchorCtr="0" forceAA="0" compatLnSpc="1">
+              <a:prstTxWarp prst="textNoShape">
+                <a:avLst/>
+              </a:prstTxWarp>
+              <a:noAutofit/>
+            </a:bodyPr>
+            <a:lstStyle/>
+            <a:p>
+              <a:pPr marL="285750" indent="-285750">
+                <a:buFont typeface="Arial" panose="020B0604020202020204" pitchFamily="34" charset="0"/>
+                <a:buChar char="•"/>
+              </a:pPr>
+              <a:r>
+                <a:rPr lang="en-US" sz="1800" dirty="0" err="1"/>
+                <a:t>maxPlayer</a:t>
+              </a:r>
+              <a:endParaRPr lang="en-US" sz="1800" dirty="0"/>
+            </a:p>
+            <a:p>
+              <a:pPr marL="285750" indent="-285750">
+                <a:buFont typeface="Arial" panose="020B0604020202020204" pitchFamily="34" charset="0"/>
+                <a:buChar char="•"/>
+              </a:pPr>
+              <a:r>
+                <a:rPr lang="en-US" sz="1800" dirty="0"/>
+                <a:t>Users</a:t>
+              </a:r>
+            </a:p>
+            <a:p>
+              <a:pPr marL="285750" indent="-285750">
+                <a:buFont typeface="Arial" panose="020B0604020202020204" pitchFamily="34" charset="0"/>
+                <a:buChar char="•"/>
+              </a:pPr>
+              <a:r>
+                <a:rPr lang="en-US" sz="1800" dirty="0"/>
+                <a:t>Team name/image</a:t>
+              </a:r>
+            </a:p>
+            <a:p>
+              <a:pPr marL="285750" indent="-285750">
+                <a:buFont typeface="Arial" panose="020B0604020202020204" pitchFamily="34" charset="0"/>
+                <a:buChar char="•"/>
+              </a:pPr>
+              <a:endParaRPr lang="en-US" sz="1800" dirty="0"/>
+            </a:p>
+          </p:txBody>
+        </p:sp>
+      </p:grpSp>
+      <p:grpSp>
+        <p:nvGrpSpPr>
+          <p:cNvPr id="59" name="Group 58"/>
+          <p:cNvGrpSpPr/>
+          <p:nvPr/>
+        </p:nvGrpSpPr>
+        <p:grpSpPr>
+          <a:xfrm>
+            <a:off x="1029228" y="1607806"/>
+            <a:ext cx="2624667" cy="2361287"/>
+            <a:chOff x="2658533" y="-24488"/>
+            <a:chExt cx="1811868" cy="2361287"/>
+          </a:xfrm>
+        </p:grpSpPr>
+        <p:sp>
+          <p:nvSpPr>
+            <p:cNvPr id="60" name="Rectangle 59"/>
+            <p:cNvSpPr/>
+            <p:nvPr/>
+          </p:nvSpPr>
+          <p:spPr>
+            <a:xfrm>
+              <a:off x="2658533" y="-24488"/>
+              <a:ext cx="1811868" cy="667955"/>
+            </a:xfrm>
+            <a:prstGeom prst="rect">
+              <a:avLst/>
+            </a:prstGeom>
+          </p:spPr>
+          <p:style>
+            <a:lnRef idx="2">
+              <a:schemeClr val="dk1"/>
+            </a:lnRef>
+            <a:fillRef idx="1">
+              <a:schemeClr val="lt1"/>
+            </a:fillRef>
+            <a:effectRef idx="0">
+              <a:schemeClr val="dk1"/>
+            </a:effectRef>
+            <a:fontRef idx="minor">
+              <a:schemeClr val="dk1"/>
+            </a:fontRef>
+          </p:style>
+          <p:txBody>
+            <a:bodyPr rot="0" spcFirstLastPara="0" vertOverflow="overflow" horzOverflow="overflow" vert="horz" wrap="square" lIns="91440" tIns="45720" rIns="91440" bIns="45720" numCol="1" spcCol="0" rtlCol="0" fromWordArt="0" anchor="ctr" anchorCtr="0" forceAA="0" compatLnSpc="1">
+              <a:prstTxWarp prst="textNoShape">
+                <a:avLst/>
+              </a:prstTxWarp>
+              <a:noAutofit/>
+            </a:bodyPr>
+            <a:lstStyle/>
+            <a:p>
+              <a:pPr algn="ctr"/>
+              <a:r>
+                <a:rPr lang="en-US" sz="1800" dirty="0" smtClean="0"/>
+                <a:t>&lt;&lt;interface&gt;&gt;</a:t>
+              </a:r>
+            </a:p>
+            <a:p>
+              <a:pPr algn="ctr"/>
+              <a:r>
+                <a:rPr lang="en-US" sz="1800" dirty="0" err="1" smtClean="0"/>
+                <a:t>WebPage</a:t>
+              </a:r>
+              <a:endParaRPr lang="en-US" sz="1800" dirty="0"/>
+            </a:p>
+          </p:txBody>
+        </p:sp>
+        <p:sp>
+          <p:nvSpPr>
+            <p:cNvPr id="61" name="Rectangle 60"/>
+            <p:cNvSpPr/>
+            <p:nvPr/>
+          </p:nvSpPr>
+          <p:spPr>
+            <a:xfrm>
+              <a:off x="2658533" y="643467"/>
+              <a:ext cx="1811868" cy="1693332"/>
+            </a:xfrm>
+            <a:prstGeom prst="rect">
+              <a:avLst/>
+            </a:prstGeom>
+          </p:spPr>
+          <p:style>
+            <a:lnRef idx="2">
+              <a:schemeClr val="dk1"/>
+            </a:lnRef>
+            <a:fillRef idx="1">
+              <a:schemeClr val="lt1"/>
+            </a:fillRef>
+            <a:effectRef idx="0">
+              <a:schemeClr val="dk1"/>
+            </a:effectRef>
+            <a:fontRef idx="minor">
+              <a:schemeClr val="dk1"/>
+            </a:fontRef>
+          </p:style>
+          <p:txBody>
+            <a:bodyPr rot="0" spcFirstLastPara="0" vertOverflow="overflow" horzOverflow="overflow" vert="horz" wrap="square" lIns="91440" tIns="45720" rIns="91440" bIns="45720" numCol="1" spcCol="0" rtlCol="0" fromWordArt="0" anchor="ctr" anchorCtr="0" forceAA="0" compatLnSpc="1">
+              <a:prstTxWarp prst="textNoShape">
+                <a:avLst/>
+              </a:prstTxWarp>
+              <a:noAutofit/>
+            </a:bodyPr>
+            <a:lstStyle/>
+            <a:p>
+              <a:pPr marL="285750" indent="-285750">
+                <a:buFont typeface="Arial" panose="020B0604020202020204" pitchFamily="34" charset="0"/>
+                <a:buChar char="•"/>
+              </a:pPr>
+              <a:r>
+                <a:rPr lang="en-US" sz="1800" dirty="0" smtClean="0"/>
+                <a:t> HTTP Requests</a:t>
+              </a:r>
+            </a:p>
+          </p:txBody>
+        </p:sp>
+      </p:grpSp>
+      <p:sp>
+        <p:nvSpPr>
+          <p:cNvPr id="62" name="Isosceles Triangle 61"/>
+          <p:cNvSpPr/>
+          <p:nvPr/>
+        </p:nvSpPr>
+        <p:spPr>
+          <a:xfrm rot="16200000">
+            <a:off x="3613852" y="2640407"/>
+            <a:ext cx="518390" cy="398689"/>
+          </a:xfrm>
+          <a:prstGeom prst="triangle">
+            <a:avLst/>
+          </a:prstGeom>
+        </p:spPr>
+        <p:style>
+          <a:lnRef idx="2">
+            <a:schemeClr val="dk1"/>
+          </a:lnRef>
+          <a:fillRef idx="1">
+            <a:schemeClr val="lt1"/>
+          </a:fillRef>
+          <a:effectRef idx="0">
+            <a:schemeClr val="dk1"/>
+          </a:effectRef>
+          <a:fontRef idx="minor">
+            <a:schemeClr val="dk1"/>
+          </a:fontRef>
+        </p:style>
+        <p:txBody>
+          <a:bodyPr rtlCol="0" anchor="ctr"/>
+          <a:lstStyle/>
+          <a:p>
+            <a:pPr algn="ctr"/>
+            <a:endParaRPr lang="en-US"/>
+          </a:p>
+        </p:txBody>
+      </p:sp>
+      <p:cxnSp>
+        <p:nvCxnSpPr>
+          <p:cNvPr id="64" name="Straight Connector 63"/>
+          <p:cNvCxnSpPr>
+            <a:stCxn id="62" idx="3"/>
+          </p:cNvCxnSpPr>
+          <p:nvPr/>
+        </p:nvCxnSpPr>
+        <p:spPr>
+          <a:xfrm flipV="1">
+            <a:off x="4072392" y="2830286"/>
+            <a:ext cx="2341637" cy="9466"/>
+          </a:xfrm>
+          <a:prstGeom prst="line">
+            <a:avLst/>
+          </a:prstGeom>
+        </p:spPr>
+        <p:style>
+          <a:lnRef idx="3">
+            <a:schemeClr val="dk1"/>
+          </a:lnRef>
+          <a:fillRef idx="0">
+            <a:schemeClr val="dk1"/>
+          </a:fillRef>
+          <a:effectRef idx="2">
+            <a:schemeClr val="dk1"/>
+          </a:effectRef>
+          <a:fontRef idx="minor">
+            <a:schemeClr val="tx1"/>
+          </a:fontRef>
+        </p:style>
+      </p:cxnSp>
+      <p:cxnSp>
+        <p:nvCxnSpPr>
+          <p:cNvPr id="70" name="Straight Connector 69"/>
+          <p:cNvCxnSpPr/>
+          <p:nvPr/>
+        </p:nvCxnSpPr>
+        <p:spPr>
+          <a:xfrm>
+            <a:off x="6418869" y="718457"/>
+            <a:ext cx="4839" cy="5355772"/>
+          </a:xfrm>
+          <a:prstGeom prst="line">
+            <a:avLst/>
+          </a:prstGeom>
+        </p:spPr>
+        <p:style>
+          <a:lnRef idx="3">
+            <a:schemeClr val="dk1"/>
+          </a:lnRef>
+          <a:fillRef idx="0">
+            <a:schemeClr val="dk1"/>
+          </a:fillRef>
+          <a:effectRef idx="2">
+            <a:schemeClr val="dk1"/>
+          </a:effectRef>
+          <a:fontRef idx="minor">
+            <a:schemeClr val="tx1"/>
+          </a:fontRef>
+        </p:style>
+      </p:cxnSp>
+      <p:cxnSp>
+        <p:nvCxnSpPr>
+          <p:cNvPr id="71" name="Straight Connector 70"/>
+          <p:cNvCxnSpPr/>
+          <p:nvPr/>
+        </p:nvCxnSpPr>
+        <p:spPr>
+          <a:xfrm flipV="1">
+            <a:off x="6423708" y="718462"/>
+            <a:ext cx="2341637" cy="9466"/>
+          </a:xfrm>
+          <a:prstGeom prst="line">
+            <a:avLst/>
+          </a:prstGeom>
+        </p:spPr>
+        <p:style>
+          <a:lnRef idx="3">
+            <a:schemeClr val="dk1"/>
+          </a:lnRef>
+          <a:fillRef idx="0">
+            <a:schemeClr val="dk1"/>
+          </a:fillRef>
+          <a:effectRef idx="2">
+            <a:schemeClr val="dk1"/>
+          </a:effectRef>
+          <a:fontRef idx="minor">
+            <a:schemeClr val="tx1"/>
+          </a:fontRef>
+        </p:style>
+      </p:cxnSp>
+      <p:cxnSp>
+        <p:nvCxnSpPr>
+          <p:cNvPr id="72" name="Straight Connector 71"/>
+          <p:cNvCxnSpPr/>
+          <p:nvPr/>
+        </p:nvCxnSpPr>
+        <p:spPr>
+          <a:xfrm flipV="1">
+            <a:off x="6423708" y="2026804"/>
+            <a:ext cx="2341637" cy="9466"/>
+          </a:xfrm>
+          <a:prstGeom prst="line">
+            <a:avLst/>
+          </a:prstGeom>
+        </p:spPr>
+        <p:style>
+          <a:lnRef idx="3">
+            <a:schemeClr val="dk1"/>
+          </a:lnRef>
+          <a:fillRef idx="0">
+            <a:schemeClr val="dk1"/>
+          </a:fillRef>
+          <a:effectRef idx="2">
+            <a:schemeClr val="dk1"/>
+          </a:effectRef>
+          <a:fontRef idx="minor">
+            <a:schemeClr val="tx1"/>
+          </a:fontRef>
+        </p:style>
+      </p:cxnSp>
+      <p:grpSp>
+        <p:nvGrpSpPr>
+          <p:cNvPr id="73" name="Group 72"/>
+          <p:cNvGrpSpPr/>
+          <p:nvPr/>
+        </p:nvGrpSpPr>
+        <p:grpSpPr>
+          <a:xfrm>
+            <a:off x="8755665" y="1690580"/>
+            <a:ext cx="2854825" cy="1131195"/>
+            <a:chOff x="2658533" y="-24488"/>
+            <a:chExt cx="1811868" cy="2136739"/>
+          </a:xfrm>
+        </p:grpSpPr>
+        <p:sp>
+          <p:nvSpPr>
+            <p:cNvPr id="74" name="Rectangle 73"/>
+            <p:cNvSpPr/>
+            <p:nvPr/>
+          </p:nvSpPr>
+          <p:spPr>
+            <a:xfrm>
+              <a:off x="2658533" y="-24488"/>
+              <a:ext cx="1811868" cy="667955"/>
+            </a:xfrm>
+            <a:prstGeom prst="rect">
+              <a:avLst/>
+            </a:prstGeom>
+          </p:spPr>
+          <p:style>
+            <a:lnRef idx="2">
+              <a:schemeClr val="dk1"/>
+            </a:lnRef>
+            <a:fillRef idx="1">
+              <a:schemeClr val="lt1"/>
+            </a:fillRef>
+            <a:effectRef idx="0">
+              <a:schemeClr val="dk1"/>
+            </a:effectRef>
+            <a:fontRef idx="minor">
+              <a:schemeClr val="dk1"/>
+            </a:fontRef>
+          </p:style>
+          <p:txBody>
+            <a:bodyPr rot="0" spcFirstLastPara="0" vertOverflow="overflow" horzOverflow="overflow" vert="horz" wrap="square" lIns="91440" tIns="45720" rIns="91440" bIns="45720" numCol="1" spcCol="0" rtlCol="0" fromWordArt="0" anchor="ctr" anchorCtr="0" forceAA="0" compatLnSpc="1">
+              <a:prstTxWarp prst="textNoShape">
+                <a:avLst/>
+              </a:prstTxWarp>
+              <a:noAutofit/>
+            </a:bodyPr>
+            <a:lstStyle/>
+            <a:p>
+              <a:pPr algn="ctr"/>
+              <a:r>
+                <a:rPr lang="en-US" sz="1800" dirty="0" err="1" smtClean="0"/>
+                <a:t>LoginPage</a:t>
+              </a:r>
+              <a:endParaRPr lang="en-US" sz="1800" dirty="0"/>
+            </a:p>
+          </p:txBody>
+        </p:sp>
+        <p:sp>
+          <p:nvSpPr>
+            <p:cNvPr id="75" name="Rectangle 74"/>
+            <p:cNvSpPr/>
+            <p:nvPr/>
+          </p:nvSpPr>
+          <p:spPr>
+            <a:xfrm>
+              <a:off x="2658533" y="643467"/>
+              <a:ext cx="1811868" cy="1468784"/>
+            </a:xfrm>
+            <a:prstGeom prst="rect">
+              <a:avLst/>
+            </a:prstGeom>
+          </p:spPr>
+          <p:style>
+            <a:lnRef idx="2">
+              <a:schemeClr val="dk1"/>
+            </a:lnRef>
+            <a:fillRef idx="1">
+              <a:schemeClr val="lt1"/>
+            </a:fillRef>
+            <a:effectRef idx="0">
+              <a:schemeClr val="dk1"/>
+            </a:effectRef>
+            <a:fontRef idx="minor">
+              <a:schemeClr val="dk1"/>
+            </a:fontRef>
+          </p:style>
+          <p:txBody>
+            <a:bodyPr rot="0" spcFirstLastPara="0" vertOverflow="overflow" horzOverflow="overflow" vert="horz" wrap="square" lIns="91440" tIns="45720" rIns="91440" bIns="45720" numCol="1" spcCol="0" rtlCol="0" fromWordArt="0" anchor="ctr" anchorCtr="0" forceAA="0" compatLnSpc="1">
+              <a:prstTxWarp prst="textNoShape">
+                <a:avLst/>
+              </a:prstTxWarp>
+              <a:noAutofit/>
+            </a:bodyPr>
+            <a:lstStyle/>
+            <a:p>
+              <a:pPr marL="285750" indent="-285750">
+                <a:buFontTx/>
+                <a:buChar char="-"/>
+              </a:pPr>
+              <a:r>
+                <a:rPr lang="en-US" sz="1800" dirty="0" err="1" smtClean="0"/>
+                <a:t>doLogin</a:t>
+              </a:r>
+              <a:r>
+                <a:rPr lang="en-US" sz="1800" dirty="0" smtClean="0"/>
+                <a:t>()</a:t>
+              </a:r>
+            </a:p>
+            <a:p>
+              <a:endParaRPr lang="en-US" sz="1800" dirty="0" smtClean="0"/>
+            </a:p>
+          </p:txBody>
+        </p:sp>
+      </p:grpSp>
+      <p:grpSp>
+        <p:nvGrpSpPr>
+          <p:cNvPr id="76" name="Group 75"/>
+          <p:cNvGrpSpPr/>
+          <p:nvPr/>
+        </p:nvGrpSpPr>
+        <p:grpSpPr>
+          <a:xfrm>
+            <a:off x="8765345" y="182239"/>
+            <a:ext cx="3002461" cy="1212930"/>
+            <a:chOff x="2658533" y="-24488"/>
+            <a:chExt cx="1811868" cy="1697125"/>
+          </a:xfrm>
+        </p:grpSpPr>
+        <p:sp>
+          <p:nvSpPr>
+            <p:cNvPr id="77" name="Rectangle 76"/>
+            <p:cNvSpPr/>
+            <p:nvPr/>
+          </p:nvSpPr>
+          <p:spPr>
+            <a:xfrm>
+              <a:off x="2658533" y="-24488"/>
+              <a:ext cx="1811868" cy="667955"/>
+            </a:xfrm>
+            <a:prstGeom prst="rect">
+              <a:avLst/>
+            </a:prstGeom>
+          </p:spPr>
+          <p:style>
+            <a:lnRef idx="2">
+              <a:schemeClr val="dk1"/>
+            </a:lnRef>
+            <a:fillRef idx="1">
+              <a:schemeClr val="lt1"/>
+            </a:fillRef>
+            <a:effectRef idx="0">
+              <a:schemeClr val="dk1"/>
+            </a:effectRef>
+            <a:fontRef idx="minor">
+              <a:schemeClr val="dk1"/>
+            </a:fontRef>
+          </p:style>
+          <p:txBody>
+            <a:bodyPr rot="0" spcFirstLastPara="0" vertOverflow="overflow" horzOverflow="overflow" vert="horz" wrap="square" lIns="91440" tIns="45720" rIns="91440" bIns="45720" numCol="1" spcCol="0" rtlCol="0" fromWordArt="0" anchor="ctr" anchorCtr="0" forceAA="0" compatLnSpc="1">
+              <a:prstTxWarp prst="textNoShape">
+                <a:avLst/>
+              </a:prstTxWarp>
+              <a:noAutofit/>
+            </a:bodyPr>
+            <a:lstStyle/>
+            <a:p>
+              <a:pPr algn="ctr"/>
+              <a:r>
+                <a:rPr lang="en-US" sz="1800" dirty="0" err="1" smtClean="0"/>
+                <a:t>HomePage</a:t>
+              </a:r>
+              <a:endParaRPr lang="en-US" sz="1800" dirty="0" smtClean="0"/>
+            </a:p>
+          </p:txBody>
+        </p:sp>
+        <p:sp>
+          <p:nvSpPr>
+            <p:cNvPr id="78" name="Rectangle 77"/>
+            <p:cNvSpPr/>
+            <p:nvPr/>
+          </p:nvSpPr>
+          <p:spPr>
+            <a:xfrm>
+              <a:off x="2658533" y="643468"/>
+              <a:ext cx="1811868" cy="1029169"/>
+            </a:xfrm>
+            <a:prstGeom prst="rect">
+              <a:avLst/>
+            </a:prstGeom>
+          </p:spPr>
+          <p:style>
+            <a:lnRef idx="2">
+              <a:schemeClr val="dk1"/>
+            </a:lnRef>
+            <a:fillRef idx="1">
+              <a:schemeClr val="lt1"/>
+            </a:fillRef>
+            <a:effectRef idx="0">
+              <a:schemeClr val="dk1"/>
+            </a:effectRef>
+            <a:fontRef idx="minor">
+              <a:schemeClr val="dk1"/>
+            </a:fontRef>
+          </p:style>
+          <p:txBody>
+            <a:bodyPr rot="0" spcFirstLastPara="0" vertOverflow="overflow" horzOverflow="overflow" vert="horz" wrap="square" lIns="91440" tIns="45720" rIns="91440" bIns="45720" numCol="1" spcCol="0" rtlCol="0" fromWordArt="0" anchor="ctr" anchorCtr="0" forceAA="0" compatLnSpc="1">
+              <a:prstTxWarp prst="textNoShape">
+                <a:avLst/>
+              </a:prstTxWarp>
+              <a:noAutofit/>
+            </a:bodyPr>
+            <a:lstStyle/>
+            <a:p>
+              <a:endParaRPr lang="en-US" sz="1800" dirty="0" smtClean="0"/>
+            </a:p>
+          </p:txBody>
+        </p:sp>
+      </p:grpSp>
+      <p:grpSp>
+        <p:nvGrpSpPr>
+          <p:cNvPr id="80" name="Group 79"/>
+          <p:cNvGrpSpPr/>
+          <p:nvPr/>
+        </p:nvGrpSpPr>
+        <p:grpSpPr>
+          <a:xfrm>
+            <a:off x="8765344" y="2998828"/>
+            <a:ext cx="2854825" cy="1131195"/>
+            <a:chOff x="2658533" y="-24488"/>
+            <a:chExt cx="1811868" cy="2136739"/>
+          </a:xfrm>
+        </p:grpSpPr>
+        <p:sp>
+          <p:nvSpPr>
+            <p:cNvPr id="81" name="Rectangle 80"/>
+            <p:cNvSpPr/>
+            <p:nvPr/>
+          </p:nvSpPr>
+          <p:spPr>
+            <a:xfrm>
+              <a:off x="2658533" y="-24488"/>
+              <a:ext cx="1811868" cy="667955"/>
+            </a:xfrm>
+            <a:prstGeom prst="rect">
+              <a:avLst/>
+            </a:prstGeom>
+          </p:spPr>
+          <p:style>
+            <a:lnRef idx="2">
+              <a:schemeClr val="dk1"/>
+            </a:lnRef>
+            <a:fillRef idx="1">
+              <a:schemeClr val="lt1"/>
+            </a:fillRef>
+            <a:effectRef idx="0">
+              <a:schemeClr val="dk1"/>
+            </a:effectRef>
+            <a:fontRef idx="minor">
+              <a:schemeClr val="dk1"/>
+            </a:fontRef>
+          </p:style>
+          <p:txBody>
+            <a:bodyPr rot="0" spcFirstLastPara="0" vertOverflow="overflow" horzOverflow="overflow" vert="horz" wrap="square" lIns="91440" tIns="45720" rIns="91440" bIns="45720" numCol="1" spcCol="0" rtlCol="0" fromWordArt="0" anchor="ctr" anchorCtr="0" forceAA="0" compatLnSpc="1">
+              <a:prstTxWarp prst="textNoShape">
+                <a:avLst/>
+              </a:prstTxWarp>
+              <a:noAutofit/>
+            </a:bodyPr>
+            <a:lstStyle/>
+            <a:p>
+              <a:pPr algn="ctr"/>
+              <a:r>
+                <a:rPr lang="en-US" sz="1800" dirty="0" err="1" smtClean="0"/>
+                <a:t>tournamentPage</a:t>
+              </a:r>
+              <a:endParaRPr lang="en-US" sz="1800" dirty="0"/>
+            </a:p>
+          </p:txBody>
+        </p:sp>
+        <p:sp>
+          <p:nvSpPr>
+            <p:cNvPr id="82" name="Rectangle 81"/>
+            <p:cNvSpPr/>
+            <p:nvPr/>
+          </p:nvSpPr>
+          <p:spPr>
+            <a:xfrm>
+              <a:off x="2658533" y="643467"/>
+              <a:ext cx="1811868" cy="1468784"/>
+            </a:xfrm>
+            <a:prstGeom prst="rect">
+              <a:avLst/>
+            </a:prstGeom>
+          </p:spPr>
+          <p:style>
+            <a:lnRef idx="2">
+              <a:schemeClr val="dk1"/>
+            </a:lnRef>
+            <a:fillRef idx="1">
+              <a:schemeClr val="lt1"/>
+            </a:fillRef>
+            <a:effectRef idx="0">
+              <a:schemeClr val="dk1"/>
+            </a:effectRef>
+            <a:fontRef idx="minor">
+              <a:schemeClr val="dk1"/>
+            </a:fontRef>
+          </p:style>
+          <p:txBody>
+            <a:bodyPr rot="0" spcFirstLastPara="0" vertOverflow="overflow" horzOverflow="overflow" vert="horz" wrap="square" lIns="91440" tIns="45720" rIns="91440" bIns="45720" numCol="1" spcCol="0" rtlCol="0" fromWordArt="0" anchor="ctr" anchorCtr="0" forceAA="0" compatLnSpc="1">
+              <a:prstTxWarp prst="textNoShape">
+                <a:avLst/>
+              </a:prstTxWarp>
+              <a:noAutofit/>
+            </a:bodyPr>
+            <a:lstStyle/>
+            <a:p>
+              <a:pPr marL="285750" indent="-285750">
+                <a:buFontTx/>
+                <a:buChar char="-"/>
+              </a:pPr>
+              <a:r>
+                <a:rPr lang="en-US" sz="1800" dirty="0" err="1" smtClean="0"/>
+                <a:t>getMatch</a:t>
+              </a:r>
+              <a:r>
+                <a:rPr lang="en-US" sz="1800" dirty="0" smtClean="0"/>
+                <a:t>()</a:t>
+              </a:r>
+            </a:p>
+            <a:p>
+              <a:pPr marL="285750" indent="-285750">
+                <a:buFontTx/>
+                <a:buChar char="-"/>
+              </a:pPr>
+              <a:r>
+                <a:rPr lang="en-US" sz="1800" dirty="0" err="1" smtClean="0"/>
+                <a:t>changeSettings</a:t>
+              </a:r>
+              <a:r>
+                <a:rPr lang="en-US" sz="1800" dirty="0" smtClean="0"/>
+                <a:t>()</a:t>
+              </a:r>
+            </a:p>
+            <a:p>
+              <a:endParaRPr lang="en-US" sz="1800" dirty="0" smtClean="0"/>
+            </a:p>
+          </p:txBody>
+        </p:sp>
+      </p:grpSp>
+      <p:cxnSp>
+        <p:nvCxnSpPr>
+          <p:cNvPr id="83" name="Straight Connector 82"/>
+          <p:cNvCxnSpPr/>
+          <p:nvPr/>
+        </p:nvCxnSpPr>
+        <p:spPr>
+          <a:xfrm flipV="1">
+            <a:off x="6414027" y="3514101"/>
+            <a:ext cx="2341637" cy="9466"/>
+          </a:xfrm>
+          <a:prstGeom prst="line">
+            <a:avLst/>
+          </a:prstGeom>
+        </p:spPr>
+        <p:style>
+          <a:lnRef idx="3">
+            <a:schemeClr val="dk1"/>
+          </a:lnRef>
+          <a:fillRef idx="0">
+            <a:schemeClr val="dk1"/>
+          </a:fillRef>
+          <a:effectRef idx="2">
+            <a:schemeClr val="dk1"/>
+          </a:effectRef>
+          <a:fontRef idx="minor">
+            <a:schemeClr val="tx1"/>
+          </a:fontRef>
+        </p:style>
+      </p:cxnSp>
+      <p:cxnSp>
+        <p:nvCxnSpPr>
+          <p:cNvPr id="84" name="Straight Connector 83"/>
+          <p:cNvCxnSpPr/>
+          <p:nvPr/>
+        </p:nvCxnSpPr>
+        <p:spPr>
+          <a:xfrm flipV="1">
+            <a:off x="6414026" y="4817710"/>
+            <a:ext cx="2341637" cy="9466"/>
+          </a:xfrm>
+          <a:prstGeom prst="line">
+            <a:avLst/>
+          </a:prstGeom>
+        </p:spPr>
+        <p:style>
+          <a:lnRef idx="3">
+            <a:schemeClr val="dk1"/>
+          </a:lnRef>
+          <a:fillRef idx="0">
+            <a:schemeClr val="dk1"/>
+          </a:fillRef>
+          <a:effectRef idx="2">
+            <a:schemeClr val="dk1"/>
+          </a:effectRef>
+          <a:fontRef idx="minor">
+            <a:schemeClr val="tx1"/>
+          </a:fontRef>
+        </p:style>
+      </p:cxnSp>
+      <p:grpSp>
+        <p:nvGrpSpPr>
+          <p:cNvPr id="85" name="Group 84"/>
+          <p:cNvGrpSpPr/>
+          <p:nvPr/>
+        </p:nvGrpSpPr>
+        <p:grpSpPr>
+          <a:xfrm>
+            <a:off x="8755663" y="4455833"/>
+            <a:ext cx="2854825" cy="1131195"/>
+            <a:chOff x="2658533" y="-24488"/>
+            <a:chExt cx="1811868" cy="2136739"/>
+          </a:xfrm>
+        </p:grpSpPr>
+        <p:sp>
+          <p:nvSpPr>
+            <p:cNvPr id="86" name="Rectangle 85"/>
+            <p:cNvSpPr/>
+            <p:nvPr/>
+          </p:nvSpPr>
+          <p:spPr>
+            <a:xfrm>
+              <a:off x="2658533" y="-24488"/>
+              <a:ext cx="1811868" cy="667955"/>
+            </a:xfrm>
+            <a:prstGeom prst="rect">
+              <a:avLst/>
+            </a:prstGeom>
+          </p:spPr>
+          <p:style>
+            <a:lnRef idx="2">
+              <a:schemeClr val="dk1"/>
+            </a:lnRef>
+            <a:fillRef idx="1">
+              <a:schemeClr val="lt1"/>
+            </a:fillRef>
+            <a:effectRef idx="0">
+              <a:schemeClr val="dk1"/>
+            </a:effectRef>
+            <a:fontRef idx="minor">
+              <a:schemeClr val="dk1"/>
+            </a:fontRef>
+          </p:style>
+          <p:txBody>
+            <a:bodyPr rot="0" spcFirstLastPara="0" vertOverflow="overflow" horzOverflow="overflow" vert="horz" wrap="square" lIns="91440" tIns="45720" rIns="91440" bIns="45720" numCol="1" spcCol="0" rtlCol="0" fromWordArt="0" anchor="ctr" anchorCtr="0" forceAA="0" compatLnSpc="1">
+              <a:prstTxWarp prst="textNoShape">
+                <a:avLst/>
+              </a:prstTxWarp>
+              <a:noAutofit/>
+            </a:bodyPr>
+            <a:lstStyle/>
+            <a:p>
+              <a:pPr algn="ctr"/>
+              <a:r>
+                <a:rPr lang="en-US" sz="1800" dirty="0" err="1" smtClean="0"/>
+                <a:t>MatchPage</a:t>
+              </a:r>
+              <a:endParaRPr lang="en-US" sz="1800" dirty="0"/>
+            </a:p>
+          </p:txBody>
+        </p:sp>
+        <p:sp>
+          <p:nvSpPr>
+            <p:cNvPr id="87" name="Rectangle 86"/>
+            <p:cNvSpPr/>
+            <p:nvPr/>
+          </p:nvSpPr>
+          <p:spPr>
+            <a:xfrm>
+              <a:off x="2658533" y="643467"/>
+              <a:ext cx="1811868" cy="1468784"/>
+            </a:xfrm>
+            <a:prstGeom prst="rect">
+              <a:avLst/>
+            </a:prstGeom>
+          </p:spPr>
+          <p:style>
+            <a:lnRef idx="2">
+              <a:schemeClr val="dk1"/>
+            </a:lnRef>
+            <a:fillRef idx="1">
+              <a:schemeClr val="lt1"/>
+            </a:fillRef>
+            <a:effectRef idx="0">
+              <a:schemeClr val="dk1"/>
+            </a:effectRef>
+            <a:fontRef idx="minor">
+              <a:schemeClr val="dk1"/>
+            </a:fontRef>
+          </p:style>
+          <p:txBody>
+            <a:bodyPr rot="0" spcFirstLastPara="0" vertOverflow="overflow" horzOverflow="overflow" vert="horz" wrap="square" lIns="91440" tIns="45720" rIns="91440" bIns="45720" numCol="1" spcCol="0" rtlCol="0" fromWordArt="0" anchor="ctr" anchorCtr="0" forceAA="0" compatLnSpc="1">
+              <a:prstTxWarp prst="textNoShape">
+                <a:avLst/>
+              </a:prstTxWarp>
+              <a:noAutofit/>
+            </a:bodyPr>
+            <a:lstStyle/>
+            <a:p>
+              <a:pPr marL="285750" indent="-285750">
+                <a:buFontTx/>
+                <a:buChar char="-"/>
+              </a:pPr>
+              <a:r>
+                <a:rPr lang="en-US" sz="1800" dirty="0" err="1" smtClean="0"/>
+                <a:t>getPlayer</a:t>
+              </a:r>
+              <a:r>
+                <a:rPr lang="en-US" sz="1800" dirty="0" smtClean="0"/>
+                <a:t>()</a:t>
+              </a:r>
+            </a:p>
+            <a:p>
+              <a:pPr marL="285750" indent="-285750">
+                <a:buFontTx/>
+                <a:buChar char="-"/>
+              </a:pPr>
+              <a:r>
+                <a:rPr lang="en-US" sz="1800" dirty="0" err="1" smtClean="0"/>
+                <a:t>submitReviews</a:t>
+              </a:r>
+              <a:r>
+                <a:rPr lang="en-US" sz="1800" dirty="0" smtClean="0"/>
+                <a:t>()</a:t>
+              </a:r>
+            </a:p>
+            <a:p>
+              <a:endParaRPr lang="en-US" sz="1800" dirty="0" smtClean="0"/>
+            </a:p>
+          </p:txBody>
+        </p:sp>
+      </p:grpSp>
+      <p:cxnSp>
+        <p:nvCxnSpPr>
+          <p:cNvPr id="89" name="Straight Connector 88"/>
+          <p:cNvCxnSpPr/>
+          <p:nvPr/>
+        </p:nvCxnSpPr>
+        <p:spPr>
+          <a:xfrm flipV="1">
+            <a:off x="6414025" y="6056490"/>
+            <a:ext cx="2341637" cy="9466"/>
+          </a:xfrm>
+          <a:prstGeom prst="line">
+            <a:avLst/>
+          </a:prstGeom>
+        </p:spPr>
+        <p:style>
+          <a:lnRef idx="3">
+            <a:schemeClr val="dk1"/>
+          </a:lnRef>
+          <a:fillRef idx="0">
+            <a:schemeClr val="dk1"/>
+          </a:fillRef>
+          <a:effectRef idx="2">
+            <a:schemeClr val="dk1"/>
+          </a:effectRef>
+          <a:fontRef idx="minor">
+            <a:schemeClr val="tx1"/>
+          </a:fontRef>
+        </p:style>
+      </p:cxnSp>
+      <p:grpSp>
+        <p:nvGrpSpPr>
+          <p:cNvPr id="90" name="Group 89"/>
+          <p:cNvGrpSpPr/>
+          <p:nvPr/>
+        </p:nvGrpSpPr>
+        <p:grpSpPr>
+          <a:xfrm>
+            <a:off x="8693899" y="5850307"/>
+            <a:ext cx="2854825" cy="1131195"/>
+            <a:chOff x="2658533" y="-24488"/>
+            <a:chExt cx="1811868" cy="2136739"/>
+          </a:xfrm>
+        </p:grpSpPr>
+        <p:sp>
+          <p:nvSpPr>
+            <p:cNvPr id="91" name="Rectangle 90"/>
+            <p:cNvSpPr/>
+            <p:nvPr/>
+          </p:nvSpPr>
+          <p:spPr>
+            <a:xfrm>
+              <a:off x="2658533" y="-24488"/>
+              <a:ext cx="1811868" cy="667955"/>
+            </a:xfrm>
+            <a:prstGeom prst="rect">
+              <a:avLst/>
+            </a:prstGeom>
+          </p:spPr>
+          <p:style>
+            <a:lnRef idx="2">
+              <a:schemeClr val="dk1"/>
+            </a:lnRef>
+            <a:fillRef idx="1">
+              <a:schemeClr val="lt1"/>
+            </a:fillRef>
+            <a:effectRef idx="0">
+              <a:schemeClr val="dk1"/>
+            </a:effectRef>
+            <a:fontRef idx="minor">
+              <a:schemeClr val="dk1"/>
+            </a:fontRef>
+          </p:style>
+          <p:txBody>
+            <a:bodyPr rot="0" spcFirstLastPara="0" vertOverflow="overflow" horzOverflow="overflow" vert="horz" wrap="square" lIns="91440" tIns="45720" rIns="91440" bIns="45720" numCol="1" spcCol="0" rtlCol="0" fromWordArt="0" anchor="ctr" anchorCtr="0" forceAA="0" compatLnSpc="1">
+              <a:prstTxWarp prst="textNoShape">
+                <a:avLst/>
+              </a:prstTxWarp>
+              <a:noAutofit/>
+            </a:bodyPr>
+            <a:lstStyle/>
+            <a:p>
+              <a:pPr algn="ctr"/>
+              <a:r>
+                <a:rPr lang="en-US" sz="1800" dirty="0" err="1" smtClean="0"/>
+                <a:t>PlayerPage</a:t>
+              </a:r>
+              <a:endParaRPr lang="en-US" sz="1800" dirty="0"/>
+            </a:p>
+          </p:txBody>
+        </p:sp>
+        <p:sp>
+          <p:nvSpPr>
+            <p:cNvPr id="92" name="Rectangle 91"/>
+            <p:cNvSpPr/>
+            <p:nvPr/>
+          </p:nvSpPr>
+          <p:spPr>
+            <a:xfrm>
+              <a:off x="2658533" y="643467"/>
+              <a:ext cx="1811868" cy="1468784"/>
+            </a:xfrm>
+            <a:prstGeom prst="rect">
+              <a:avLst/>
+            </a:prstGeom>
+          </p:spPr>
+          <p:style>
+            <a:lnRef idx="2">
+              <a:schemeClr val="dk1"/>
+            </a:lnRef>
+            <a:fillRef idx="1">
+              <a:schemeClr val="lt1"/>
+            </a:fillRef>
+            <a:effectRef idx="0">
+              <a:schemeClr val="dk1"/>
+            </a:effectRef>
+            <a:fontRef idx="minor">
+              <a:schemeClr val="dk1"/>
+            </a:fontRef>
+          </p:style>
+          <p:txBody>
+            <a:bodyPr rot="0" spcFirstLastPara="0" vertOverflow="overflow" horzOverflow="overflow" vert="horz" wrap="square" lIns="91440" tIns="45720" rIns="91440" bIns="45720" numCol="1" spcCol="0" rtlCol="0" fromWordArt="0" anchor="ctr" anchorCtr="0" forceAA="0" compatLnSpc="1">
+              <a:prstTxWarp prst="textNoShape">
+                <a:avLst/>
+              </a:prstTxWarp>
+              <a:noAutofit/>
+            </a:bodyPr>
+            <a:lstStyle/>
+            <a:p>
+              <a:pPr marL="285750" indent="-285750">
+                <a:buFontTx/>
+                <a:buChar char="-"/>
+              </a:pPr>
+              <a:r>
+                <a:rPr lang="en-US" sz="1800" dirty="0" err="1" smtClean="0"/>
+                <a:t>changeProfile</a:t>
+              </a:r>
+              <a:r>
+                <a:rPr lang="en-US" sz="1800" dirty="0" smtClean="0"/>
+                <a:t>()</a:t>
+              </a:r>
+            </a:p>
+            <a:p>
+              <a:pPr marL="285750" indent="-285750">
+                <a:buFontTx/>
+                <a:buChar char="-"/>
+              </a:pPr>
+              <a:r>
+                <a:rPr lang="en-US" sz="1800" dirty="0" err="1" smtClean="0"/>
+                <a:t>getReviews</a:t>
+              </a:r>
+              <a:r>
+                <a:rPr lang="en-US" sz="1800" dirty="0" smtClean="0"/>
+                <a:t>()</a:t>
+              </a:r>
+            </a:p>
+          </p:txBody>
+        </p:sp>
+      </p:grpSp>
+      <p:sp>
+        <p:nvSpPr>
+          <p:cNvPr id="96" name="Rectangle 95"/>
+          <p:cNvSpPr/>
+          <p:nvPr/>
+        </p:nvSpPr>
+        <p:spPr>
+          <a:xfrm>
+            <a:off x="2163128" y="5672676"/>
+            <a:ext cx="1199559" cy="584775"/>
+          </a:xfrm>
+          <a:prstGeom prst="rect">
+            <a:avLst/>
+          </a:prstGeom>
+          <a:noFill/>
+        </p:spPr>
+        <p:txBody>
+          <a:bodyPr wrap="none">
+            <a:spAutoFit/>
+          </a:bodyPr>
+          <a:lstStyle/>
+          <a:p>
+            <a:pPr algn="ctr"/>
+            <a:r>
+              <a:rPr lang="en-US" sz="3200" b="1" dirty="0" smtClean="0">
+                <a:ln w="0"/>
+                <a:solidFill>
+                  <a:schemeClr val="bg1"/>
+                </a:solidFill>
+                <a:effectLst>
+                  <a:outerShdw blurRad="38100" dist="19050" dir="2700000" algn="tl" rotWithShape="0">
+                    <a:schemeClr val="dk1">
+                      <a:alpha val="40000"/>
+                    </a:schemeClr>
+                  </a:outerShdw>
+                </a:effectLst>
+              </a:rPr>
+              <a:t>Views</a:t>
+            </a:r>
+            <a:endParaRPr lang="en-US" sz="3200" b="1" dirty="0">
+              <a:ln w="0"/>
+              <a:solidFill>
+                <a:schemeClr val="bg1"/>
+              </a:solidFill>
+              <a:effectLst>
+                <a:outerShdw blurRad="38100" dist="19050" dir="2700000" algn="tl" rotWithShape="0">
+                  <a:schemeClr val="dk1">
+                    <a:alpha val="40000"/>
+                  </a:schemeClr>
+                </a:outerShdw>
+              </a:effectLst>
+            </a:endParaRPr>
+          </a:p>
+        </p:txBody>
+      </p:sp>
+      <p:sp>
+        <p:nvSpPr>
+          <p:cNvPr id="98" name="Rectangle 97"/>
+          <p:cNvSpPr/>
+          <p:nvPr/>
+        </p:nvSpPr>
+        <p:spPr>
+          <a:xfrm>
+            <a:off x="1017343" y="13120416"/>
+            <a:ext cx="1455848" cy="584775"/>
+          </a:xfrm>
+          <a:prstGeom prst="rect">
+            <a:avLst/>
+          </a:prstGeom>
+          <a:noFill/>
+        </p:spPr>
+        <p:txBody>
+          <a:bodyPr wrap="none">
+            <a:spAutoFit/>
+          </a:bodyPr>
+          <a:lstStyle/>
+          <a:p>
+            <a:pPr algn="ctr"/>
+            <a:r>
+              <a:rPr lang="en-US" sz="3200" b="1" smtClean="0">
+                <a:ln w="0"/>
+                <a:solidFill>
+                  <a:schemeClr val="bg1"/>
+                </a:solidFill>
+                <a:effectLst>
+                  <a:outerShdw blurRad="38100" dist="19050" dir="2700000" algn="tl" rotWithShape="0">
+                    <a:schemeClr val="dk1">
+                      <a:alpha val="40000"/>
+                    </a:schemeClr>
+                  </a:outerShdw>
+                </a:effectLst>
+              </a:rPr>
+              <a:t>Models</a:t>
+            </a:r>
+            <a:endParaRPr lang="en-US" sz="3200" b="1" dirty="0">
+              <a:ln w="0"/>
+              <a:solidFill>
+                <a:schemeClr val="bg1"/>
+              </a:solidFill>
+              <a:effectLst>
+                <a:outerShdw blurRad="38100" dist="19050" dir="2700000" algn="tl" rotWithShape="0">
+                  <a:schemeClr val="dk1">
+                    <a:alpha val="40000"/>
+                  </a:schemeClr>
+                </a:outerShdw>
+              </a:effectLst>
+            </a:endParaRPr>
+          </a:p>
+        </p:txBody>
+      </p:sp>
+    </p:spTree>
+    <p:extLst>
+      <p:ext uri="{BB962C8B-B14F-4D97-AF65-F5344CB8AC3E}">
+        <p14:creationId xmlns:p14="http://schemas.microsoft.com/office/powerpoint/2010/main" val="2492867914"/>
+      </p:ext>
+    </p:extLst>
+  </p:cSld>
+  <p:clrMapOvr>
+    <a:masterClrMapping/>
+  </p:clrMapOvr>
+  <p:timing>
+    <p:tnLst>
+      <p:par>
+        <p:cTn id="1" dur="indefinite" restart="never" nodeType="tmRoot"/>
+      </p:par>
+    </p:tnLst>
+  </p:timing>
 </p:sld>
 </file>
 
 <file path=ppt/theme/theme1.xml><?xml version="1.0" encoding="utf-8"?>
 <a:theme xmlns:a="http://schemas.openxmlformats.org/drawingml/2006/main" name="Office Theme">
   <a:themeElements>
-    <a:clrScheme name="Office">
+    <a:clrScheme name="Office Theme">
       <a:dk1>
         <a:sysClr val="windowText" lastClr="000000"/>
       </a:dk1>
@@ -3606,7 +6530,7 @@
         <a:srgbClr val="954F72"/>
       </a:folHlink>
     </a:clrScheme>
-    <a:fontScheme name="Office">
+    <a:fontScheme name="Office Theme">
       <a:majorFont>
         <a:latin typeface="Calibri Light" panose="020F0302020204030204"/>
         <a:ea typeface=""/>
@@ -3678,7 +6602,7 @@
         <a:font script="Geor" typeface="Sylfaen"/>
       </a:minorFont>
     </a:fontScheme>
-    <a:fmtScheme name="Office">
+    <a:fmtScheme name="Office Theme">
       <a:fillStyleLst>
         <a:solidFill>
           <a:schemeClr val="phClr"/>

</xml_diff>

<commit_message>
Updated UML on powerpoint
please add anything
</commit_message>
<xml_diff>
--- a/docs/Images.pptx
+++ b/docs/Images.pptx
@@ -3012,7 +3012,6 @@
               <a:rPr lang="en-US" sz="3200" dirty="0"/>
               <a:t>Database (MySQL)</a:t>
             </a:r>
-            <a:endParaRPr lang="en-US" sz="3200" dirty="0"/>
           </a:p>
         </p:txBody>
       </p:sp>
@@ -3261,7 +3260,6 @@
               <a:rPr lang="en-US" sz="2000" dirty="0"/>
               <a:t>(webpages)</a:t>
             </a:r>
-            <a:endParaRPr lang="en-US" sz="2000" dirty="0"/>
           </a:p>
         </p:txBody>
       </p:sp>
@@ -3312,7 +3310,6 @@
               <a:rPr lang="en-US" sz="2000" dirty="0"/>
               <a:t>Ruby-Rails classes</a:t>
             </a:r>
-            <a:endParaRPr lang="en-US" sz="2000" dirty="0"/>
           </a:p>
         </p:txBody>
       </p:sp>
@@ -3544,16 +3541,6 @@
               </a:rPr>
               <a:t>Leaguer Code</a:t>
             </a:r>
-            <a:endParaRPr lang="en-US" sz="4000" dirty="0">
-              <a:ln w="0"/>
-              <a:effectLst>
-                <a:outerShdw blurRad="38100" dist="19050" dir="2700000" algn="tl" rotWithShape="0">
-                  <a:schemeClr val="dk1">
-                    <a:alpha val="40000"/>
-                  </a:schemeClr>
-                </a:outerShdw>
-              </a:effectLst>
-            </a:endParaRPr>
           </a:p>
         </p:txBody>
       </p:sp>
@@ -3602,8 +3589,8 @@
         </p:nvSpPr>
         <p:spPr>
           <a:xfrm>
-            <a:off x="344602" y="10083010"/>
-            <a:ext cx="12153371" cy="7503075"/>
+            <a:off x="344602" y="9323736"/>
+            <a:ext cx="12153371" cy="8262350"/>
           </a:xfrm>
           <a:prstGeom prst="rect">
             <a:avLst/>
@@ -3788,11 +3775,25 @@
             </a:bodyPr>
             <a:lstStyle/>
             <a:p>
-              <a:pPr algn="ctr"/>
-              <a:r>
-                <a:rPr lang="en-US" sz="1800" dirty="0"/>
-                <a:t>built into rails</a:t>
-              </a:r>
+              <a:pPr marL="285750" indent="-285750">
+                <a:buFont typeface="Arial" panose="020B0604020202020204" pitchFamily="34" charset="0"/>
+                <a:buChar char="•"/>
+              </a:pPr>
+              <a:r>
+                <a:rPr lang="en-US" sz="1800" dirty="0" smtClean="0"/>
+                <a:t>settings</a:t>
+              </a:r>
+            </a:p>
+            <a:p>
+              <a:pPr marL="285750" indent="-285750">
+                <a:buFont typeface="Arial" panose="020B0604020202020204" pitchFamily="34" charset="0"/>
+                <a:buChar char="•"/>
+              </a:pPr>
+              <a:r>
+                <a:rPr lang="en-US" sz="1800" dirty="0" smtClean="0"/>
+                <a:t>language</a:t>
+              </a:r>
+              <a:endParaRPr lang="en-US" sz="1800" dirty="0" smtClean="0"/>
             </a:p>
           </p:txBody>
         </p:sp>
@@ -4083,9 +4084,10 @@
                 <a:buChar char="•"/>
               </a:pPr>
               <a:r>
-                <a:rPr lang="en-US" sz="1800" dirty="0"/>
-                <a:t>role</a:t>
-              </a:r>
+                <a:rPr lang="en-US" sz="1800" dirty="0" err="1" smtClean="0"/>
+                <a:t>accessLevel</a:t>
+              </a:r>
+              <a:endParaRPr lang="en-US" sz="1800" dirty="0"/>
             </a:p>
           </p:txBody>
         </p:sp>
@@ -4099,7 +4101,7 @@
         <p:grpSpPr>
           <a:xfrm>
             <a:off x="2341562" y="15770377"/>
-            <a:ext cx="1752600" cy="787399"/>
+            <a:ext cx="1752600" cy="994441"/>
             <a:chOff x="2658533" y="220130"/>
             <a:chExt cx="1811868" cy="2116669"/>
           </a:xfrm>
@@ -4113,7 +4115,7 @@
           <p:spPr>
             <a:xfrm>
               <a:off x="2658533" y="220130"/>
-              <a:ext cx="1811868" cy="1069710"/>
+              <a:ext cx="1811868" cy="747889"/>
             </a:xfrm>
             <a:prstGeom prst="rect">
               <a:avLst/>
@@ -4158,8 +4160,8 @@
           </p:nvSpPr>
           <p:spPr>
             <a:xfrm>
-              <a:off x="2658533" y="1289840"/>
-              <a:ext cx="1811868" cy="1046959"/>
+              <a:off x="2658533" y="968019"/>
+              <a:ext cx="1811868" cy="1368780"/>
             </a:xfrm>
             <a:prstGeom prst="rect">
               <a:avLst/>
@@ -4193,9 +4195,20 @@
                 <a:buChar char="•"/>
               </a:pPr>
               <a:r>
-                <a:rPr lang="en-US" sz="1800" dirty="0"/>
-                <a:t>role</a:t>
-              </a:r>
+                <a:rPr lang="en-US" sz="1800" dirty="0" smtClean="0"/>
+                <a:t>Tournament</a:t>
+              </a:r>
+            </a:p>
+            <a:p>
+              <a:pPr marL="285750" indent="-285750">
+                <a:buFont typeface="Arial" panose="020B0604020202020204" pitchFamily="34" charset="0"/>
+                <a:buChar char="•"/>
+              </a:pPr>
+              <a:r>
+                <a:rPr lang="en-US" sz="1800" dirty="0" smtClean="0"/>
+                <a:t>Team</a:t>
+              </a:r>
+              <a:endParaRPr lang="en-US" sz="1800" dirty="0"/>
             </a:p>
           </p:txBody>
         </p:sp>
@@ -4302,10 +4315,7 @@
                 <a:buFont typeface="Arial" panose="020B0604020202020204" pitchFamily="34" charset="0"/>
                 <a:buChar char="•"/>
               </a:pPr>
-              <a:r>
-                <a:rPr lang="en-US" sz="1800" dirty="0"/>
-                <a:t>role</a:t>
-              </a:r>
+              <a:endParaRPr lang="en-US" sz="1800" dirty="0"/>
             </a:p>
           </p:txBody>
         </p:sp>
@@ -4413,9 +4423,10 @@
                 <a:buChar char="•"/>
               </a:pPr>
               <a:r>
-                <a:rPr lang="en-US" sz="1800" dirty="0"/>
-                <a:t>role</a:t>
-              </a:r>
+                <a:rPr lang="en-US" sz="1800" dirty="0" smtClean="0"/>
+                <a:t>Tournament</a:t>
+              </a:r>
+              <a:endParaRPr lang="en-US" sz="1800" dirty="0"/>
             </a:p>
           </p:txBody>
         </p:sp>
@@ -4430,9 +4441,9 @@
           <p:nvPr/>
         </p:nvCxnSpPr>
         <p:spPr>
-          <a:xfrm>
-            <a:off x="3217862" y="15266610"/>
-            <a:ext cx="0" cy="503766"/>
+          <a:xfrm flipH="1">
+            <a:off x="3217862" y="15266611"/>
+            <a:ext cx="1" cy="503766"/>
           </a:xfrm>
           <a:prstGeom prst="line">
             <a:avLst/>
@@ -4678,8 +4689,8 @@
         </p:nvGrpSpPr>
         <p:grpSpPr>
           <a:xfrm>
-            <a:off x="3600979" y="10859658"/>
-            <a:ext cx="2624667" cy="2606190"/>
+            <a:off x="3315230" y="9985347"/>
+            <a:ext cx="2338694" cy="2606190"/>
             <a:chOff x="2658533" y="220133"/>
             <a:chExt cx="1811868" cy="2606190"/>
           </a:xfrm>
@@ -4837,10 +4848,10 @@
         </p:nvGrpSpPr>
         <p:grpSpPr>
           <a:xfrm>
-            <a:off x="6588766" y="10751270"/>
-            <a:ext cx="2624667" cy="2116666"/>
+            <a:off x="6434687" y="10031788"/>
+            <a:ext cx="2624667" cy="1474704"/>
             <a:chOff x="2658533" y="220133"/>
-            <a:chExt cx="1811868" cy="2116666"/>
+            <a:chExt cx="1811868" cy="1474704"/>
           </a:xfrm>
         </p:grpSpPr>
         <p:sp>
@@ -4898,7 +4909,7 @@
           <p:spPr>
             <a:xfrm>
               <a:off x="2658533" y="643467"/>
-              <a:ext cx="1811868" cy="1693332"/>
+              <a:ext cx="1811868" cy="1051370"/>
             </a:xfrm>
             <a:prstGeom prst="rect">
               <a:avLst/>
@@ -4931,10 +4942,18 @@
                 <a:buFont typeface="Arial" panose="020B0604020202020204" pitchFamily="34" charset="0"/>
                 <a:buChar char="•"/>
               </a:pPr>
-              <a:r>
-                <a:rPr lang="en-US" sz="1800" dirty="0"/>
+              <a:endParaRPr lang="en-US" sz="1800" dirty="0" smtClean="0"/>
+            </a:p>
+            <a:p>
+              <a:pPr marL="285750" indent="-285750">
+                <a:buFont typeface="Arial" panose="020B0604020202020204" pitchFamily="34" charset="0"/>
+                <a:buChar char="•"/>
+              </a:pPr>
+              <a:r>
+                <a:rPr lang="en-US" sz="1800" dirty="0" smtClean="0"/>
                 <a:t>Matches</a:t>
               </a:r>
+              <a:endParaRPr lang="en-US" sz="1800" dirty="0"/>
             </a:p>
             <a:p>
               <a:pPr marL="285750" indent="-285750">
@@ -4975,7 +4994,7 @@
         </p:nvGrpSpPr>
         <p:grpSpPr>
           <a:xfrm>
-            <a:off x="9617272" y="15182161"/>
+            <a:off x="9949655" y="14983195"/>
             <a:ext cx="2150534" cy="986147"/>
             <a:chOff x="2658533" y="885475"/>
             <a:chExt cx="1811868" cy="1451324"/>
@@ -5098,10 +5117,10 @@
         </p:nvGrpSpPr>
         <p:grpSpPr>
           <a:xfrm>
-            <a:off x="9418305" y="10346564"/>
-            <a:ext cx="2624667" cy="2116666"/>
-            <a:chOff x="2658533" y="220133"/>
-            <a:chExt cx="1811868" cy="2116666"/>
+            <a:off x="10149654" y="9938248"/>
+            <a:ext cx="2347230" cy="1494375"/>
+            <a:chOff x="2644364" y="220133"/>
+            <a:chExt cx="1814257" cy="1552334"/>
           </a:xfrm>
         </p:grpSpPr>
         <p:sp>
@@ -5112,7 +5131,7 @@
           </p:nvSpPr>
           <p:spPr>
             <a:xfrm>
-              <a:off x="2658533" y="220133"/>
+              <a:off x="2646753" y="220133"/>
               <a:ext cx="1811868" cy="423334"/>
             </a:xfrm>
             <a:prstGeom prst="rect">
@@ -5158,8 +5177,8 @@
           </p:nvSpPr>
           <p:spPr>
             <a:xfrm>
-              <a:off x="2658533" y="643467"/>
-              <a:ext cx="1811868" cy="1693332"/>
+              <a:off x="2644364" y="629704"/>
+              <a:ext cx="1811868" cy="1142763"/>
             </a:xfrm>
             <a:prstGeom prst="rect">
               <a:avLst/>
@@ -5192,20 +5211,14 @@
                 <a:buFont typeface="Arial" panose="020B0604020202020204" pitchFamily="34" charset="0"/>
                 <a:buChar char="•"/>
               </a:pPr>
-              <a:r>
-                <a:rPr lang="en-US" sz="1800" dirty="0"/>
-                <a:t>Team1</a:t>
-              </a:r>
+              <a:endParaRPr lang="en-US" sz="1800" dirty="0" smtClean="0"/>
             </a:p>
             <a:p>
               <a:pPr marL="285750" indent="-285750">
                 <a:buFont typeface="Arial" panose="020B0604020202020204" pitchFamily="34" charset="0"/>
                 <a:buChar char="•"/>
               </a:pPr>
-              <a:r>
-                <a:rPr lang="en-US" sz="1800" dirty="0"/>
-                <a:t>Team2</a:t>
-              </a:r>
+              <a:endParaRPr lang="en-US" sz="1800" dirty="0"/>
             </a:p>
             <a:p>
               <a:pPr marL="285750" indent="-285750">
@@ -5213,9 +5226,10 @@
                 <a:buChar char="•"/>
               </a:pPr>
               <a:r>
-                <a:rPr lang="en-US" sz="1800" dirty="0"/>
-                <a:t>Users</a:t>
-              </a:r>
+                <a:rPr lang="en-US" sz="1800" dirty="0" smtClean="0"/>
+                <a:t>Team1</a:t>
+              </a:r>
+              <a:endParaRPr lang="en-US" sz="1800" dirty="0"/>
             </a:p>
             <a:p>
               <a:pPr marL="285750" indent="-285750">
@@ -5223,9 +5237,21 @@
                 <a:buChar char="•"/>
               </a:pPr>
               <a:r>
-                <a:rPr lang="en-US" sz="1800" dirty="0" err="1"/>
-                <a:t>TournamentSettings</a:t>
-              </a:r>
+                <a:rPr lang="en-US" sz="1800" dirty="0"/>
+                <a:t>Team2</a:t>
+              </a:r>
+            </a:p>
+            <a:p>
+              <a:pPr marL="285750" indent="-285750">
+                <a:buFont typeface="Arial" panose="020B0604020202020204" pitchFamily="34" charset="0"/>
+                <a:buChar char="•"/>
+              </a:pPr>
+              <a:r>
+                <a:rPr lang="en-US" sz="1800" dirty="0"/>
+                <a:t>Users</a:t>
+              </a:r>
+            </a:p>
+            <a:p>
               <a:endParaRPr lang="en-US" sz="1800" dirty="0"/>
             </a:p>
             <a:p>
@@ -5246,7 +5272,7 @@
         </p:nvGrpSpPr>
         <p:grpSpPr>
           <a:xfrm>
-            <a:off x="9617272" y="13358658"/>
+            <a:off x="9602853" y="12619024"/>
             <a:ext cx="2425700" cy="1629047"/>
             <a:chOff x="2658533" y="220133"/>
             <a:chExt cx="1811868" cy="2116666"/>
@@ -5431,8 +5457,9 @@
               <a:pPr algn="ctr"/>
               <a:r>
                 <a:rPr lang="en-US" sz="1800" dirty="0" smtClean="0"/>
-                <a:t>&lt;&lt;interface&gt;&gt;</a:t>
-              </a:r>
+                <a:t>&lt;&lt;HTML&gt;&gt;</a:t>
+              </a:r>
+              <a:endParaRPr lang="en-US" sz="1800" dirty="0" smtClean="0"/>
             </a:p>
             <a:p>
               <a:pPr algn="ctr"/>
@@ -5488,8 +5515,19 @@
               </a:pPr>
               <a:r>
                 <a:rPr lang="en-US" sz="1800" dirty="0" smtClean="0"/>
-                <a:t> HTTP Requests</a:t>
-              </a:r>
+                <a:t> HTTP </a:t>
+              </a:r>
+              <a:r>
+                <a:rPr lang="en-US" sz="1800" dirty="0" smtClean="0"/>
+                <a:t>Requests</a:t>
+              </a:r>
+            </a:p>
+            <a:p>
+              <a:pPr marL="285750" indent="-285750">
+                <a:buFont typeface="Arial" panose="020B0604020202020204" pitchFamily="34" charset="0"/>
+                <a:buChar char="•"/>
+              </a:pPr>
+              <a:endParaRPr lang="en-US" sz="1800" dirty="0" smtClean="0"/>
             </a:p>
           </p:txBody>
         </p:sp>
@@ -5542,8 +5580,8 @@
         </p:nvCxnSpPr>
         <p:spPr>
           <a:xfrm flipV="1">
-            <a:off x="4072392" y="2830286"/>
-            <a:ext cx="2341637" cy="9466"/>
+            <a:off x="4072392" y="2821775"/>
+            <a:ext cx="607089" cy="17977"/>
           </a:xfrm>
           <a:prstGeom prst="line">
             <a:avLst/>
@@ -5572,7 +5610,7 @@
         </p:nvCxnSpPr>
         <p:spPr>
           <a:xfrm>
-            <a:off x="6418869" y="718457"/>
+            <a:off x="4655385" y="718457"/>
             <a:ext cx="4839" cy="5355772"/>
           </a:xfrm>
           <a:prstGeom prst="line">
@@ -5602,38 +5640,8 @@
         </p:nvCxnSpPr>
         <p:spPr>
           <a:xfrm flipV="1">
-            <a:off x="6423708" y="718462"/>
-            <a:ext cx="2341637" cy="9466"/>
-          </a:xfrm>
-          <a:prstGeom prst="line">
-            <a:avLst/>
-          </a:prstGeom>
-        </p:spPr>
-        <p:style>
-          <a:lnRef idx="3">
-            <a:schemeClr val="dk1"/>
-          </a:lnRef>
-          <a:fillRef idx="0">
-            <a:schemeClr val="dk1"/>
-          </a:fillRef>
-          <a:effectRef idx="2">
-            <a:schemeClr val="dk1"/>
-          </a:effectRef>
-          <a:fontRef idx="minor">
-            <a:schemeClr val="tx1"/>
-          </a:fontRef>
-        </p:style>
-      </p:cxnSp>
-      <p:cxnSp>
-        <p:nvCxnSpPr>
-          <p:cNvPr id="72" name="Straight Connector 71"/>
-          <p:cNvCxnSpPr/>
-          <p:nvPr/>
-        </p:nvCxnSpPr>
-        <p:spPr>
-          <a:xfrm flipV="1">
-            <a:off x="6423708" y="2026804"/>
-            <a:ext cx="2341637" cy="9466"/>
+            <a:off x="4660224" y="718457"/>
+            <a:ext cx="1565422" cy="9471"/>
           </a:xfrm>
           <a:prstGeom prst="line">
             <a:avLst/>
@@ -5662,7 +5670,7 @@
         </p:nvGrpSpPr>
         <p:grpSpPr>
           <a:xfrm>
-            <a:off x="8755665" y="1690580"/>
+            <a:off x="6236111" y="1534738"/>
             <a:ext cx="2854825" cy="1131195"/>
             <a:chOff x="2658533" y="-24488"/>
             <a:chExt cx="1811868" cy="2136739"/>
@@ -5710,6 +5718,18 @@
               <a:r>
                 <a:rPr lang="en-US" sz="1800" dirty="0" err="1" smtClean="0"/>
                 <a:t>LoginPage</a:t>
+              </a:r>
+              <a:r>
+                <a:rPr lang="en-US" sz="1800" dirty="0" smtClean="0"/>
+                <a:t> &lt;&lt;</a:t>
+              </a:r>
+              <a:r>
+                <a:rPr lang="en-US" sz="1800" dirty="0" err="1" smtClean="0"/>
+                <a:t>javascript</a:t>
+              </a:r>
+              <a:r>
+                <a:rPr lang="en-US" sz="1800" dirty="0" smtClean="0"/>
+                <a:t>&gt;&gt;</a:t>
               </a:r>
               <a:endParaRPr lang="en-US" sz="1800" dirty="0"/>
             </a:p>
@@ -5767,6 +5787,21 @@
               </a:r>
             </a:p>
             <a:p>
+              <a:pPr marL="285750" indent="-285750">
+                <a:buFontTx/>
+                <a:buChar char="-"/>
+              </a:pPr>
+              <a:r>
+                <a:rPr lang="en-US" sz="1800" dirty="0" err="1" smtClean="0"/>
+                <a:t>validateFormData</a:t>
+              </a:r>
+              <a:r>
+                <a:rPr lang="en-US" sz="1800" dirty="0" smtClean="0"/>
+                <a:t>()</a:t>
+              </a:r>
+              <a:endParaRPr lang="en-US" sz="1800" dirty="0" smtClean="0"/>
+            </a:p>
+            <a:p>
               <a:endParaRPr lang="en-US" sz="1800" dirty="0" smtClean="0"/>
             </a:p>
           </p:txBody>
@@ -5780,8 +5815,8 @@
         </p:nvGrpSpPr>
         <p:grpSpPr>
           <a:xfrm>
-            <a:off x="8765345" y="182239"/>
-            <a:ext cx="3002461" cy="1212930"/>
+            <a:off x="6245792" y="155937"/>
+            <a:ext cx="2854824" cy="1212930"/>
             <a:chOff x="2658533" y="-24488"/>
             <a:chExt cx="1811868" cy="1697125"/>
           </a:xfrm>
@@ -5871,6 +5906,18 @@
             </a:bodyPr>
             <a:lstStyle/>
             <a:p>
+              <a:r>
+                <a:rPr lang="en-US" sz="1800" dirty="0" smtClean="0"/>
+                <a:t>- </a:t>
+              </a:r>
+              <a:r>
+                <a:rPr lang="en-US" sz="1800" dirty="0" err="1" smtClean="0"/>
+                <a:t>getTournament</a:t>
+              </a:r>
+              <a:r>
+                <a:rPr lang="en-US" sz="1800" smtClean="0"/>
+                <a:t>()</a:t>
+              </a:r>
               <a:endParaRPr lang="en-US" sz="1800" dirty="0" smtClean="0"/>
             </a:p>
           </p:txBody>
@@ -5884,10 +5931,10 @@
         </p:nvGrpSpPr>
         <p:grpSpPr>
           <a:xfrm>
-            <a:off x="8765344" y="2998828"/>
-            <a:ext cx="2854825" cy="1131195"/>
-            <a:chOff x="2658533" y="-24488"/>
-            <a:chExt cx="1811868" cy="2136739"/>
+            <a:off x="6245790" y="2855570"/>
+            <a:ext cx="2854825" cy="1248151"/>
+            <a:chOff x="2658533" y="-245409"/>
+            <a:chExt cx="1811868" cy="2357660"/>
           </a:xfrm>
         </p:grpSpPr>
         <p:sp>
@@ -5898,8 +5945,8 @@
           </p:nvSpPr>
           <p:spPr>
             <a:xfrm>
-              <a:off x="2658533" y="-24488"/>
-              <a:ext cx="1811868" cy="667955"/>
+              <a:off x="2658533" y="-245409"/>
+              <a:ext cx="1811868" cy="888878"/>
             </a:xfrm>
             <a:prstGeom prst="rect">
               <a:avLst/>
@@ -5932,6 +5979,18 @@
               <a:r>
                 <a:rPr lang="en-US" sz="1800" dirty="0" err="1" smtClean="0"/>
                 <a:t>tournamentPage</a:t>
+              </a:r>
+              <a:r>
+                <a:rPr lang="en-US" sz="1800" dirty="0" smtClean="0"/>
+                <a:t> &lt;&lt;</a:t>
+              </a:r>
+              <a:r>
+                <a:rPr lang="en-US" sz="1800" dirty="0" err="1" smtClean="0"/>
+                <a:t>javascript</a:t>
+              </a:r>
+              <a:r>
+                <a:rPr lang="en-US" sz="1800" dirty="0" smtClean="0"/>
+                <a:t>&gt;&gt;</a:t>
               </a:r>
               <a:endParaRPr lang="en-US" sz="1800" dirty="0"/>
             </a:p>
@@ -6008,66 +6067,6 @@
           </p:txBody>
         </p:sp>
       </p:grpSp>
-      <p:cxnSp>
-        <p:nvCxnSpPr>
-          <p:cNvPr id="83" name="Straight Connector 82"/>
-          <p:cNvCxnSpPr/>
-          <p:nvPr/>
-        </p:nvCxnSpPr>
-        <p:spPr>
-          <a:xfrm flipV="1">
-            <a:off x="6414027" y="3514101"/>
-            <a:ext cx="2341637" cy="9466"/>
-          </a:xfrm>
-          <a:prstGeom prst="line">
-            <a:avLst/>
-          </a:prstGeom>
-        </p:spPr>
-        <p:style>
-          <a:lnRef idx="3">
-            <a:schemeClr val="dk1"/>
-          </a:lnRef>
-          <a:fillRef idx="0">
-            <a:schemeClr val="dk1"/>
-          </a:fillRef>
-          <a:effectRef idx="2">
-            <a:schemeClr val="dk1"/>
-          </a:effectRef>
-          <a:fontRef idx="minor">
-            <a:schemeClr val="tx1"/>
-          </a:fontRef>
-        </p:style>
-      </p:cxnSp>
-      <p:cxnSp>
-        <p:nvCxnSpPr>
-          <p:cNvPr id="84" name="Straight Connector 83"/>
-          <p:cNvCxnSpPr/>
-          <p:nvPr/>
-        </p:nvCxnSpPr>
-        <p:spPr>
-          <a:xfrm flipV="1">
-            <a:off x="6414026" y="4817710"/>
-            <a:ext cx="2341637" cy="9466"/>
-          </a:xfrm>
-          <a:prstGeom prst="line">
-            <a:avLst/>
-          </a:prstGeom>
-        </p:spPr>
-        <p:style>
-          <a:lnRef idx="3">
-            <a:schemeClr val="dk1"/>
-          </a:lnRef>
-          <a:fillRef idx="0">
-            <a:schemeClr val="dk1"/>
-          </a:fillRef>
-          <a:effectRef idx="2">
-            <a:schemeClr val="dk1"/>
-          </a:effectRef>
-          <a:fontRef idx="minor">
-            <a:schemeClr val="tx1"/>
-          </a:fontRef>
-        </p:style>
-      </p:cxnSp>
       <p:grpSp>
         <p:nvGrpSpPr>
           <p:cNvPr id="85" name="Group 84"/>
@@ -6076,10 +6075,10 @@
         </p:nvGrpSpPr>
         <p:grpSpPr>
           <a:xfrm>
-            <a:off x="8755663" y="4455833"/>
-            <a:ext cx="2854825" cy="1131195"/>
-            <a:chOff x="2658533" y="-24488"/>
-            <a:chExt cx="1811868" cy="2136739"/>
+            <a:off x="6236109" y="4235237"/>
+            <a:ext cx="2854825" cy="1325489"/>
+            <a:chOff x="2658533" y="-391494"/>
+            <a:chExt cx="1811868" cy="2503745"/>
           </a:xfrm>
         </p:grpSpPr>
         <p:sp>
@@ -6090,8 +6089,8 @@
           </p:nvSpPr>
           <p:spPr>
             <a:xfrm>
-              <a:off x="2658533" y="-24488"/>
-              <a:ext cx="1811868" cy="667955"/>
+              <a:off x="2658533" y="-391494"/>
+              <a:ext cx="1811868" cy="1034961"/>
             </a:xfrm>
             <a:prstGeom prst="rect">
               <a:avLst/>
@@ -6121,10 +6120,33 @@
             <a:lstStyle/>
             <a:p>
               <a:pPr algn="ctr"/>
+              <a:endParaRPr lang="en-US" sz="1800" dirty="0" smtClean="0"/>
+            </a:p>
+            <a:p>
+              <a:pPr algn="ctr"/>
               <a:r>
                 <a:rPr lang="en-US" sz="1800" dirty="0" err="1" smtClean="0"/>
                 <a:t>MatchPage</a:t>
               </a:r>
+              <a:endParaRPr lang="en-US" sz="1800" dirty="0" smtClean="0"/>
+            </a:p>
+            <a:p>
+              <a:pPr algn="ctr"/>
+              <a:r>
+                <a:rPr lang="en-US" sz="1800" dirty="0"/>
+                <a:t>&lt;&lt;</a:t>
+              </a:r>
+              <a:r>
+                <a:rPr lang="en-US" sz="1800" dirty="0" err="1"/>
+                <a:t>javascript</a:t>
+              </a:r>
+              <a:r>
+                <a:rPr lang="en-US" sz="1800" dirty="0"/>
+                <a:t>&gt;&gt;</a:t>
+              </a:r>
+            </a:p>
+            <a:p>
+              <a:pPr algn="ctr"/>
               <a:endParaRPr lang="en-US" sz="1800" dirty="0"/>
             </a:p>
           </p:txBody>
@@ -6200,36 +6222,6 @@
           </p:txBody>
         </p:sp>
       </p:grpSp>
-      <p:cxnSp>
-        <p:nvCxnSpPr>
-          <p:cNvPr id="89" name="Straight Connector 88"/>
-          <p:cNvCxnSpPr/>
-          <p:nvPr/>
-        </p:nvCxnSpPr>
-        <p:spPr>
-          <a:xfrm flipV="1">
-            <a:off x="6414025" y="6056490"/>
-            <a:ext cx="2341637" cy="9466"/>
-          </a:xfrm>
-          <a:prstGeom prst="line">
-            <a:avLst/>
-          </a:prstGeom>
-        </p:spPr>
-        <p:style>
-          <a:lnRef idx="3">
-            <a:schemeClr val="dk1"/>
-          </a:lnRef>
-          <a:fillRef idx="0">
-            <a:schemeClr val="dk1"/>
-          </a:fillRef>
-          <a:effectRef idx="2">
-            <a:schemeClr val="dk1"/>
-          </a:effectRef>
-          <a:fontRef idx="minor">
-            <a:schemeClr val="tx1"/>
-          </a:fontRef>
-        </p:style>
-      </p:cxnSp>
       <p:grpSp>
         <p:nvGrpSpPr>
           <p:cNvPr id="90" name="Group 89"/>
@@ -6238,10 +6230,10 @@
         </p:nvGrpSpPr>
         <p:grpSpPr>
           <a:xfrm>
-            <a:off x="8693899" y="5850307"/>
-            <a:ext cx="2854825" cy="1131195"/>
-            <a:chOff x="2658533" y="-24488"/>
-            <a:chExt cx="1811868" cy="2136739"/>
+            <a:off x="6174345" y="5672677"/>
+            <a:ext cx="2854825" cy="1282523"/>
+            <a:chOff x="2658533" y="-310335"/>
+            <a:chExt cx="1811868" cy="2422586"/>
           </a:xfrm>
         </p:grpSpPr>
         <p:sp>
@@ -6252,8 +6244,8 @@
           </p:nvSpPr>
           <p:spPr>
             <a:xfrm>
-              <a:off x="2658533" y="-24488"/>
-              <a:ext cx="1811868" cy="667955"/>
+              <a:off x="2658533" y="-310335"/>
+              <a:ext cx="1811868" cy="953804"/>
             </a:xfrm>
             <a:prstGeom prst="rect">
               <a:avLst/>
@@ -6286,6 +6278,22 @@
               <a:r>
                 <a:rPr lang="en-US" sz="1800" dirty="0" err="1" smtClean="0"/>
                 <a:t>PlayerPage</a:t>
+              </a:r>
+              <a:endParaRPr lang="en-US" sz="1800" dirty="0" smtClean="0"/>
+            </a:p>
+            <a:p>
+              <a:pPr algn="ctr"/>
+              <a:r>
+                <a:rPr lang="en-US" sz="1800" dirty="0" smtClean="0"/>
+                <a:t>&lt;&lt;</a:t>
+              </a:r>
+              <a:r>
+                <a:rPr lang="en-US" sz="1800" dirty="0" err="1" smtClean="0"/>
+                <a:t>javascript</a:t>
+              </a:r>
+              <a:r>
+                <a:rPr lang="en-US" sz="1800" dirty="0" smtClean="0"/>
+                <a:t>&gt;&gt;</a:t>
               </a:r>
               <a:endParaRPr lang="en-US" sz="1800" dirty="0"/>
             </a:p>
@@ -6466,6 +6474,723 @@
                 </a:outerShdw>
               </a:effectLst>
             </a:endParaRPr>
+          </a:p>
+        </p:txBody>
+      </p:sp>
+      <p:cxnSp>
+        <p:nvCxnSpPr>
+          <p:cNvPr id="79" name="Straight Connector 78"/>
+          <p:cNvCxnSpPr/>
+          <p:nvPr/>
+        </p:nvCxnSpPr>
+        <p:spPr>
+          <a:xfrm flipV="1">
+            <a:off x="4660227" y="2155373"/>
+            <a:ext cx="1565422" cy="9471"/>
+          </a:xfrm>
+          <a:prstGeom prst="line">
+            <a:avLst/>
+          </a:prstGeom>
+        </p:spPr>
+        <p:style>
+          <a:lnRef idx="3">
+            <a:schemeClr val="dk1"/>
+          </a:lnRef>
+          <a:fillRef idx="0">
+            <a:schemeClr val="dk1"/>
+          </a:fillRef>
+          <a:effectRef idx="2">
+            <a:schemeClr val="dk1"/>
+          </a:effectRef>
+          <a:fontRef idx="minor">
+            <a:schemeClr val="tx1"/>
+          </a:fontRef>
+        </p:style>
+      </p:cxnSp>
+      <p:cxnSp>
+        <p:nvCxnSpPr>
+          <p:cNvPr id="88" name="Straight Connector 87"/>
+          <p:cNvCxnSpPr/>
+          <p:nvPr/>
+        </p:nvCxnSpPr>
+        <p:spPr>
+          <a:xfrm flipV="1">
+            <a:off x="4660227" y="3592287"/>
+            <a:ext cx="1565422" cy="9471"/>
+          </a:xfrm>
+          <a:prstGeom prst="line">
+            <a:avLst/>
+          </a:prstGeom>
+        </p:spPr>
+        <p:style>
+          <a:lnRef idx="3">
+            <a:schemeClr val="dk1"/>
+          </a:lnRef>
+          <a:fillRef idx="0">
+            <a:schemeClr val="dk1"/>
+          </a:fillRef>
+          <a:effectRef idx="2">
+            <a:schemeClr val="dk1"/>
+          </a:effectRef>
+          <a:fontRef idx="minor">
+            <a:schemeClr val="tx1"/>
+          </a:fontRef>
+        </p:style>
+      </p:cxnSp>
+      <p:cxnSp>
+        <p:nvCxnSpPr>
+          <p:cNvPr id="94" name="Straight Connector 93"/>
+          <p:cNvCxnSpPr/>
+          <p:nvPr/>
+        </p:nvCxnSpPr>
+        <p:spPr>
+          <a:xfrm flipV="1">
+            <a:off x="4660226" y="4985658"/>
+            <a:ext cx="1565422" cy="9471"/>
+          </a:xfrm>
+          <a:prstGeom prst="line">
+            <a:avLst/>
+          </a:prstGeom>
+        </p:spPr>
+        <p:style>
+          <a:lnRef idx="3">
+            <a:schemeClr val="dk1"/>
+          </a:lnRef>
+          <a:fillRef idx="0">
+            <a:schemeClr val="dk1"/>
+          </a:fillRef>
+          <a:effectRef idx="2">
+            <a:schemeClr val="dk1"/>
+          </a:effectRef>
+          <a:fontRef idx="minor">
+            <a:schemeClr val="tx1"/>
+          </a:fontRef>
+        </p:style>
+      </p:cxnSp>
+      <p:cxnSp>
+        <p:nvCxnSpPr>
+          <p:cNvPr id="95" name="Straight Connector 94"/>
+          <p:cNvCxnSpPr/>
+          <p:nvPr/>
+        </p:nvCxnSpPr>
+        <p:spPr>
+          <a:xfrm>
+            <a:off x="4660226" y="6040153"/>
+            <a:ext cx="1514119" cy="5637"/>
+          </a:xfrm>
+          <a:prstGeom prst="line">
+            <a:avLst/>
+          </a:prstGeom>
+        </p:spPr>
+        <p:style>
+          <a:lnRef idx="3">
+            <a:schemeClr val="dk1"/>
+          </a:lnRef>
+          <a:fillRef idx="0">
+            <a:schemeClr val="dk1"/>
+          </a:fillRef>
+          <a:effectRef idx="2">
+            <a:schemeClr val="dk1"/>
+          </a:effectRef>
+          <a:fontRef idx="minor">
+            <a:schemeClr val="tx1"/>
+          </a:fontRef>
+        </p:style>
+      </p:cxnSp>
+      <p:sp>
+        <p:nvSpPr>
+          <p:cNvPr id="14" name="Freeform 13"/>
+          <p:cNvSpPr/>
+          <p:nvPr/>
+        </p:nvSpPr>
+        <p:spPr>
+          <a:xfrm>
+            <a:off x="7663543" y="12104914"/>
+            <a:ext cx="1937657" cy="1110343"/>
+          </a:xfrm>
+          <a:custGeom>
+            <a:avLst/>
+            <a:gdLst>
+              <a:gd name="connsiteX0" fmla="*/ 0 w 1937657"/>
+              <a:gd name="connsiteY0" fmla="*/ 0 h 1110343"/>
+              <a:gd name="connsiteX1" fmla="*/ 0 w 1937657"/>
+              <a:gd name="connsiteY1" fmla="*/ 1088572 h 1110343"/>
+              <a:gd name="connsiteX2" fmla="*/ 1937657 w 1937657"/>
+              <a:gd name="connsiteY2" fmla="*/ 1110343 h 1110343"/>
+            </a:gdLst>
+            <a:ahLst/>
+            <a:cxnLst>
+              <a:cxn ang="0">
+                <a:pos x="connsiteX0" y="connsiteY0"/>
+              </a:cxn>
+              <a:cxn ang="0">
+                <a:pos x="connsiteX1" y="connsiteY1"/>
+              </a:cxn>
+              <a:cxn ang="0">
+                <a:pos x="connsiteX2" y="connsiteY2"/>
+              </a:cxn>
+            </a:cxnLst>
+            <a:rect l="l" t="t" r="r" b="b"/>
+            <a:pathLst>
+              <a:path w="1937657" h="1110343">
+                <a:moveTo>
+                  <a:pt x="0" y="0"/>
+                </a:moveTo>
+                <a:lnTo>
+                  <a:pt x="0" y="1088572"/>
+                </a:lnTo>
+                <a:lnTo>
+                  <a:pt x="1937657" y="1110343"/>
+                </a:lnTo>
+              </a:path>
+            </a:pathLst>
+          </a:custGeom>
+        </p:spPr>
+        <p:style>
+          <a:lnRef idx="3">
+            <a:schemeClr val="dk1"/>
+          </a:lnRef>
+          <a:fillRef idx="0">
+            <a:schemeClr val="dk1"/>
+          </a:fillRef>
+          <a:effectRef idx="2">
+            <a:schemeClr val="dk1"/>
+          </a:effectRef>
+          <a:fontRef idx="minor">
+            <a:schemeClr val="tx1"/>
+          </a:fontRef>
+        </p:style>
+        <p:txBody>
+          <a:bodyPr rtlCol="0" anchor="ctr"/>
+          <a:lstStyle/>
+          <a:p>
+            <a:pPr algn="ctr"/>
+            <a:endParaRPr lang="en-US"/>
+          </a:p>
+        </p:txBody>
+      </p:sp>
+      <p:sp>
+        <p:nvSpPr>
+          <p:cNvPr id="99" name="TextBox 98"/>
+          <p:cNvSpPr txBox="1"/>
+          <p:nvPr/>
+        </p:nvSpPr>
+        <p:spPr>
+          <a:xfrm>
+            <a:off x="7708823" y="12176776"/>
+            <a:ext cx="301686" cy="369332"/>
+          </a:xfrm>
+          <a:prstGeom prst="rect">
+            <a:avLst/>
+          </a:prstGeom>
+          <a:noFill/>
+        </p:spPr>
+        <p:txBody>
+          <a:bodyPr wrap="none" rtlCol="0">
+            <a:spAutoFit/>
+          </a:bodyPr>
+          <a:lstStyle/>
+          <a:p>
+            <a:r>
+              <a:rPr lang="en-US" sz="1800" dirty="0"/>
+              <a:t>1</a:t>
+            </a:r>
+          </a:p>
+        </p:txBody>
+      </p:sp>
+      <p:sp>
+        <p:nvSpPr>
+          <p:cNvPr id="100" name="TextBox 99"/>
+          <p:cNvSpPr txBox="1"/>
+          <p:nvPr/>
+        </p:nvSpPr>
+        <p:spPr>
+          <a:xfrm>
+            <a:off x="9167506" y="12829915"/>
+            <a:ext cx="300082" cy="369332"/>
+          </a:xfrm>
+          <a:prstGeom prst="rect">
+            <a:avLst/>
+          </a:prstGeom>
+          <a:noFill/>
+        </p:spPr>
+        <p:txBody>
+          <a:bodyPr wrap="none" rtlCol="0">
+            <a:spAutoFit/>
+          </a:bodyPr>
+          <a:lstStyle/>
+          <a:p>
+            <a:r>
+              <a:rPr lang="en-US" sz="1800" dirty="0"/>
+              <a:t>*</a:t>
+            </a:r>
+            <a:endParaRPr lang="en-US" sz="1800" dirty="0"/>
+          </a:p>
+        </p:txBody>
+      </p:sp>
+      <p:cxnSp>
+        <p:nvCxnSpPr>
+          <p:cNvPr id="101" name="Straight Connector 100"/>
+          <p:cNvCxnSpPr/>
+          <p:nvPr/>
+        </p:nvCxnSpPr>
+        <p:spPr>
+          <a:xfrm flipH="1">
+            <a:off x="8866248" y="15235165"/>
+            <a:ext cx="1073427" cy="0"/>
+          </a:xfrm>
+          <a:prstGeom prst="line">
+            <a:avLst/>
+          </a:prstGeom>
+        </p:spPr>
+        <p:style>
+          <a:lnRef idx="3">
+            <a:schemeClr val="dk1"/>
+          </a:lnRef>
+          <a:fillRef idx="0">
+            <a:schemeClr val="dk1"/>
+          </a:fillRef>
+          <a:effectRef idx="2">
+            <a:schemeClr val="dk1"/>
+          </a:effectRef>
+          <a:fontRef idx="minor">
+            <a:schemeClr val="tx1"/>
+          </a:fontRef>
+        </p:style>
+      </p:cxnSp>
+      <p:sp>
+        <p:nvSpPr>
+          <p:cNvPr id="102" name="TextBox 101"/>
+          <p:cNvSpPr txBox="1"/>
+          <p:nvPr/>
+        </p:nvSpPr>
+        <p:spPr>
+          <a:xfrm>
+            <a:off x="8865820" y="14833266"/>
+            <a:ext cx="301686" cy="369332"/>
+          </a:xfrm>
+          <a:prstGeom prst="rect">
+            <a:avLst/>
+          </a:prstGeom>
+          <a:noFill/>
+        </p:spPr>
+        <p:txBody>
+          <a:bodyPr wrap="none" rtlCol="0">
+            <a:spAutoFit/>
+          </a:bodyPr>
+          <a:lstStyle/>
+          <a:p>
+            <a:r>
+              <a:rPr lang="en-US" sz="1800" dirty="0"/>
+              <a:t>1</a:t>
+            </a:r>
+          </a:p>
+        </p:txBody>
+      </p:sp>
+      <p:sp>
+        <p:nvSpPr>
+          <p:cNvPr id="103" name="TextBox 102"/>
+          <p:cNvSpPr txBox="1"/>
+          <p:nvPr/>
+        </p:nvSpPr>
+        <p:spPr>
+          <a:xfrm>
+            <a:off x="9646474" y="14919970"/>
+            <a:ext cx="300082" cy="369332"/>
+          </a:xfrm>
+          <a:prstGeom prst="rect">
+            <a:avLst/>
+          </a:prstGeom>
+          <a:noFill/>
+        </p:spPr>
+        <p:txBody>
+          <a:bodyPr wrap="none" rtlCol="0">
+            <a:spAutoFit/>
+          </a:bodyPr>
+          <a:lstStyle/>
+          <a:p>
+            <a:r>
+              <a:rPr lang="en-US" sz="1800" dirty="0"/>
+              <a:t>*</a:t>
+            </a:r>
+            <a:endParaRPr lang="en-US" sz="1800" dirty="0"/>
+          </a:p>
+        </p:txBody>
+      </p:sp>
+      <p:cxnSp>
+        <p:nvCxnSpPr>
+          <p:cNvPr id="104" name="Straight Connector 103"/>
+          <p:cNvCxnSpPr/>
+          <p:nvPr/>
+        </p:nvCxnSpPr>
+        <p:spPr>
+          <a:xfrm flipH="1">
+            <a:off x="9075252" y="10946196"/>
+            <a:ext cx="1073427" cy="0"/>
+          </a:xfrm>
+          <a:prstGeom prst="line">
+            <a:avLst/>
+          </a:prstGeom>
+        </p:spPr>
+        <p:style>
+          <a:lnRef idx="3">
+            <a:schemeClr val="dk1"/>
+          </a:lnRef>
+          <a:fillRef idx="0">
+            <a:schemeClr val="dk1"/>
+          </a:fillRef>
+          <a:effectRef idx="2">
+            <a:schemeClr val="dk1"/>
+          </a:effectRef>
+          <a:fontRef idx="minor">
+            <a:schemeClr val="tx1"/>
+          </a:fontRef>
+        </p:style>
+      </p:cxnSp>
+      <p:sp>
+        <p:nvSpPr>
+          <p:cNvPr id="105" name="TextBox 104"/>
+          <p:cNvSpPr txBox="1"/>
+          <p:nvPr/>
+        </p:nvSpPr>
+        <p:spPr>
+          <a:xfrm>
+            <a:off x="9067204" y="10567157"/>
+            <a:ext cx="301686" cy="369332"/>
+          </a:xfrm>
+          <a:prstGeom prst="rect">
+            <a:avLst/>
+          </a:prstGeom>
+          <a:noFill/>
+        </p:spPr>
+        <p:txBody>
+          <a:bodyPr wrap="none" rtlCol="0">
+            <a:spAutoFit/>
+          </a:bodyPr>
+          <a:lstStyle/>
+          <a:p>
+            <a:r>
+              <a:rPr lang="en-US" sz="1800" dirty="0"/>
+              <a:t>1</a:t>
+            </a:r>
+          </a:p>
+        </p:txBody>
+      </p:sp>
+      <p:sp>
+        <p:nvSpPr>
+          <p:cNvPr id="106" name="TextBox 105"/>
+          <p:cNvSpPr txBox="1"/>
+          <p:nvPr/>
+        </p:nvSpPr>
+        <p:spPr>
+          <a:xfrm>
+            <a:off x="9885958" y="10631001"/>
+            <a:ext cx="300082" cy="369332"/>
+          </a:xfrm>
+          <a:prstGeom prst="rect">
+            <a:avLst/>
+          </a:prstGeom>
+          <a:noFill/>
+        </p:spPr>
+        <p:txBody>
+          <a:bodyPr wrap="none" rtlCol="0">
+            <a:spAutoFit/>
+          </a:bodyPr>
+          <a:lstStyle/>
+          <a:p>
+            <a:r>
+              <a:rPr lang="en-US" sz="1800" dirty="0"/>
+              <a:t>*</a:t>
+            </a:r>
+            <a:endParaRPr lang="en-US" sz="1800" dirty="0"/>
+          </a:p>
+        </p:txBody>
+      </p:sp>
+      <p:sp>
+        <p:nvSpPr>
+          <p:cNvPr id="107" name="Rectangle 106"/>
+          <p:cNvSpPr/>
+          <p:nvPr/>
+        </p:nvSpPr>
+        <p:spPr>
+          <a:xfrm>
+            <a:off x="10161014" y="11438607"/>
+            <a:ext cx="2344139" cy="1100096"/>
+          </a:xfrm>
+          <a:prstGeom prst="rect">
+            <a:avLst/>
+          </a:prstGeom>
+        </p:spPr>
+        <p:style>
+          <a:lnRef idx="2">
+            <a:schemeClr val="dk1"/>
+          </a:lnRef>
+          <a:fillRef idx="1">
+            <a:schemeClr val="lt1"/>
+          </a:fillRef>
+          <a:effectRef idx="0">
+            <a:schemeClr val="dk1"/>
+          </a:effectRef>
+          <a:fontRef idx="minor">
+            <a:schemeClr val="dk1"/>
+          </a:fontRef>
+        </p:style>
+        <p:txBody>
+          <a:bodyPr rot="0" spcFirstLastPara="0" vertOverflow="overflow" horzOverflow="overflow" vert="horz" wrap="square" lIns="91440" tIns="45720" rIns="91440" bIns="45720" numCol="1" spcCol="0" rtlCol="0" fromWordArt="0" anchor="ctr" anchorCtr="0" forceAA="0" compatLnSpc="1">
+            <a:prstTxWarp prst="textNoShape">
+              <a:avLst/>
+            </a:prstTxWarp>
+            <a:noAutofit/>
+          </a:bodyPr>
+          <a:lstStyle/>
+          <a:p>
+            <a:pPr marL="285750" indent="-285750">
+              <a:buFont typeface="Arial" panose="020B0604020202020204" pitchFamily="34" charset="0"/>
+              <a:buChar char="•"/>
+            </a:pPr>
+            <a:endParaRPr lang="en-US" sz="1800" dirty="0" smtClean="0"/>
+          </a:p>
+          <a:p>
+            <a:pPr marL="285750" indent="-285750">
+              <a:buFont typeface="Arial" panose="020B0604020202020204" pitchFamily="34" charset="0"/>
+              <a:buChar char="•"/>
+            </a:pPr>
+            <a:endParaRPr lang="en-US" sz="1800" dirty="0"/>
+          </a:p>
+          <a:p>
+            <a:pPr marL="285750" indent="-285750">
+              <a:buFontTx/>
+              <a:buChar char="-"/>
+            </a:pPr>
+            <a:r>
+              <a:rPr lang="en-US" sz="1800" dirty="0" err="1" smtClean="0"/>
+              <a:t>setScore</a:t>
+            </a:r>
+            <a:r>
+              <a:rPr lang="en-US" sz="1800" dirty="0" smtClean="0"/>
+              <a:t>()</a:t>
+            </a:r>
+          </a:p>
+          <a:p>
+            <a:pPr marL="285750" indent="-285750">
+              <a:buFontTx/>
+              <a:buChar char="-"/>
+            </a:pPr>
+            <a:endParaRPr lang="en-US" sz="1800" dirty="0"/>
+          </a:p>
+          <a:p>
+            <a:endParaRPr lang="en-US" sz="1800" dirty="0"/>
+          </a:p>
+          <a:p>
+            <a:pPr marL="285750" indent="-285750">
+              <a:buFont typeface="Arial" panose="020B0604020202020204" pitchFamily="34" charset="0"/>
+              <a:buChar char="•"/>
+            </a:pPr>
+            <a:endParaRPr lang="en-US" sz="1800" dirty="0"/>
+          </a:p>
+        </p:txBody>
+      </p:sp>
+      <p:sp>
+        <p:nvSpPr>
+          <p:cNvPr id="108" name="Rectangle 107"/>
+          <p:cNvSpPr/>
+          <p:nvPr/>
+        </p:nvSpPr>
+        <p:spPr>
+          <a:xfrm>
+            <a:off x="6438900" y="11509146"/>
+            <a:ext cx="2628074" cy="649560"/>
+          </a:xfrm>
+          <a:prstGeom prst="rect">
+            <a:avLst/>
+          </a:prstGeom>
+        </p:spPr>
+        <p:style>
+          <a:lnRef idx="2">
+            <a:schemeClr val="dk1"/>
+          </a:lnRef>
+          <a:fillRef idx="1">
+            <a:schemeClr val="lt1"/>
+          </a:fillRef>
+          <a:effectRef idx="0">
+            <a:schemeClr val="dk1"/>
+          </a:effectRef>
+          <a:fontRef idx="minor">
+            <a:schemeClr val="dk1"/>
+          </a:fontRef>
+        </p:style>
+        <p:txBody>
+          <a:bodyPr rot="0" spcFirstLastPara="0" vertOverflow="overflow" horzOverflow="overflow" vert="horz" wrap="square" lIns="91440" tIns="45720" rIns="91440" bIns="45720" numCol="1" spcCol="0" rtlCol="0" fromWordArt="0" anchor="ctr" anchorCtr="0" forceAA="0" compatLnSpc="1">
+            <a:prstTxWarp prst="textNoShape">
+              <a:avLst/>
+            </a:prstTxWarp>
+            <a:noAutofit/>
+          </a:bodyPr>
+          <a:lstStyle/>
+          <a:p>
+            <a:pPr marL="285750" indent="-285750">
+              <a:buFont typeface="Arial" panose="020B0604020202020204" pitchFamily="34" charset="0"/>
+              <a:buChar char="•"/>
+            </a:pPr>
+            <a:endParaRPr lang="en-US" sz="1800" dirty="0" smtClean="0"/>
+          </a:p>
+          <a:p>
+            <a:pPr marL="285750" indent="-285750">
+              <a:buFont typeface="Arial" panose="020B0604020202020204" pitchFamily="34" charset="0"/>
+              <a:buChar char="•"/>
+            </a:pPr>
+            <a:endParaRPr lang="en-US" sz="1800" dirty="0"/>
+          </a:p>
+          <a:p>
+            <a:pPr marL="285750" indent="-285750">
+              <a:buFontTx/>
+              <a:buChar char="-"/>
+            </a:pPr>
+            <a:endParaRPr lang="en-US" sz="1800" dirty="0" smtClean="0"/>
+          </a:p>
+          <a:p>
+            <a:pPr marL="285750" indent="-285750">
+              <a:buFontTx/>
+              <a:buChar char="-"/>
+            </a:pPr>
+            <a:endParaRPr lang="en-US" sz="1800" dirty="0" smtClean="0"/>
+          </a:p>
+          <a:p>
+            <a:pPr marL="285750" indent="-285750">
+              <a:buFontTx/>
+              <a:buChar char="-"/>
+            </a:pPr>
+            <a:r>
+              <a:rPr lang="en-US" sz="1800" dirty="0" smtClean="0"/>
+              <a:t>start()</a:t>
+            </a:r>
+          </a:p>
+          <a:p>
+            <a:pPr marL="285750" indent="-285750">
+              <a:buFontTx/>
+              <a:buChar char="-"/>
+            </a:pPr>
+            <a:r>
+              <a:rPr lang="en-US" sz="1800" dirty="0" err="1" smtClean="0"/>
+              <a:t>reorderTeamTree</a:t>
+            </a:r>
+            <a:r>
+              <a:rPr lang="en-US" sz="1800" dirty="0" smtClean="0"/>
+              <a:t>()</a:t>
+            </a:r>
+          </a:p>
+          <a:p>
+            <a:pPr marL="285750" indent="-285750">
+              <a:buFontTx/>
+              <a:buChar char="-"/>
+            </a:pPr>
+            <a:endParaRPr lang="en-US" sz="1800" dirty="0" smtClean="0"/>
+          </a:p>
+          <a:p>
+            <a:pPr marL="285750" indent="-285750">
+              <a:buFontTx/>
+              <a:buChar char="-"/>
+            </a:pPr>
+            <a:endParaRPr lang="en-US" sz="1800" dirty="0"/>
+          </a:p>
+          <a:p>
+            <a:endParaRPr lang="en-US" sz="1800" dirty="0"/>
+          </a:p>
+          <a:p>
+            <a:pPr marL="285750" indent="-285750">
+              <a:buFont typeface="Arial" panose="020B0604020202020204" pitchFamily="34" charset="0"/>
+              <a:buChar char="•"/>
+            </a:pPr>
+            <a:endParaRPr lang="en-US" sz="1800" dirty="0"/>
+          </a:p>
+        </p:txBody>
+      </p:sp>
+      <p:cxnSp>
+        <p:nvCxnSpPr>
+          <p:cNvPr id="109" name="Straight Connector 108"/>
+          <p:cNvCxnSpPr/>
+          <p:nvPr/>
+        </p:nvCxnSpPr>
+        <p:spPr>
+          <a:xfrm flipH="1">
+            <a:off x="5642716" y="11132459"/>
+            <a:ext cx="798367" cy="2751"/>
+          </a:xfrm>
+          <a:prstGeom prst="line">
+            <a:avLst/>
+          </a:prstGeom>
+        </p:spPr>
+        <p:style>
+          <a:lnRef idx="3">
+            <a:schemeClr val="dk1"/>
+          </a:lnRef>
+          <a:fillRef idx="0">
+            <a:schemeClr val="dk1"/>
+          </a:fillRef>
+          <a:effectRef idx="2">
+            <a:schemeClr val="dk1"/>
+          </a:effectRef>
+          <a:fontRef idx="minor">
+            <a:schemeClr val="tx1"/>
+          </a:fontRef>
+        </p:style>
+      </p:cxnSp>
+      <p:sp>
+        <p:nvSpPr>
+          <p:cNvPr id="110" name="TextBox 109"/>
+          <p:cNvSpPr txBox="1"/>
+          <p:nvPr/>
+        </p:nvSpPr>
+        <p:spPr>
+          <a:xfrm>
+            <a:off x="5619427" y="10779031"/>
+            <a:ext cx="301686" cy="369332"/>
+          </a:xfrm>
+          <a:prstGeom prst="rect">
+            <a:avLst/>
+          </a:prstGeom>
+          <a:noFill/>
+        </p:spPr>
+        <p:txBody>
+          <a:bodyPr wrap="square" rtlCol="0">
+            <a:spAutoFit/>
+          </a:bodyPr>
+          <a:lstStyle/>
+          <a:p>
+            <a:r>
+              <a:rPr lang="en-US" sz="1800" dirty="0"/>
+              <a:t>1</a:t>
+            </a:r>
+          </a:p>
+        </p:txBody>
+      </p:sp>
+      <p:sp>
+        <p:nvSpPr>
+          <p:cNvPr id="111" name="TextBox 110"/>
+          <p:cNvSpPr txBox="1"/>
+          <p:nvPr/>
+        </p:nvSpPr>
+        <p:spPr>
+          <a:xfrm>
+            <a:off x="6141001" y="10781915"/>
+            <a:ext cx="300082" cy="369332"/>
+          </a:xfrm>
+          <a:prstGeom prst="rect">
+            <a:avLst/>
+          </a:prstGeom>
+          <a:noFill/>
+        </p:spPr>
+        <p:txBody>
+          <a:bodyPr wrap="square" rtlCol="0">
+            <a:spAutoFit/>
+          </a:bodyPr>
+          <a:lstStyle/>
+          <a:p>
+            <a:r>
+              <a:rPr lang="en-US" sz="1800" dirty="0" smtClean="0"/>
+              <a:t>1</a:t>
+            </a:r>
+            <a:endParaRPr lang="en-US" sz="1800" dirty="0"/>
           </a:p>
         </p:txBody>
       </p:sp>

</xml_diff>

<commit_message>
small changes to 5.1
</commit_message>
<xml_diff>
--- a/docs/Images.pptx
+++ b/docs/Images.pptx
@@ -3685,10 +3685,10 @@
         </p:nvGrpSpPr>
         <p:grpSpPr>
           <a:xfrm>
-            <a:off x="974799" y="10712839"/>
-            <a:ext cx="1540934" cy="1524000"/>
-            <a:chOff x="2658533" y="220133"/>
-            <a:chExt cx="1540934" cy="1524000"/>
+            <a:off x="974798" y="10658601"/>
+            <a:ext cx="2021269" cy="1032082"/>
+            <a:chOff x="2658533" y="185526"/>
+            <a:chExt cx="1540934" cy="684882"/>
           </a:xfrm>
         </p:grpSpPr>
         <p:sp>
@@ -3699,8 +3699,8 @@
           </p:nvSpPr>
           <p:spPr>
             <a:xfrm>
-              <a:off x="2658533" y="220133"/>
-              <a:ext cx="1540934" cy="423334"/>
+              <a:off x="2658533" y="185526"/>
+              <a:ext cx="1540934" cy="239380"/>
             </a:xfrm>
             <a:prstGeom prst="rect">
               <a:avLst/>
@@ -3731,7 +3731,7 @@
             <a:p>
               <a:pPr algn="ctr"/>
               <a:r>
-                <a:rPr lang="en-US" sz="1800" dirty="0"/>
+                <a:rPr lang="en-US" sz="1600" dirty="0"/>
                 <a:t>Server</a:t>
               </a:r>
             </a:p>
@@ -3745,8 +3745,8 @@
           </p:nvSpPr>
           <p:spPr>
             <a:xfrm>
-              <a:off x="2658533" y="643467"/>
-              <a:ext cx="1540934" cy="1100666"/>
+              <a:off x="2658533" y="424906"/>
+              <a:ext cx="1540934" cy="445502"/>
             </a:xfrm>
             <a:prstGeom prst="rect">
               <a:avLst/>
@@ -3780,7 +3780,7 @@
                 <a:buChar char="•"/>
               </a:pPr>
               <a:r>
-                <a:rPr lang="en-US" sz="1800" dirty="0" smtClean="0"/>
+                <a:rPr lang="en-US" sz="1600" dirty="0" smtClean="0"/>
                 <a:t>settings</a:t>
               </a:r>
             </a:p>
@@ -3790,10 +3790,10 @@
                 <a:buChar char="•"/>
               </a:pPr>
               <a:r>
-                <a:rPr lang="en-US" sz="1800" dirty="0" smtClean="0"/>
+                <a:rPr lang="en-US" sz="1600" dirty="0" smtClean="0"/>
                 <a:t>language</a:t>
               </a:r>
-              <a:endParaRPr lang="en-US" sz="1800" dirty="0" smtClean="0"/>
+              <a:endParaRPr lang="en-US" sz="1600" dirty="0" smtClean="0"/>
             </a:p>
           </p:txBody>
         </p:sp>
@@ -4690,9 +4690,9 @@
         <p:grpSpPr>
           <a:xfrm>
             <a:off x="3315230" y="9985347"/>
-            <a:ext cx="2338694" cy="2606190"/>
+            <a:ext cx="2338694" cy="2898203"/>
             <a:chOff x="2658533" y="220133"/>
-            <a:chExt cx="1811868" cy="2606190"/>
+            <a:chExt cx="1811868" cy="2898203"/>
           </a:xfrm>
         </p:grpSpPr>
         <p:sp>
@@ -4751,7 +4751,7 @@
           <p:spPr>
             <a:xfrm>
               <a:off x="2658533" y="643466"/>
-              <a:ext cx="1811868" cy="2182857"/>
+              <a:ext cx="1811868" cy="2474870"/>
             </a:xfrm>
             <a:prstGeom prst="rect">
               <a:avLst/>
@@ -4827,8 +4827,23 @@
               </a:pPr>
               <a:r>
                 <a:rPr lang="en-US" sz="1800" dirty="0"/>
-                <a:t>Manual/Auto Team Assignment</a:t>
-              </a:r>
+                <a:t>Manual/Auto Team </a:t>
+              </a:r>
+              <a:r>
+                <a:rPr lang="en-US" sz="1800" dirty="0" smtClean="0"/>
+                <a:t>Assignment</a:t>
+              </a:r>
+            </a:p>
+            <a:p>
+              <a:pPr marL="285750" indent="-285750">
+                <a:buFont typeface="Arial" panose="020B0604020202020204" pitchFamily="34" charset="0"/>
+                <a:buChar char="•"/>
+              </a:pPr>
+              <a:r>
+                <a:rPr lang="en-US" sz="1800" dirty="0" smtClean="0"/>
+                <a:t>Searchable</a:t>
+              </a:r>
+              <a:endParaRPr lang="en-US" sz="1800" dirty="0"/>
             </a:p>
             <a:p>
               <a:pPr marL="285750" indent="-285750">
@@ -5915,7 +5930,7 @@
                 <a:t>getTournament</a:t>
               </a:r>
               <a:r>
-                <a:rPr lang="en-US" sz="1800" smtClean="0"/>
+                <a:rPr lang="en-US" sz="1800" dirty="0" smtClean="0"/>
                 <a:t>()</a:t>
               </a:r>
               <a:endParaRPr lang="en-US" sz="1800" dirty="0" smtClean="0"/>
@@ -6962,6 +6977,13 @@
               <a:buFontTx/>
               <a:buChar char="-"/>
             </a:pPr>
+            <a:endParaRPr lang="en-US" sz="1800" dirty="0" smtClean="0"/>
+          </a:p>
+          <a:p>
+            <a:pPr marL="285750" indent="-285750">
+              <a:buFontTx/>
+              <a:buChar char="-"/>
+            </a:pPr>
             <a:r>
               <a:rPr lang="en-US" sz="1800" dirty="0" err="1" smtClean="0"/>
               <a:t>setScore</a:t>
@@ -6970,6 +6992,23 @@
               <a:rPr lang="en-US" sz="1800" dirty="0" smtClean="0"/>
               <a:t>()</a:t>
             </a:r>
+          </a:p>
+          <a:p>
+            <a:pPr marL="285750" indent="-285750">
+              <a:buFontTx/>
+              <a:buChar char="-"/>
+            </a:pPr>
+            <a:r>
+              <a:rPr lang="en-US" sz="1800" dirty="0" smtClean="0"/>
+              <a:t>restart()</a:t>
+            </a:r>
+          </a:p>
+          <a:p>
+            <a:pPr marL="285750" indent="-285750">
+              <a:buFontTx/>
+              <a:buChar char="-"/>
+            </a:pPr>
+            <a:endParaRPr lang="en-US" sz="1800" dirty="0" smtClean="0"/>
           </a:p>
           <a:p>
             <a:pPr marL="285750" indent="-285750">
@@ -7191,6 +7230,74 @@
               <a:t>1</a:t>
             </a:r>
             <a:endParaRPr lang="en-US" sz="1800" dirty="0"/>
+          </a:p>
+        </p:txBody>
+      </p:sp>
+      <p:sp>
+        <p:nvSpPr>
+          <p:cNvPr id="112" name="Rectangle 111"/>
+          <p:cNvSpPr/>
+          <p:nvPr/>
+        </p:nvSpPr>
+        <p:spPr>
+          <a:xfrm>
+            <a:off x="976636" y="11688679"/>
+            <a:ext cx="2021269" cy="703892"/>
+          </a:xfrm>
+          <a:prstGeom prst="rect">
+            <a:avLst/>
+          </a:prstGeom>
+        </p:spPr>
+        <p:style>
+          <a:lnRef idx="2">
+            <a:schemeClr val="dk1"/>
+          </a:lnRef>
+          <a:fillRef idx="1">
+            <a:schemeClr val="lt1"/>
+          </a:fillRef>
+          <a:effectRef idx="0">
+            <a:schemeClr val="dk1"/>
+          </a:effectRef>
+          <a:fontRef idx="minor">
+            <a:schemeClr val="dk1"/>
+          </a:fontRef>
+        </p:style>
+        <p:txBody>
+          <a:bodyPr rot="0" spcFirstLastPara="0" vertOverflow="overflow" horzOverflow="overflow" vert="horz" wrap="square" lIns="91440" tIns="45720" rIns="91440" bIns="45720" numCol="1" spcCol="0" rtlCol="0" fromWordArt="0" anchor="ctr" anchorCtr="0" forceAA="0" compatLnSpc="1">
+            <a:prstTxWarp prst="textNoShape">
+              <a:avLst/>
+            </a:prstTxWarp>
+            <a:noAutofit/>
+          </a:bodyPr>
+          <a:lstStyle/>
+          <a:p>
+            <a:r>
+              <a:rPr lang="en-US" sz="1600" dirty="0" smtClean="0"/>
+              <a:t>-</a:t>
+            </a:r>
+            <a:r>
+              <a:rPr lang="en-US" sz="1600" dirty="0" err="1" smtClean="0"/>
+              <a:t>sendTournament</a:t>
+            </a:r>
+            <a:r>
+              <a:rPr lang="en-US" sz="1600" dirty="0" smtClean="0"/>
+              <a:t>(id)</a:t>
+            </a:r>
+          </a:p>
+          <a:p>
+            <a:r>
+              <a:rPr lang="en-US" sz="1600" dirty="0" smtClean="0"/>
+              <a:t>-</a:t>
+            </a:r>
+            <a:r>
+              <a:rPr lang="en-US" sz="1600" dirty="0" err="1" smtClean="0"/>
+              <a:t>sendPlayer</a:t>
+            </a:r>
+            <a:r>
+              <a:rPr lang="en-US" sz="1600" dirty="0" smtClean="0"/>
+              <a:t> (id)</a:t>
+            </a:r>
+            <a:endParaRPr lang="en-US" sz="1600" dirty="0" smtClean="0"/>
           </a:p>
         </p:txBody>
       </p:sp>

</xml_diff>